<commit_message>
Added Static vs Dynamic website info + deletion of some nod needed slides
</commit_message>
<xml_diff>
--- a/JS intro and overview.pptx
+++ b/JS intro and overview.pptx
@@ -4,6 +4,9 @@
   <p:sldMasterIdLst>
     <p:sldMasterId id="2147483660" r:id="rId1"/>
   </p:sldMasterIdLst>
+  <p:notesMasterIdLst>
+    <p:notesMasterId r:id="rId21"/>
+  </p:notesMasterIdLst>
   <p:sldIdLst>
     <p:sldId id="256" r:id="rId2"/>
     <p:sldId id="257" r:id="rId3"/>
@@ -11,18 +14,19 @@
     <p:sldId id="259" r:id="rId5"/>
     <p:sldId id="260" r:id="rId6"/>
     <p:sldId id="261" r:id="rId7"/>
-    <p:sldId id="262" r:id="rId8"/>
-    <p:sldId id="264" r:id="rId9"/>
-    <p:sldId id="274" r:id="rId10"/>
-    <p:sldId id="268" r:id="rId11"/>
-    <p:sldId id="265" r:id="rId12"/>
-    <p:sldId id="266" r:id="rId13"/>
-    <p:sldId id="273" r:id="rId14"/>
-    <p:sldId id="269" r:id="rId15"/>
-    <p:sldId id="271" r:id="rId16"/>
-    <p:sldId id="275" r:id="rId17"/>
-    <p:sldId id="276" r:id="rId18"/>
-    <p:sldId id="272" r:id="rId19"/>
+    <p:sldId id="277" r:id="rId8"/>
+    <p:sldId id="274" r:id="rId9"/>
+    <p:sldId id="262" r:id="rId10"/>
+    <p:sldId id="264" r:id="rId11"/>
+    <p:sldId id="268" r:id="rId12"/>
+    <p:sldId id="265" r:id="rId13"/>
+    <p:sldId id="266" r:id="rId14"/>
+    <p:sldId id="273" r:id="rId15"/>
+    <p:sldId id="269" r:id="rId16"/>
+    <p:sldId id="271" r:id="rId17"/>
+    <p:sldId id="272" r:id="rId18"/>
+    <p:sldId id="275" r:id="rId19"/>
+    <p:sldId id="276" r:id="rId20"/>
   </p:sldIdLst>
   <p:sldSz cx="12192000" cy="6858000"/>
   <p:notesSz cx="6858000" cy="9144000"/>
@@ -127,6 +131,440 @@
     </p:ext>
   </p:extLst>
 </p:presentation>
+</file>
+
+<file path=ppt/notesMasters/notesMaster1.xml><?xml version="1.0" encoding="utf-8"?>
+<p:notesMaster xmlns:a="http://schemas.openxmlformats.org/drawingml/2006/main" xmlns:r="http://schemas.openxmlformats.org/officeDocument/2006/relationships" xmlns:p="http://schemas.openxmlformats.org/presentationml/2006/main">
+  <p:cSld>
+    <p:bg>
+      <p:bgRef idx="1001">
+        <a:schemeClr val="bg1"/>
+      </p:bgRef>
+    </p:bg>
+    <p:spTree>
+      <p:nvGrpSpPr>
+        <p:cNvPr id="1" name=""/>
+        <p:cNvGrpSpPr/>
+        <p:nvPr/>
+      </p:nvGrpSpPr>
+      <p:grpSpPr>
+        <a:xfrm>
+          <a:off x="0" y="0"/>
+          <a:ext cx="0" cy="0"/>
+          <a:chOff x="0" y="0"/>
+          <a:chExt cx="0" cy="0"/>
+        </a:xfrm>
+      </p:grpSpPr>
+      <p:sp>
+        <p:nvSpPr>
+          <p:cNvPr id="2" name="Header Placeholder 1"/>
+          <p:cNvSpPr>
+            <a:spLocks noGrp="1"/>
+          </p:cNvSpPr>
+          <p:nvPr>
+            <p:ph type="hdr" sz="quarter"/>
+          </p:nvPr>
+        </p:nvSpPr>
+        <p:spPr>
+          <a:xfrm>
+            <a:off x="0" y="0"/>
+            <a:ext cx="2971800" cy="458788"/>
+          </a:xfrm>
+          <a:prstGeom prst="rect">
+            <a:avLst/>
+          </a:prstGeom>
+        </p:spPr>
+        <p:txBody>
+          <a:bodyPr vert="horz" lIns="91440" tIns="45720" rIns="91440" bIns="45720" rtlCol="0"/>
+          <a:lstStyle>
+            <a:lvl1pPr algn="l">
+              <a:defRPr sz="1200"/>
+            </a:lvl1pPr>
+          </a:lstStyle>
+          <a:p>
+            <a:endParaRPr lang="bg-BG"/>
+          </a:p>
+        </p:txBody>
+      </p:sp>
+      <p:sp>
+        <p:nvSpPr>
+          <p:cNvPr id="3" name="Date Placeholder 2"/>
+          <p:cNvSpPr>
+            <a:spLocks noGrp="1"/>
+          </p:cNvSpPr>
+          <p:nvPr>
+            <p:ph type="dt" idx="1"/>
+          </p:nvPr>
+        </p:nvSpPr>
+        <p:spPr>
+          <a:xfrm>
+            <a:off x="3884613" y="0"/>
+            <a:ext cx="2971800" cy="458788"/>
+          </a:xfrm>
+          <a:prstGeom prst="rect">
+            <a:avLst/>
+          </a:prstGeom>
+        </p:spPr>
+        <p:txBody>
+          <a:bodyPr vert="horz" lIns="91440" tIns="45720" rIns="91440" bIns="45720" rtlCol="0"/>
+          <a:lstStyle>
+            <a:lvl1pPr algn="r">
+              <a:defRPr sz="1200"/>
+            </a:lvl1pPr>
+          </a:lstStyle>
+          <a:p>
+            <a:fld id="{6CF08089-F520-44B2-8073-FA83BAAAEA3D}" type="datetimeFigureOut">
+              <a:rPr lang="bg-BG" smtClean="0"/>
+              <a:t>10.4.2024 г.</a:t>
+            </a:fld>
+            <a:endParaRPr lang="bg-BG"/>
+          </a:p>
+        </p:txBody>
+      </p:sp>
+      <p:sp>
+        <p:nvSpPr>
+          <p:cNvPr id="4" name="Slide Image Placeholder 3"/>
+          <p:cNvSpPr>
+            <a:spLocks noGrp="1" noRot="1" noChangeAspect="1"/>
+          </p:cNvSpPr>
+          <p:nvPr>
+            <p:ph type="sldImg" idx="2"/>
+          </p:nvPr>
+        </p:nvSpPr>
+        <p:spPr>
+          <a:xfrm>
+            <a:off x="685800" y="1143000"/>
+            <a:ext cx="5486400" cy="3086100"/>
+          </a:xfrm>
+          <a:prstGeom prst="rect">
+            <a:avLst/>
+          </a:prstGeom>
+          <a:noFill/>
+          <a:ln w="12700">
+            <a:solidFill>
+              <a:prstClr val="black"/>
+            </a:solidFill>
+          </a:ln>
+        </p:spPr>
+        <p:txBody>
+          <a:bodyPr vert="horz" lIns="91440" tIns="45720" rIns="91440" bIns="45720" rtlCol="0" anchor="ctr"/>
+          <a:lstStyle/>
+          <a:p>
+            <a:endParaRPr lang="bg-BG"/>
+          </a:p>
+        </p:txBody>
+      </p:sp>
+      <p:sp>
+        <p:nvSpPr>
+          <p:cNvPr id="5" name="Notes Placeholder 4"/>
+          <p:cNvSpPr>
+            <a:spLocks noGrp="1"/>
+          </p:cNvSpPr>
+          <p:nvPr>
+            <p:ph type="body" sz="quarter" idx="3"/>
+          </p:nvPr>
+        </p:nvSpPr>
+        <p:spPr>
+          <a:xfrm>
+            <a:off x="685800" y="4400550"/>
+            <a:ext cx="5486400" cy="3600450"/>
+          </a:xfrm>
+          <a:prstGeom prst="rect">
+            <a:avLst/>
+          </a:prstGeom>
+        </p:spPr>
+        <p:txBody>
+          <a:bodyPr vert="horz" lIns="91440" tIns="45720" rIns="91440" bIns="45720" rtlCol="0"/>
+          <a:lstStyle/>
+          <a:p>
+            <a:pPr lvl="0"/>
+            <a:r>
+              <a:rPr lang="en-US"/>
+              <a:t>Click to edit Master text styles</a:t>
+            </a:r>
+          </a:p>
+          <a:p>
+            <a:pPr lvl="1"/>
+            <a:r>
+              <a:rPr lang="en-US"/>
+              <a:t>Second level</a:t>
+            </a:r>
+          </a:p>
+          <a:p>
+            <a:pPr lvl="2"/>
+            <a:r>
+              <a:rPr lang="en-US"/>
+              <a:t>Third level</a:t>
+            </a:r>
+          </a:p>
+          <a:p>
+            <a:pPr lvl="3"/>
+            <a:r>
+              <a:rPr lang="en-US"/>
+              <a:t>Fourth level</a:t>
+            </a:r>
+          </a:p>
+          <a:p>
+            <a:pPr lvl="4"/>
+            <a:r>
+              <a:rPr lang="en-US"/>
+              <a:t>Fifth level</a:t>
+            </a:r>
+            <a:endParaRPr lang="bg-BG"/>
+          </a:p>
+        </p:txBody>
+      </p:sp>
+      <p:sp>
+        <p:nvSpPr>
+          <p:cNvPr id="6" name="Footer Placeholder 5"/>
+          <p:cNvSpPr>
+            <a:spLocks noGrp="1"/>
+          </p:cNvSpPr>
+          <p:nvPr>
+            <p:ph type="ftr" sz="quarter" idx="4"/>
+          </p:nvPr>
+        </p:nvSpPr>
+        <p:spPr>
+          <a:xfrm>
+            <a:off x="0" y="8685213"/>
+            <a:ext cx="2971800" cy="458787"/>
+          </a:xfrm>
+          <a:prstGeom prst="rect">
+            <a:avLst/>
+          </a:prstGeom>
+        </p:spPr>
+        <p:txBody>
+          <a:bodyPr vert="horz" lIns="91440" tIns="45720" rIns="91440" bIns="45720" rtlCol="0" anchor="b"/>
+          <a:lstStyle>
+            <a:lvl1pPr algn="l">
+              <a:defRPr sz="1200"/>
+            </a:lvl1pPr>
+          </a:lstStyle>
+          <a:p>
+            <a:endParaRPr lang="bg-BG"/>
+          </a:p>
+        </p:txBody>
+      </p:sp>
+      <p:sp>
+        <p:nvSpPr>
+          <p:cNvPr id="7" name="Slide Number Placeholder 6"/>
+          <p:cNvSpPr>
+            <a:spLocks noGrp="1"/>
+          </p:cNvSpPr>
+          <p:nvPr>
+            <p:ph type="sldNum" sz="quarter" idx="5"/>
+          </p:nvPr>
+        </p:nvSpPr>
+        <p:spPr>
+          <a:xfrm>
+            <a:off x="3884613" y="8685213"/>
+            <a:ext cx="2971800" cy="458787"/>
+          </a:xfrm>
+          <a:prstGeom prst="rect">
+            <a:avLst/>
+          </a:prstGeom>
+        </p:spPr>
+        <p:txBody>
+          <a:bodyPr vert="horz" lIns="91440" tIns="45720" rIns="91440" bIns="45720" rtlCol="0" anchor="b"/>
+          <a:lstStyle>
+            <a:lvl1pPr algn="r">
+              <a:defRPr sz="1200"/>
+            </a:lvl1pPr>
+          </a:lstStyle>
+          <a:p>
+            <a:fld id="{F1D7FC33-4C20-4ACC-8A07-966234DDF240}" type="slidenum">
+              <a:rPr lang="bg-BG" smtClean="0"/>
+              <a:t>‹#›</a:t>
+            </a:fld>
+            <a:endParaRPr lang="bg-BG"/>
+          </a:p>
+        </p:txBody>
+      </p:sp>
+    </p:spTree>
+    <p:extLst>
+      <p:ext uri="{BB962C8B-B14F-4D97-AF65-F5344CB8AC3E}">
+        <p14:creationId xmlns:p14="http://schemas.microsoft.com/office/powerpoint/2010/main" val="1980317227"/>
+      </p:ext>
+    </p:extLst>
+  </p:cSld>
+  <p:clrMap bg1="lt1" tx1="dk1" bg2="lt2" tx2="dk2" accent1="accent1" accent2="accent2" accent3="accent3" accent4="accent4" accent5="accent5" accent6="accent6" hlink="hlink" folHlink="folHlink"/>
+  <p:notesStyle>
+    <a:lvl1pPr marL="0" algn="l" defTabSz="914400" rtl="0" eaLnBrk="1" latinLnBrk="0" hangingPunct="1">
+      <a:defRPr sz="1200" kern="1200">
+        <a:solidFill>
+          <a:schemeClr val="tx1"/>
+        </a:solidFill>
+        <a:latin typeface="+mn-lt"/>
+        <a:ea typeface="+mn-ea"/>
+        <a:cs typeface="+mn-cs"/>
+      </a:defRPr>
+    </a:lvl1pPr>
+    <a:lvl2pPr marL="457200" algn="l" defTabSz="914400" rtl="0" eaLnBrk="1" latinLnBrk="0" hangingPunct="1">
+      <a:defRPr sz="1200" kern="1200">
+        <a:solidFill>
+          <a:schemeClr val="tx1"/>
+        </a:solidFill>
+        <a:latin typeface="+mn-lt"/>
+        <a:ea typeface="+mn-ea"/>
+        <a:cs typeface="+mn-cs"/>
+      </a:defRPr>
+    </a:lvl2pPr>
+    <a:lvl3pPr marL="914400" algn="l" defTabSz="914400" rtl="0" eaLnBrk="1" latinLnBrk="0" hangingPunct="1">
+      <a:defRPr sz="1200" kern="1200">
+        <a:solidFill>
+          <a:schemeClr val="tx1"/>
+        </a:solidFill>
+        <a:latin typeface="+mn-lt"/>
+        <a:ea typeface="+mn-ea"/>
+        <a:cs typeface="+mn-cs"/>
+      </a:defRPr>
+    </a:lvl3pPr>
+    <a:lvl4pPr marL="1371600" algn="l" defTabSz="914400" rtl="0" eaLnBrk="1" latinLnBrk="0" hangingPunct="1">
+      <a:defRPr sz="1200" kern="1200">
+        <a:solidFill>
+          <a:schemeClr val="tx1"/>
+        </a:solidFill>
+        <a:latin typeface="+mn-lt"/>
+        <a:ea typeface="+mn-ea"/>
+        <a:cs typeface="+mn-cs"/>
+      </a:defRPr>
+    </a:lvl4pPr>
+    <a:lvl5pPr marL="1828800" algn="l" defTabSz="914400" rtl="0" eaLnBrk="1" latinLnBrk="0" hangingPunct="1">
+      <a:defRPr sz="1200" kern="1200">
+        <a:solidFill>
+          <a:schemeClr val="tx1"/>
+        </a:solidFill>
+        <a:latin typeface="+mn-lt"/>
+        <a:ea typeface="+mn-ea"/>
+        <a:cs typeface="+mn-cs"/>
+      </a:defRPr>
+    </a:lvl5pPr>
+    <a:lvl6pPr marL="2286000" algn="l" defTabSz="914400" rtl="0" eaLnBrk="1" latinLnBrk="0" hangingPunct="1">
+      <a:defRPr sz="1200" kern="1200">
+        <a:solidFill>
+          <a:schemeClr val="tx1"/>
+        </a:solidFill>
+        <a:latin typeface="+mn-lt"/>
+        <a:ea typeface="+mn-ea"/>
+        <a:cs typeface="+mn-cs"/>
+      </a:defRPr>
+    </a:lvl6pPr>
+    <a:lvl7pPr marL="2743200" algn="l" defTabSz="914400" rtl="0" eaLnBrk="1" latinLnBrk="0" hangingPunct="1">
+      <a:defRPr sz="1200" kern="1200">
+        <a:solidFill>
+          <a:schemeClr val="tx1"/>
+        </a:solidFill>
+        <a:latin typeface="+mn-lt"/>
+        <a:ea typeface="+mn-ea"/>
+        <a:cs typeface="+mn-cs"/>
+      </a:defRPr>
+    </a:lvl7pPr>
+    <a:lvl8pPr marL="3200400" algn="l" defTabSz="914400" rtl="0" eaLnBrk="1" latinLnBrk="0" hangingPunct="1">
+      <a:defRPr sz="1200" kern="1200">
+        <a:solidFill>
+          <a:schemeClr val="tx1"/>
+        </a:solidFill>
+        <a:latin typeface="+mn-lt"/>
+        <a:ea typeface="+mn-ea"/>
+        <a:cs typeface="+mn-cs"/>
+      </a:defRPr>
+    </a:lvl8pPr>
+    <a:lvl9pPr marL="3657600" algn="l" defTabSz="914400" rtl="0" eaLnBrk="1" latinLnBrk="0" hangingPunct="1">
+      <a:defRPr sz="1200" kern="1200">
+        <a:solidFill>
+          <a:schemeClr val="tx1"/>
+        </a:solidFill>
+        <a:latin typeface="+mn-lt"/>
+        <a:ea typeface="+mn-ea"/>
+        <a:cs typeface="+mn-cs"/>
+      </a:defRPr>
+    </a:lvl9pPr>
+  </p:notesStyle>
+</p:notesMaster>
+</file>
+
+<file path=ppt/notesSlides/notesSlide1.xml><?xml version="1.0" encoding="utf-8"?>
+<p:notes xmlns:a="http://schemas.openxmlformats.org/drawingml/2006/main" xmlns:r="http://schemas.openxmlformats.org/officeDocument/2006/relationships" xmlns:p="http://schemas.openxmlformats.org/presentationml/2006/main">
+  <p:cSld>
+    <p:spTree>
+      <p:nvGrpSpPr>
+        <p:cNvPr id="1" name=""/>
+        <p:cNvGrpSpPr/>
+        <p:nvPr/>
+      </p:nvGrpSpPr>
+      <p:grpSpPr>
+        <a:xfrm>
+          <a:off x="0" y="0"/>
+          <a:ext cx="0" cy="0"/>
+          <a:chOff x="0" y="0"/>
+          <a:chExt cx="0" cy="0"/>
+        </a:xfrm>
+      </p:grpSpPr>
+      <p:sp>
+        <p:nvSpPr>
+          <p:cNvPr id="2" name="Slide Image Placeholder 1"/>
+          <p:cNvSpPr>
+            <a:spLocks noGrp="1" noRot="1" noChangeAspect="1"/>
+          </p:cNvSpPr>
+          <p:nvPr>
+            <p:ph type="sldImg"/>
+          </p:nvPr>
+        </p:nvSpPr>
+        <p:spPr/>
+      </p:sp>
+      <p:sp>
+        <p:nvSpPr>
+          <p:cNvPr id="3" name="Notes Placeholder 2"/>
+          <p:cNvSpPr>
+            <a:spLocks noGrp="1"/>
+          </p:cNvSpPr>
+          <p:nvPr>
+            <p:ph type="body" idx="1"/>
+          </p:nvPr>
+        </p:nvSpPr>
+        <p:spPr/>
+        <p:txBody>
+          <a:bodyPr/>
+          <a:lstStyle/>
+          <a:p>
+            <a:endParaRPr lang="bg-BG" dirty="0"/>
+          </a:p>
+        </p:txBody>
+      </p:sp>
+      <p:sp>
+        <p:nvSpPr>
+          <p:cNvPr id="4" name="Slide Number Placeholder 3"/>
+          <p:cNvSpPr>
+            <a:spLocks noGrp="1"/>
+          </p:cNvSpPr>
+          <p:nvPr>
+            <p:ph type="sldNum" sz="quarter" idx="5"/>
+          </p:nvPr>
+        </p:nvSpPr>
+        <p:spPr/>
+        <p:txBody>
+          <a:bodyPr/>
+          <a:lstStyle/>
+          <a:p>
+            <a:fld id="{F1D7FC33-4C20-4ACC-8A07-966234DDF240}" type="slidenum">
+              <a:rPr lang="bg-BG" smtClean="0"/>
+              <a:t>7</a:t>
+            </a:fld>
+            <a:endParaRPr lang="bg-BG"/>
+          </a:p>
+        </p:txBody>
+      </p:sp>
+    </p:spTree>
+    <p:extLst>
+      <p:ext uri="{BB962C8B-B14F-4D97-AF65-F5344CB8AC3E}">
+        <p14:creationId xmlns:p14="http://schemas.microsoft.com/office/powerpoint/2010/main" val="2073519588"/>
+      </p:ext>
+    </p:extLst>
+  </p:cSld>
+  <p:clrMapOvr>
+    <a:masterClrMapping/>
+  </p:clrMapOvr>
+</p:notes>
 </file>
 
 <file path=ppt/slideLayouts/slideLayout1.xml><?xml version="1.0" encoding="utf-8"?>
@@ -464,7 +902,7 @@
           <a:p>
             <a:fld id="{8B459554-0E39-41B3-91CD-988305703B3E}" type="datetimeFigureOut">
               <a:rPr lang="bg-BG" smtClean="0"/>
-              <a:t>9.4.2024 г.</a:t>
+              <a:t>10.4.2024 г.</a:t>
             </a:fld>
             <a:endParaRPr lang="bg-BG"/>
           </a:p>
@@ -1552,7 +1990,7 @@
           <a:p>
             <a:fld id="{8B459554-0E39-41B3-91CD-988305703B3E}" type="datetimeFigureOut">
               <a:rPr lang="bg-BG" smtClean="0"/>
-              <a:t>9.4.2024 г.</a:t>
+              <a:t>10.4.2024 г.</a:t>
             </a:fld>
             <a:endParaRPr lang="bg-BG"/>
           </a:p>
@@ -2532,7 +2970,7 @@
           <a:p>
             <a:fld id="{8B459554-0E39-41B3-91CD-988305703B3E}" type="datetimeFigureOut">
               <a:rPr lang="bg-BG" smtClean="0"/>
-              <a:t>9.4.2024 г.</a:t>
+              <a:t>10.4.2024 г.</a:t>
             </a:fld>
             <a:endParaRPr lang="bg-BG"/>
           </a:p>
@@ -3666,7 +4104,7 @@
           <a:p>
             <a:fld id="{8B459554-0E39-41B3-91CD-988305703B3E}" type="datetimeFigureOut">
               <a:rPr lang="bg-BG" smtClean="0"/>
-              <a:t>9.4.2024 г.</a:t>
+              <a:t>10.4.2024 г.</a:t>
             </a:fld>
             <a:endParaRPr lang="bg-BG"/>
           </a:p>
@@ -4699,7 +5137,7 @@
           <a:p>
             <a:fld id="{8B459554-0E39-41B3-91CD-988305703B3E}" type="datetimeFigureOut">
               <a:rPr lang="bg-BG" smtClean="0"/>
-              <a:t>9.4.2024 г.</a:t>
+              <a:t>10.4.2024 г.</a:t>
             </a:fld>
             <a:endParaRPr lang="bg-BG"/>
           </a:p>
@@ -5359,7 +5797,7 @@
           <a:p>
             <a:fld id="{8B459554-0E39-41B3-91CD-988305703B3E}" type="datetimeFigureOut">
               <a:rPr lang="bg-BG" smtClean="0"/>
-              <a:t>9.4.2024 г.</a:t>
+              <a:t>10.4.2024 г.</a:t>
             </a:fld>
             <a:endParaRPr lang="bg-BG"/>
           </a:p>
@@ -6220,7 +6658,7 @@
           <a:p>
             <a:fld id="{8B459554-0E39-41B3-91CD-988305703B3E}" type="datetimeFigureOut">
               <a:rPr lang="bg-BG" smtClean="0"/>
-              <a:t>9.4.2024 г.</a:t>
+              <a:t>10.4.2024 г.</a:t>
             </a:fld>
             <a:endParaRPr lang="bg-BG"/>
           </a:p>
@@ -6410,7 +6848,7 @@
           <a:p>
             <a:fld id="{8B459554-0E39-41B3-91CD-988305703B3E}" type="datetimeFigureOut">
               <a:rPr lang="bg-BG" smtClean="0"/>
-              <a:t>9.4.2024 г.</a:t>
+              <a:t>10.4.2024 г.</a:t>
             </a:fld>
             <a:endParaRPr lang="bg-BG"/>
           </a:p>
@@ -7382,7 +7820,7 @@
           <a:p>
             <a:fld id="{8B459554-0E39-41B3-91CD-988305703B3E}" type="datetimeFigureOut">
               <a:rPr lang="bg-BG" smtClean="0"/>
-              <a:t>9.4.2024 г.</a:t>
+              <a:t>10.4.2024 г.</a:t>
             </a:fld>
             <a:endParaRPr lang="bg-BG"/>
           </a:p>
@@ -7593,7 +8031,7 @@
           <a:p>
             <a:fld id="{8B459554-0E39-41B3-91CD-988305703B3E}" type="datetimeFigureOut">
               <a:rPr lang="bg-BG" smtClean="0"/>
-              <a:t>9.4.2024 г.</a:t>
+              <a:t>10.4.2024 г.</a:t>
             </a:fld>
             <a:endParaRPr lang="bg-BG"/>
           </a:p>
@@ -8627,7 +9065,7 @@
           <a:p>
             <a:fld id="{8B459554-0E39-41B3-91CD-988305703B3E}" type="datetimeFigureOut">
               <a:rPr lang="bg-BG" smtClean="0"/>
-              <a:t>9.4.2024 г.</a:t>
+              <a:t>10.4.2024 г.</a:t>
             </a:fld>
             <a:endParaRPr lang="bg-BG"/>
           </a:p>
@@ -8899,7 +9337,7 @@
           <a:p>
             <a:fld id="{8B459554-0E39-41B3-91CD-988305703B3E}" type="datetimeFigureOut">
               <a:rPr lang="bg-BG" smtClean="0"/>
-              <a:t>9.4.2024 г.</a:t>
+              <a:t>10.4.2024 г.</a:t>
             </a:fld>
             <a:endParaRPr lang="bg-BG"/>
           </a:p>
@@ -9309,7 +9747,7 @@
           <a:p>
             <a:fld id="{8B459554-0E39-41B3-91CD-988305703B3E}" type="datetimeFigureOut">
               <a:rPr lang="bg-BG" smtClean="0"/>
-              <a:t>9.4.2024 г.</a:t>
+              <a:t>10.4.2024 г.</a:t>
             </a:fld>
             <a:endParaRPr lang="bg-BG"/>
           </a:p>
@@ -9436,7 +9874,7 @@
           <a:p>
             <a:fld id="{8B459554-0E39-41B3-91CD-988305703B3E}" type="datetimeFigureOut">
               <a:rPr lang="bg-BG" smtClean="0"/>
-              <a:t>9.4.2024 г.</a:t>
+              <a:t>10.4.2024 г.</a:t>
             </a:fld>
             <a:endParaRPr lang="bg-BG"/>
           </a:p>
@@ -9531,7 +9969,7 @@
           <a:p>
             <a:fld id="{8B459554-0E39-41B3-91CD-988305703B3E}" type="datetimeFigureOut">
               <a:rPr lang="bg-BG" smtClean="0"/>
-              <a:t>9.4.2024 г.</a:t>
+              <a:t>10.4.2024 г.</a:t>
             </a:fld>
             <a:endParaRPr lang="bg-BG"/>
           </a:p>
@@ -10612,7 +11050,7 @@
           <a:p>
             <a:fld id="{8B459554-0E39-41B3-91CD-988305703B3E}" type="datetimeFigureOut">
               <a:rPr lang="bg-BG" smtClean="0"/>
-              <a:t>9.4.2024 г.</a:t>
+              <a:t>10.4.2024 г.</a:t>
             </a:fld>
             <a:endParaRPr lang="bg-BG"/>
           </a:p>
@@ -11720,7 +12158,7 @@
           <a:p>
             <a:fld id="{8B459554-0E39-41B3-91CD-988305703B3E}" type="datetimeFigureOut">
               <a:rPr lang="bg-BG" smtClean="0"/>
-              <a:t>9.4.2024 г.</a:t>
+              <a:t>10.4.2024 г.</a:t>
             </a:fld>
             <a:endParaRPr lang="bg-BG"/>
           </a:p>
@@ -12717,7 +13155,7 @@
           <a:p>
             <a:fld id="{8B459554-0E39-41B3-91CD-988305703B3E}" type="datetimeFigureOut">
               <a:rPr lang="bg-BG" smtClean="0"/>
-              <a:t>9.4.2024 г.</a:t>
+              <a:t>10.4.2024 г.</a:t>
             </a:fld>
             <a:endParaRPr lang="bg-BG"/>
           </a:p>
@@ -13335,13 +13773,13 @@
         </p:nvSpPr>
         <p:spPr>
           <a:xfrm>
-            <a:off x="1154955" y="2603499"/>
-            <a:ext cx="7568915" cy="3739635"/>
+            <a:off x="565265" y="2493819"/>
+            <a:ext cx="8158605" cy="4064924"/>
           </a:xfrm>
         </p:spPr>
         <p:txBody>
           <a:bodyPr>
-            <a:normAutofit fontScale="92500" lnSpcReduction="20000"/>
+            <a:normAutofit fontScale="92500" lnSpcReduction="10000"/>
           </a:bodyPr>
           <a:lstStyle/>
           <a:p>
@@ -13378,6 +13816,15 @@
                 <a:cs typeface="Arial" panose="020B0604020202020204" pitchFamily="34" charset="0"/>
               </a:rPr>
               <a:t>jQuery and AJAX</a:t>
+            </a:r>
+          </a:p>
+          <a:p>
+            <a:r>
+              <a:rPr lang="en-US" dirty="0">
+                <a:latin typeface="Arial" panose="020B0604020202020204" pitchFamily="34" charset="0"/>
+                <a:cs typeface="Arial" panose="020B0604020202020204" pitchFamily="34" charset="0"/>
+              </a:rPr>
+              <a:t>Static Website vs Dynamic Website</a:t>
             </a:r>
           </a:p>
           <a:p>
@@ -13417,26 +13864,42 @@
                 <a:latin typeface="Arial" panose="020B0604020202020204" pitchFamily="34" charset="0"/>
                 <a:cs typeface="Arial" panose="020B0604020202020204" pitchFamily="34" charset="0"/>
               </a:rPr>
-              <a:t>JavaScript in Machine Learning</a:t>
-            </a:r>
-          </a:p>
-          <a:p>
+              <a:t>Software what I am using for JavaScript development (editors, runtime, etc.)</a:t>
+            </a:r>
+          </a:p>
+          <a:p>
+            <a:r>
+              <a:rPr lang="en-US" b="1" i="1" u="sng" dirty="0">
+                <a:latin typeface="Arial" panose="020B0604020202020204" pitchFamily="34" charset="0"/>
+                <a:cs typeface="Arial" panose="020B0604020202020204" pitchFamily="34" charset="0"/>
+              </a:rPr>
+              <a:t>Bonus:</a:t>
+            </a:r>
             <a:r>
               <a:rPr lang="en-US" dirty="0">
                 <a:latin typeface="Arial" panose="020B0604020202020204" pitchFamily="34" charset="0"/>
                 <a:cs typeface="Arial" panose="020B0604020202020204" pitchFamily="34" charset="0"/>
               </a:rPr>
+              <a:t> JavaScript in Machine Learning</a:t>
+            </a:r>
+          </a:p>
+          <a:p>
+            <a:r>
+              <a:rPr lang="en-US" b="1" i="1" u="sng" dirty="0">
+                <a:latin typeface="Arial" panose="020B0604020202020204" pitchFamily="34" charset="0"/>
+                <a:cs typeface="Arial" panose="020B0604020202020204" pitchFamily="34" charset="0"/>
+              </a:rPr>
+              <a:t>Bonus: </a:t>
+            </a:r>
+            <a:r>
+              <a:rPr lang="en-US" dirty="0">
+                <a:latin typeface="Arial" panose="020B0604020202020204" pitchFamily="34" charset="0"/>
+                <a:cs typeface="Arial" panose="020B0604020202020204" pitchFamily="34" charset="0"/>
+              </a:rPr>
               <a:t>JavaScript in Robotics </a:t>
             </a:r>
           </a:p>
           <a:p>
-            <a:r>
-              <a:rPr lang="en-US" dirty="0">
-                <a:latin typeface="Arial" panose="020B0604020202020204" pitchFamily="34" charset="0"/>
-                <a:cs typeface="Arial" panose="020B0604020202020204" pitchFamily="34" charset="0"/>
-              </a:rPr>
-              <a:t>Software what I am using for JavaScript development (editors, runtime, etc.)</a:t>
-            </a:r>
             <a:endParaRPr lang="bg-BG" dirty="0">
               <a:latin typeface="Arial" panose="020B0604020202020204" pitchFamily="34" charset="0"/>
               <a:cs typeface="Arial" panose="020B0604020202020204" pitchFamily="34" charset="0"/>
@@ -13510,6 +13973,186 @@
           <a:chExt cx="0" cy="0"/>
         </a:xfrm>
       </p:grpSpPr>
+      <p:pic>
+        <p:nvPicPr>
+          <p:cNvPr id="6" name="Content Placeholder 5" descr="A diagram of a computer&#10;&#10;Description automatically generated">
+            <a:extLst>
+              <a:ext uri="{FF2B5EF4-FFF2-40B4-BE49-F238E27FC236}">
+                <a16:creationId xmlns:a16="http://schemas.microsoft.com/office/drawing/2014/main" id="{BBF5B8DF-9CB4-54E9-8699-54B9E3E0F255}"/>
+              </a:ext>
+            </a:extLst>
+          </p:cNvPr>
+          <p:cNvPicPr>
+            <a:picLocks noGrp="1" noChangeAspect="1"/>
+          </p:cNvPicPr>
+          <p:nvPr>
+            <p:ph idx="1"/>
+          </p:nvPr>
+        </p:nvPicPr>
+        <p:blipFill>
+          <a:blip r:embed="rId2">
+            <a:extLst>
+              <a:ext uri="{28A0092B-C50C-407E-A947-70E740481C1C}">
+                <a14:useLocalDpi xmlns:a14="http://schemas.microsoft.com/office/drawing/2010/main" val="0"/>
+              </a:ext>
+            </a:extLst>
+          </a:blip>
+          <a:stretch>
+            <a:fillRect/>
+          </a:stretch>
+        </p:blipFill>
+        <p:spPr>
+          <a:xfrm>
+            <a:off x="2752502" y="2344522"/>
+            <a:ext cx="6143297" cy="4365197"/>
+          </a:xfrm>
+        </p:spPr>
+      </p:pic>
+      <p:sp>
+        <p:nvSpPr>
+          <p:cNvPr id="4" name="Title 1">
+            <a:extLst>
+              <a:ext uri="{FF2B5EF4-FFF2-40B4-BE49-F238E27FC236}">
+                <a16:creationId xmlns:a16="http://schemas.microsoft.com/office/drawing/2014/main" id="{0CE3849C-67BE-577D-A53F-8786A7A99D73}"/>
+              </a:ext>
+            </a:extLst>
+          </p:cNvPr>
+          <p:cNvSpPr txBox="1">
+            <a:spLocks/>
+          </p:cNvSpPr>
+          <p:nvPr/>
+        </p:nvSpPr>
+        <p:spPr bwMode="gray">
+          <a:xfrm>
+            <a:off x="1546191" y="743008"/>
+            <a:ext cx="8761413" cy="1168170"/>
+          </a:xfrm>
+          <a:prstGeom prst="rect">
+            <a:avLst/>
+          </a:prstGeom>
+        </p:spPr>
+        <p:txBody>
+          <a:bodyPr vert="horz" lIns="91440" tIns="45720" rIns="91440" bIns="45720" rtlCol="0" anchor="ctr">
+            <a:noAutofit/>
+          </a:bodyPr>
+          <a:lstStyle>
+            <a:lvl1pPr algn="l" defTabSz="457200" rtl="0" eaLnBrk="1" latinLnBrk="0" hangingPunct="1">
+              <a:spcBef>
+                <a:spcPct val="0"/>
+              </a:spcBef>
+              <a:buNone/>
+              <a:defRPr sz="3600" b="0" i="0" kern="1200">
+                <a:solidFill>
+                  <a:schemeClr val="bg2"/>
+                </a:solidFill>
+                <a:latin typeface="+mj-lt"/>
+                <a:ea typeface="+mj-ea"/>
+                <a:cs typeface="+mj-cs"/>
+              </a:defRPr>
+            </a:lvl1pPr>
+            <a:lvl2pPr eaLnBrk="1" hangingPunct="1">
+              <a:defRPr>
+                <a:solidFill>
+                  <a:schemeClr val="tx2"/>
+                </a:solidFill>
+              </a:defRPr>
+            </a:lvl2pPr>
+            <a:lvl3pPr eaLnBrk="1" hangingPunct="1">
+              <a:defRPr>
+                <a:solidFill>
+                  <a:schemeClr val="tx2"/>
+                </a:solidFill>
+              </a:defRPr>
+            </a:lvl3pPr>
+            <a:lvl4pPr eaLnBrk="1" hangingPunct="1">
+              <a:defRPr>
+                <a:solidFill>
+                  <a:schemeClr val="tx2"/>
+                </a:solidFill>
+              </a:defRPr>
+            </a:lvl4pPr>
+            <a:lvl5pPr eaLnBrk="1" hangingPunct="1">
+              <a:defRPr>
+                <a:solidFill>
+                  <a:schemeClr val="tx2"/>
+                </a:solidFill>
+              </a:defRPr>
+            </a:lvl5pPr>
+            <a:lvl6pPr eaLnBrk="1" hangingPunct="1">
+              <a:defRPr>
+                <a:solidFill>
+                  <a:schemeClr val="tx2"/>
+                </a:solidFill>
+              </a:defRPr>
+            </a:lvl6pPr>
+            <a:lvl7pPr eaLnBrk="1" hangingPunct="1">
+              <a:defRPr>
+                <a:solidFill>
+                  <a:schemeClr val="tx2"/>
+                </a:solidFill>
+              </a:defRPr>
+            </a:lvl7pPr>
+            <a:lvl8pPr eaLnBrk="1" hangingPunct="1">
+              <a:defRPr>
+                <a:solidFill>
+                  <a:schemeClr val="tx2"/>
+                </a:solidFill>
+              </a:defRPr>
+            </a:lvl8pPr>
+            <a:lvl9pPr eaLnBrk="1" hangingPunct="1">
+              <a:defRPr>
+                <a:solidFill>
+                  <a:schemeClr val="tx2"/>
+                </a:solidFill>
+              </a:defRPr>
+            </a:lvl9pPr>
+          </a:lstStyle>
+          <a:p>
+            <a:pPr algn="ctr"/>
+            <a:r>
+              <a:rPr lang="en-US" dirty="0">
+                <a:latin typeface="Arial" panose="020B0604020202020204" pitchFamily="34" charset="0"/>
+                <a:cs typeface="Arial" panose="020B0604020202020204" pitchFamily="34" charset="0"/>
+              </a:rPr>
+              <a:t>Without and with AJAX?</a:t>
+            </a:r>
+            <a:endParaRPr lang="bg-BG" dirty="0">
+              <a:latin typeface="Arial" panose="020B0604020202020204" pitchFamily="34" charset="0"/>
+              <a:cs typeface="Arial" panose="020B0604020202020204" pitchFamily="34" charset="0"/>
+            </a:endParaRPr>
+          </a:p>
+        </p:txBody>
+      </p:sp>
+    </p:spTree>
+    <p:extLst>
+      <p:ext uri="{BB962C8B-B14F-4D97-AF65-F5344CB8AC3E}">
+        <p14:creationId xmlns:p14="http://schemas.microsoft.com/office/powerpoint/2010/main" val="1438249516"/>
+      </p:ext>
+    </p:extLst>
+  </p:cSld>
+  <p:clrMapOvr>
+    <a:masterClrMapping/>
+  </p:clrMapOvr>
+</p:sld>
+</file>
+
+<file path=ppt/slides/slide11.xml><?xml version="1.0" encoding="utf-8"?>
+<p:sld xmlns:a="http://schemas.openxmlformats.org/drawingml/2006/main" xmlns:r="http://schemas.openxmlformats.org/officeDocument/2006/relationships" xmlns:p="http://schemas.openxmlformats.org/presentationml/2006/main">
+  <p:cSld>
+    <p:spTree>
+      <p:nvGrpSpPr>
+        <p:cNvPr id="1" name=""/>
+        <p:cNvGrpSpPr/>
+        <p:nvPr/>
+      </p:nvGrpSpPr>
+      <p:grpSpPr>
+        <a:xfrm>
+          <a:off x="0" y="0"/>
+          <a:ext cx="0" cy="0"/>
+          <a:chOff x="0" y="0"/>
+          <a:chExt cx="0" cy="0"/>
+        </a:xfrm>
+      </p:grpSpPr>
       <p:sp>
         <p:nvSpPr>
           <p:cNvPr id="2" name="Title 1">
@@ -13673,7 +14316,7 @@
 </p:sld>
 </file>
 
-<file path=ppt/slides/slide11.xml><?xml version="1.0" encoding="utf-8"?>
+<file path=ppt/slides/slide12.xml><?xml version="1.0" encoding="utf-8"?>
 <p:sld xmlns:a="http://schemas.openxmlformats.org/drawingml/2006/main" xmlns:r="http://schemas.openxmlformats.org/officeDocument/2006/relationships" xmlns:p="http://schemas.openxmlformats.org/presentationml/2006/main">
   <p:cSld>
     <p:spTree>
@@ -14109,7 +14752,7 @@
 </p:sld>
 </file>
 
-<file path=ppt/slides/slide12.xml><?xml version="1.0" encoding="utf-8"?>
+<file path=ppt/slides/slide13.xml><?xml version="1.0" encoding="utf-8"?>
 <p:sld xmlns:a="http://schemas.openxmlformats.org/drawingml/2006/main" xmlns:r="http://schemas.openxmlformats.org/officeDocument/2006/relationships" xmlns:p="http://schemas.openxmlformats.org/presentationml/2006/main">
   <p:cSld>
     <p:spTree>
@@ -14472,7 +15115,7 @@
 </p:sld>
 </file>
 
-<file path=ppt/slides/slide13.xml><?xml version="1.0" encoding="utf-8"?>
+<file path=ppt/slides/slide14.xml><?xml version="1.0" encoding="utf-8"?>
 <p:sld xmlns:a="http://schemas.openxmlformats.org/drawingml/2006/main" xmlns:r="http://schemas.openxmlformats.org/officeDocument/2006/relationships" xmlns:p="http://schemas.openxmlformats.org/presentationml/2006/main">
   <p:cSld>
     <p:spTree>
@@ -14837,7 +15480,7 @@
 </p:sld>
 </file>
 
-<file path=ppt/slides/slide14.xml><?xml version="1.0" encoding="utf-8"?>
+<file path=ppt/slides/slide15.xml><?xml version="1.0" encoding="utf-8"?>
 <p:sld xmlns:a="http://schemas.openxmlformats.org/drawingml/2006/main" xmlns:r="http://schemas.openxmlformats.org/officeDocument/2006/relationships" xmlns:p="http://schemas.openxmlformats.org/presentationml/2006/main">
   <p:cSld>
     <p:spTree>
@@ -14938,7 +15581,7 @@
 </p:sld>
 </file>
 
-<file path=ppt/slides/slide15.xml><?xml version="1.0" encoding="utf-8"?>
+<file path=ppt/slides/slide16.xml><?xml version="1.0" encoding="utf-8"?>
 <p:sld xmlns:a="http://schemas.openxmlformats.org/drawingml/2006/main" xmlns:r="http://schemas.openxmlformats.org/officeDocument/2006/relationships" xmlns:p="http://schemas.openxmlformats.org/presentationml/2006/main">
   <p:cSld>
     <p:spTree>
@@ -15182,494 +15825,7 @@
 </p:sld>
 </file>
 
-<file path=ppt/slides/slide16.xml><?xml version="1.0" encoding="utf-8"?>
-<p:sld xmlns:a="http://schemas.openxmlformats.org/drawingml/2006/main" xmlns:r="http://schemas.openxmlformats.org/officeDocument/2006/relationships" xmlns:p="http://schemas.openxmlformats.org/presentationml/2006/main">
-  <p:cSld>
-    <p:spTree>
-      <p:nvGrpSpPr>
-        <p:cNvPr id="1" name=""/>
-        <p:cNvGrpSpPr/>
-        <p:nvPr/>
-      </p:nvGrpSpPr>
-      <p:grpSpPr>
-        <a:xfrm>
-          <a:off x="0" y="0"/>
-          <a:ext cx="0" cy="0"/>
-          <a:chOff x="0" y="0"/>
-          <a:chExt cx="0" cy="0"/>
-        </a:xfrm>
-      </p:grpSpPr>
-      <p:sp>
-        <p:nvSpPr>
-          <p:cNvPr id="2" name="Title 1">
-            <a:extLst>
-              <a:ext uri="{FF2B5EF4-FFF2-40B4-BE49-F238E27FC236}">
-                <a16:creationId xmlns:a16="http://schemas.microsoft.com/office/drawing/2014/main" id="{24FE2DF1-9B8F-6184-2517-9319896A8520}"/>
-              </a:ext>
-            </a:extLst>
-          </p:cNvPr>
-          <p:cNvSpPr>
-            <a:spLocks noGrp="1"/>
-          </p:cNvSpPr>
-          <p:nvPr>
-            <p:ph type="title"/>
-          </p:nvPr>
-        </p:nvSpPr>
-        <p:spPr>
-          <a:xfrm>
-            <a:off x="1546840" y="863136"/>
-            <a:ext cx="8761413" cy="706964"/>
-          </a:xfrm>
-        </p:spPr>
-        <p:txBody>
-          <a:bodyPr/>
-          <a:lstStyle/>
-          <a:p>
-            <a:pPr algn="ctr"/>
-            <a:r>
-              <a:rPr lang="en-US" dirty="0"/>
-              <a:t>JavaScript in Machine Learning</a:t>
-            </a:r>
-            <a:endParaRPr lang="bg-BG" dirty="0"/>
-          </a:p>
-        </p:txBody>
-      </p:sp>
-      <p:sp>
-        <p:nvSpPr>
-          <p:cNvPr id="3" name="Content Placeholder 2">
-            <a:extLst>
-              <a:ext uri="{FF2B5EF4-FFF2-40B4-BE49-F238E27FC236}">
-                <a16:creationId xmlns:a16="http://schemas.microsoft.com/office/drawing/2014/main" id="{34265987-89CE-FB02-4E37-6D9DC7100BFE}"/>
-              </a:ext>
-            </a:extLst>
-          </p:cNvPr>
-          <p:cNvSpPr>
-            <a:spLocks noGrp="1"/>
-          </p:cNvSpPr>
-          <p:nvPr>
-            <p:ph idx="1"/>
-          </p:nvPr>
-        </p:nvSpPr>
-        <p:spPr>
-          <a:xfrm>
-            <a:off x="1154955" y="2603500"/>
-            <a:ext cx="2313176" cy="3714922"/>
-          </a:xfrm>
-        </p:spPr>
-        <p:txBody>
-          <a:bodyPr/>
-          <a:lstStyle/>
-          <a:p>
-            <a:r>
-              <a:rPr lang="en-US" dirty="0">
-                <a:latin typeface="Arial" panose="020B0604020202020204" pitchFamily="34" charset="0"/>
-                <a:cs typeface="Arial" panose="020B0604020202020204" pitchFamily="34" charset="0"/>
-              </a:rPr>
-              <a:t>TensorFlow.js</a:t>
-            </a:r>
-          </a:p>
-          <a:p>
-            <a:r>
-              <a:rPr lang="en-US" dirty="0">
-                <a:latin typeface="Arial" panose="020B0604020202020204" pitchFamily="34" charset="0"/>
-                <a:cs typeface="Arial" panose="020B0604020202020204" pitchFamily="34" charset="0"/>
-              </a:rPr>
-              <a:t>ML.js</a:t>
-            </a:r>
-          </a:p>
-          <a:p>
-            <a:r>
-              <a:rPr lang="en-US" dirty="0">
-                <a:latin typeface="Arial" panose="020B0604020202020204" pitchFamily="34" charset="0"/>
-                <a:cs typeface="Arial" panose="020B0604020202020204" pitchFamily="34" charset="0"/>
-              </a:rPr>
-              <a:t>Neuro.js</a:t>
-            </a:r>
-          </a:p>
-          <a:p>
-            <a:r>
-              <a:rPr lang="en-US" dirty="0">
-                <a:latin typeface="Arial" panose="020B0604020202020204" pitchFamily="34" charset="0"/>
-                <a:cs typeface="Arial" panose="020B0604020202020204" pitchFamily="34" charset="0"/>
-              </a:rPr>
-              <a:t>Brain.js</a:t>
-            </a:r>
-          </a:p>
-          <a:p>
-            <a:r>
-              <a:rPr lang="en-US" dirty="0">
-                <a:latin typeface="Arial" panose="020B0604020202020204" pitchFamily="34" charset="0"/>
-                <a:cs typeface="Arial" panose="020B0604020202020204" pitchFamily="34" charset="0"/>
-              </a:rPr>
-              <a:t>OpenCV.js</a:t>
-            </a:r>
-          </a:p>
-          <a:p>
-            <a:r>
-              <a:rPr lang="en-US" dirty="0">
-                <a:latin typeface="Arial" panose="020B0604020202020204" pitchFamily="34" charset="0"/>
-                <a:cs typeface="Arial" panose="020B0604020202020204" pitchFamily="34" charset="0"/>
-              </a:rPr>
-              <a:t>ML5.js</a:t>
-            </a:r>
-          </a:p>
-          <a:p>
-            <a:r>
-              <a:rPr lang="en-US" dirty="0" err="1">
-                <a:latin typeface="Arial" panose="020B0604020202020204" pitchFamily="34" charset="0"/>
-                <a:cs typeface="Arial" panose="020B0604020202020204" pitchFamily="34" charset="0"/>
-              </a:rPr>
-              <a:t>WebDNN</a:t>
-            </a:r>
-            <a:endParaRPr lang="en-US" dirty="0">
-              <a:latin typeface="Arial" panose="020B0604020202020204" pitchFamily="34" charset="0"/>
-              <a:cs typeface="Arial" panose="020B0604020202020204" pitchFamily="34" charset="0"/>
-            </a:endParaRPr>
-          </a:p>
-          <a:p>
-            <a:r>
-              <a:rPr lang="en-US" dirty="0">
-                <a:latin typeface="Arial" panose="020B0604020202020204" pitchFamily="34" charset="0"/>
-                <a:cs typeface="Arial" panose="020B0604020202020204" pitchFamily="34" charset="0"/>
-              </a:rPr>
-              <a:t>Synaptic</a:t>
-            </a:r>
-            <a:endParaRPr lang="bg-BG" dirty="0">
-              <a:latin typeface="Arial" panose="020B0604020202020204" pitchFamily="34" charset="0"/>
-              <a:cs typeface="Arial" panose="020B0604020202020204" pitchFamily="34" charset="0"/>
-            </a:endParaRPr>
-          </a:p>
-        </p:txBody>
-      </p:sp>
-      <p:pic>
-        <p:nvPicPr>
-          <p:cNvPr id="5" name="Picture 4" descr="A blue background with white text&#10;&#10;Description automatically generated">
-            <a:extLst>
-              <a:ext uri="{FF2B5EF4-FFF2-40B4-BE49-F238E27FC236}">
-                <a16:creationId xmlns:a16="http://schemas.microsoft.com/office/drawing/2014/main" id="{74FDA99E-4111-05A9-AA31-6ED0D11CDE32}"/>
-              </a:ext>
-            </a:extLst>
-          </p:cNvPr>
-          <p:cNvPicPr>
-            <a:picLocks noChangeAspect="1"/>
-          </p:cNvPicPr>
-          <p:nvPr/>
-        </p:nvPicPr>
-        <p:blipFill>
-          <a:blip r:embed="rId2">
-            <a:extLst>
-              <a:ext uri="{28A0092B-C50C-407E-A947-70E740481C1C}">
-                <a14:useLocalDpi xmlns:a14="http://schemas.microsoft.com/office/drawing/2010/main" val="0"/>
-              </a:ext>
-            </a:extLst>
-          </a:blip>
-          <a:stretch>
-            <a:fillRect/>
-          </a:stretch>
-        </p:blipFill>
-        <p:spPr>
-          <a:xfrm>
-            <a:off x="3687820" y="2603500"/>
-            <a:ext cx="7429844" cy="3714922"/>
-          </a:xfrm>
-          <a:prstGeom prst="roundRect">
-            <a:avLst>
-              <a:gd name="adj" fmla="val 8594"/>
-            </a:avLst>
-          </a:prstGeom>
-          <a:solidFill>
-            <a:srgbClr val="FFFFFF">
-              <a:shade val="85000"/>
-            </a:srgbClr>
-          </a:solidFill>
-          <a:ln>
-            <a:noFill/>
-          </a:ln>
-          <a:effectLst>
-            <a:reflection blurRad="12700" stA="38000" endPos="28000" dist="5000" dir="5400000" sy="-100000" algn="bl" rotWithShape="0"/>
-          </a:effectLst>
-        </p:spPr>
-      </p:pic>
-    </p:spTree>
-    <p:extLst>
-      <p:ext uri="{BB962C8B-B14F-4D97-AF65-F5344CB8AC3E}">
-        <p14:creationId xmlns:p14="http://schemas.microsoft.com/office/powerpoint/2010/main" val="4095087335"/>
-      </p:ext>
-    </p:extLst>
-  </p:cSld>
-  <p:clrMapOvr>
-    <a:masterClrMapping/>
-  </p:clrMapOvr>
-</p:sld>
-</file>
-
 <file path=ppt/slides/slide17.xml><?xml version="1.0" encoding="utf-8"?>
-<p:sld xmlns:a="http://schemas.openxmlformats.org/drawingml/2006/main" xmlns:r="http://schemas.openxmlformats.org/officeDocument/2006/relationships" xmlns:p="http://schemas.openxmlformats.org/presentationml/2006/main">
-  <p:cSld>
-    <p:spTree>
-      <p:nvGrpSpPr>
-        <p:cNvPr id="1" name=""/>
-        <p:cNvGrpSpPr/>
-        <p:nvPr/>
-      </p:nvGrpSpPr>
-      <p:grpSpPr>
-        <a:xfrm>
-          <a:off x="0" y="0"/>
-          <a:ext cx="0" cy="0"/>
-          <a:chOff x="0" y="0"/>
-          <a:chExt cx="0" cy="0"/>
-        </a:xfrm>
-      </p:grpSpPr>
-      <p:sp>
-        <p:nvSpPr>
-          <p:cNvPr id="2" name="Title 1">
-            <a:extLst>
-              <a:ext uri="{FF2B5EF4-FFF2-40B4-BE49-F238E27FC236}">
-                <a16:creationId xmlns:a16="http://schemas.microsoft.com/office/drawing/2014/main" id="{CAC7A9C8-5636-6B51-C43C-FA1BF509E82F}"/>
-              </a:ext>
-            </a:extLst>
-          </p:cNvPr>
-          <p:cNvSpPr>
-            <a:spLocks noGrp="1"/>
-          </p:cNvSpPr>
-          <p:nvPr>
-            <p:ph type="title"/>
-          </p:nvPr>
-        </p:nvSpPr>
-        <p:spPr/>
-        <p:txBody>
-          <a:bodyPr/>
-          <a:lstStyle/>
-          <a:p>
-            <a:pPr algn="ctr"/>
-            <a:r>
-              <a:rPr lang="en-US" dirty="0">
-                <a:latin typeface="Arial" panose="020B0604020202020204" pitchFamily="34" charset="0"/>
-                <a:cs typeface="Arial" panose="020B0604020202020204" pitchFamily="34" charset="0"/>
-              </a:rPr>
-              <a:t>JavaScript in robotics</a:t>
-            </a:r>
-            <a:endParaRPr lang="bg-BG" dirty="0">
-              <a:latin typeface="Arial" panose="020B0604020202020204" pitchFamily="34" charset="0"/>
-              <a:cs typeface="Arial" panose="020B0604020202020204" pitchFamily="34" charset="0"/>
-            </a:endParaRPr>
-          </a:p>
-        </p:txBody>
-      </p:sp>
-      <p:sp>
-        <p:nvSpPr>
-          <p:cNvPr id="6" name="Content Placeholder 2">
-            <a:extLst>
-              <a:ext uri="{FF2B5EF4-FFF2-40B4-BE49-F238E27FC236}">
-                <a16:creationId xmlns:a16="http://schemas.microsoft.com/office/drawing/2014/main" id="{07960977-AAFC-C83C-9B4B-D5C7DBAF9AF7}"/>
-              </a:ext>
-            </a:extLst>
-          </p:cNvPr>
-          <p:cNvSpPr>
-            <a:spLocks noGrp="1"/>
-          </p:cNvSpPr>
-          <p:nvPr>
-            <p:ph idx="1"/>
-          </p:nvPr>
-        </p:nvSpPr>
-        <p:spPr>
-          <a:xfrm>
-            <a:off x="403655" y="2603500"/>
-            <a:ext cx="5124690" cy="4254500"/>
-          </a:xfrm>
-        </p:spPr>
-        <p:txBody>
-          <a:bodyPr>
-            <a:normAutofit/>
-          </a:bodyPr>
-          <a:lstStyle/>
-          <a:p>
-            <a:r>
-              <a:rPr lang="en-US" sz="2400" b="1" i="0" dirty="0">
-                <a:solidFill>
-                  <a:srgbClr val="282829"/>
-                </a:solidFill>
-                <a:effectLst/>
-                <a:latin typeface="Arial" panose="020B0604020202020204" pitchFamily="34" charset="0"/>
-                <a:cs typeface="Arial" panose="020B0604020202020204" pitchFamily="34" charset="0"/>
-              </a:rPr>
-              <a:t>JavaScript</a:t>
-            </a:r>
-            <a:r>
-              <a:rPr lang="en-US" sz="2400" b="0" i="0" dirty="0">
-                <a:solidFill>
-                  <a:srgbClr val="282829"/>
-                </a:solidFill>
-                <a:effectLst/>
-                <a:latin typeface="Arial" panose="020B0604020202020204" pitchFamily="34" charset="0"/>
-                <a:cs typeface="Arial" panose="020B0604020202020204" pitchFamily="34" charset="0"/>
-              </a:rPr>
-              <a:t> is a versatile programming language that is widely used for web development, but it can also be used for other applications, including robotics. </a:t>
-            </a:r>
-          </a:p>
-          <a:p>
-            <a:r>
-              <a:rPr lang="en-US" sz="2400" b="0" i="0" dirty="0">
-                <a:solidFill>
-                  <a:srgbClr val="282829"/>
-                </a:solidFill>
-                <a:effectLst/>
-                <a:latin typeface="Arial" panose="020B0604020202020204" pitchFamily="34" charset="0"/>
-                <a:cs typeface="Arial" panose="020B0604020202020204" pitchFamily="34" charset="0"/>
-              </a:rPr>
-              <a:t>In fact, there are several </a:t>
-            </a:r>
-            <a:r>
-              <a:rPr lang="en-US" sz="2400" b="1" i="0" dirty="0">
-                <a:solidFill>
-                  <a:srgbClr val="282829"/>
-                </a:solidFill>
-                <a:effectLst/>
-                <a:latin typeface="Arial" panose="020B0604020202020204" pitchFamily="34" charset="0"/>
-                <a:cs typeface="Arial" panose="020B0604020202020204" pitchFamily="34" charset="0"/>
-              </a:rPr>
-              <a:t>JavaScript</a:t>
-            </a:r>
-            <a:r>
-              <a:rPr lang="en-US" sz="2400" b="0" i="0" dirty="0">
-                <a:solidFill>
-                  <a:srgbClr val="282829"/>
-                </a:solidFill>
-                <a:effectLst/>
-                <a:latin typeface="Arial" panose="020B0604020202020204" pitchFamily="34" charset="0"/>
-                <a:cs typeface="Arial" panose="020B0604020202020204" pitchFamily="34" charset="0"/>
-              </a:rPr>
-              <a:t> libraries and frameworks available that are specifically designed for robot programming.</a:t>
-            </a:r>
-            <a:endParaRPr lang="en-US" sz="2400" dirty="0">
-              <a:latin typeface="Arial" panose="020B0604020202020204" pitchFamily="34" charset="0"/>
-              <a:cs typeface="Arial" panose="020B0604020202020204" pitchFamily="34" charset="0"/>
-            </a:endParaRPr>
-          </a:p>
-        </p:txBody>
-      </p:sp>
-      <p:pic>
-        <p:nvPicPr>
-          <p:cNvPr id="8" name="Picture 7" descr="A computer screen with a white square on it&#10;&#10;Description automatically generated">
-            <a:extLst>
-              <a:ext uri="{FF2B5EF4-FFF2-40B4-BE49-F238E27FC236}">
-                <a16:creationId xmlns:a16="http://schemas.microsoft.com/office/drawing/2014/main" id="{92DA65D8-7128-7016-C166-BC7F502C6B08}"/>
-              </a:ext>
-            </a:extLst>
-          </p:cNvPr>
-          <p:cNvPicPr>
-            <a:picLocks noChangeAspect="1"/>
-          </p:cNvPicPr>
-          <p:nvPr/>
-        </p:nvPicPr>
-        <p:blipFill>
-          <a:blip r:embed="rId2">
-            <a:extLst>
-              <a:ext uri="{28A0092B-C50C-407E-A947-70E740481C1C}">
-                <a14:useLocalDpi xmlns:a14="http://schemas.microsoft.com/office/drawing/2010/main" val="0"/>
-              </a:ext>
-            </a:extLst>
-          </a:blip>
-          <a:stretch>
-            <a:fillRect/>
-          </a:stretch>
-        </p:blipFill>
-        <p:spPr>
-          <a:xfrm>
-            <a:off x="5420194" y="2444109"/>
-            <a:ext cx="6248093" cy="2548279"/>
-          </a:xfrm>
-          <a:prstGeom prst="rect">
-            <a:avLst/>
-          </a:prstGeom>
-        </p:spPr>
-      </p:pic>
-      <p:pic>
-        <p:nvPicPr>
-          <p:cNvPr id="11" name="Picture 10" descr="A black helmet with white text&#10;&#10;Description automatically generated">
-            <a:extLst>
-              <a:ext uri="{FF2B5EF4-FFF2-40B4-BE49-F238E27FC236}">
-                <a16:creationId xmlns:a16="http://schemas.microsoft.com/office/drawing/2014/main" id="{45EFA4CB-5CB8-4DFC-0450-2250B812591E}"/>
-              </a:ext>
-            </a:extLst>
-          </p:cNvPr>
-          <p:cNvPicPr>
-            <a:picLocks noChangeAspect="1"/>
-          </p:cNvPicPr>
-          <p:nvPr/>
-        </p:nvPicPr>
-        <p:blipFill>
-          <a:blip r:embed="rId3">
-            <a:extLst>
-              <a:ext uri="{28A0092B-C50C-407E-A947-70E740481C1C}">
-                <a14:useLocalDpi xmlns:a14="http://schemas.microsoft.com/office/drawing/2010/main" val="0"/>
-              </a:ext>
-            </a:extLst>
-          </a:blip>
-          <a:stretch>
-            <a:fillRect/>
-          </a:stretch>
-        </p:blipFill>
-        <p:spPr>
-          <a:xfrm>
-            <a:off x="8386860" y="5116216"/>
-            <a:ext cx="1529507" cy="1777347"/>
-          </a:xfrm>
-          <a:prstGeom prst="rect">
-            <a:avLst/>
-          </a:prstGeom>
-        </p:spPr>
-      </p:pic>
-      <p:pic>
-        <p:nvPicPr>
-          <p:cNvPr id="14" name="Picture 13" descr="A robot with a yellow circle and text&#10;&#10;Description automatically generated">
-            <a:extLst>
-              <a:ext uri="{FF2B5EF4-FFF2-40B4-BE49-F238E27FC236}">
-                <a16:creationId xmlns:a16="http://schemas.microsoft.com/office/drawing/2014/main" id="{8B7C3928-4521-81E6-EC55-152DAB27A961}"/>
-              </a:ext>
-            </a:extLst>
-          </p:cNvPr>
-          <p:cNvPicPr>
-            <a:picLocks noChangeAspect="1"/>
-          </p:cNvPicPr>
-          <p:nvPr/>
-        </p:nvPicPr>
-        <p:blipFill>
-          <a:blip r:embed="rId4">
-            <a:extLst>
-              <a:ext uri="{28A0092B-C50C-407E-A947-70E740481C1C}">
-                <a14:useLocalDpi xmlns:a14="http://schemas.microsoft.com/office/drawing/2010/main" val="0"/>
-              </a:ext>
-            </a:extLst>
-          </a:blip>
-          <a:stretch>
-            <a:fillRect/>
-          </a:stretch>
-        </p:blipFill>
-        <p:spPr>
-          <a:xfrm>
-            <a:off x="6809064" y="5282849"/>
-            <a:ext cx="1444081" cy="1444081"/>
-          </a:xfrm>
-          <a:prstGeom prst="rect">
-            <a:avLst/>
-          </a:prstGeom>
-        </p:spPr>
-      </p:pic>
-    </p:spTree>
-    <p:extLst>
-      <p:ext uri="{BB962C8B-B14F-4D97-AF65-F5344CB8AC3E}">
-        <p14:creationId xmlns:p14="http://schemas.microsoft.com/office/powerpoint/2010/main" val="3083488913"/>
-      </p:ext>
-    </p:extLst>
-  </p:cSld>
-  <p:clrMapOvr>
-    <a:masterClrMapping/>
-  </p:clrMapOvr>
-</p:sld>
-</file>
-
-<file path=ppt/slides/slide18.xml><?xml version="1.0" encoding="utf-8"?>
 <p:sld xmlns:a="http://schemas.openxmlformats.org/drawingml/2006/main" xmlns:r="http://schemas.openxmlformats.org/officeDocument/2006/relationships" xmlns:p="http://schemas.openxmlformats.org/presentationml/2006/main">
   <p:cSld>
     <p:spTree>
@@ -16085,6 +16241,493 @@
 </p:sld>
 </file>
 
+<file path=ppt/slides/slide18.xml><?xml version="1.0" encoding="utf-8"?>
+<p:sld xmlns:a="http://schemas.openxmlformats.org/drawingml/2006/main" xmlns:r="http://schemas.openxmlformats.org/officeDocument/2006/relationships" xmlns:p="http://schemas.openxmlformats.org/presentationml/2006/main">
+  <p:cSld>
+    <p:spTree>
+      <p:nvGrpSpPr>
+        <p:cNvPr id="1" name=""/>
+        <p:cNvGrpSpPr/>
+        <p:nvPr/>
+      </p:nvGrpSpPr>
+      <p:grpSpPr>
+        <a:xfrm>
+          <a:off x="0" y="0"/>
+          <a:ext cx="0" cy="0"/>
+          <a:chOff x="0" y="0"/>
+          <a:chExt cx="0" cy="0"/>
+        </a:xfrm>
+      </p:grpSpPr>
+      <p:sp>
+        <p:nvSpPr>
+          <p:cNvPr id="2" name="Title 1">
+            <a:extLst>
+              <a:ext uri="{FF2B5EF4-FFF2-40B4-BE49-F238E27FC236}">
+                <a16:creationId xmlns:a16="http://schemas.microsoft.com/office/drawing/2014/main" id="{24FE2DF1-9B8F-6184-2517-9319896A8520}"/>
+              </a:ext>
+            </a:extLst>
+          </p:cNvPr>
+          <p:cNvSpPr>
+            <a:spLocks noGrp="1"/>
+          </p:cNvSpPr>
+          <p:nvPr>
+            <p:ph type="title"/>
+          </p:nvPr>
+        </p:nvSpPr>
+        <p:spPr>
+          <a:xfrm>
+            <a:off x="1546840" y="863136"/>
+            <a:ext cx="8761413" cy="706964"/>
+          </a:xfrm>
+        </p:spPr>
+        <p:txBody>
+          <a:bodyPr/>
+          <a:lstStyle/>
+          <a:p>
+            <a:pPr algn="ctr"/>
+            <a:r>
+              <a:rPr lang="en-US" dirty="0"/>
+              <a:t>JavaScript in Machine Learning</a:t>
+            </a:r>
+            <a:endParaRPr lang="bg-BG" dirty="0"/>
+          </a:p>
+        </p:txBody>
+      </p:sp>
+      <p:sp>
+        <p:nvSpPr>
+          <p:cNvPr id="3" name="Content Placeholder 2">
+            <a:extLst>
+              <a:ext uri="{FF2B5EF4-FFF2-40B4-BE49-F238E27FC236}">
+                <a16:creationId xmlns:a16="http://schemas.microsoft.com/office/drawing/2014/main" id="{34265987-89CE-FB02-4E37-6D9DC7100BFE}"/>
+              </a:ext>
+            </a:extLst>
+          </p:cNvPr>
+          <p:cNvSpPr>
+            <a:spLocks noGrp="1"/>
+          </p:cNvSpPr>
+          <p:nvPr>
+            <p:ph idx="1"/>
+          </p:nvPr>
+        </p:nvSpPr>
+        <p:spPr>
+          <a:xfrm>
+            <a:off x="1154955" y="2603500"/>
+            <a:ext cx="2313176" cy="3714922"/>
+          </a:xfrm>
+        </p:spPr>
+        <p:txBody>
+          <a:bodyPr/>
+          <a:lstStyle/>
+          <a:p>
+            <a:r>
+              <a:rPr lang="en-US" dirty="0">
+                <a:latin typeface="Arial" panose="020B0604020202020204" pitchFamily="34" charset="0"/>
+                <a:cs typeface="Arial" panose="020B0604020202020204" pitchFamily="34" charset="0"/>
+              </a:rPr>
+              <a:t>TensorFlow.js</a:t>
+            </a:r>
+          </a:p>
+          <a:p>
+            <a:r>
+              <a:rPr lang="en-US" dirty="0">
+                <a:latin typeface="Arial" panose="020B0604020202020204" pitchFamily="34" charset="0"/>
+                <a:cs typeface="Arial" panose="020B0604020202020204" pitchFamily="34" charset="0"/>
+              </a:rPr>
+              <a:t>ML.js</a:t>
+            </a:r>
+          </a:p>
+          <a:p>
+            <a:r>
+              <a:rPr lang="en-US" dirty="0">
+                <a:latin typeface="Arial" panose="020B0604020202020204" pitchFamily="34" charset="0"/>
+                <a:cs typeface="Arial" panose="020B0604020202020204" pitchFamily="34" charset="0"/>
+              </a:rPr>
+              <a:t>Neuro.js</a:t>
+            </a:r>
+          </a:p>
+          <a:p>
+            <a:r>
+              <a:rPr lang="en-US" dirty="0">
+                <a:latin typeface="Arial" panose="020B0604020202020204" pitchFamily="34" charset="0"/>
+                <a:cs typeface="Arial" panose="020B0604020202020204" pitchFamily="34" charset="0"/>
+              </a:rPr>
+              <a:t>Brain.js</a:t>
+            </a:r>
+          </a:p>
+          <a:p>
+            <a:r>
+              <a:rPr lang="en-US" dirty="0">
+                <a:latin typeface="Arial" panose="020B0604020202020204" pitchFamily="34" charset="0"/>
+                <a:cs typeface="Arial" panose="020B0604020202020204" pitchFamily="34" charset="0"/>
+              </a:rPr>
+              <a:t>OpenCV.js</a:t>
+            </a:r>
+          </a:p>
+          <a:p>
+            <a:r>
+              <a:rPr lang="en-US" dirty="0">
+                <a:latin typeface="Arial" panose="020B0604020202020204" pitchFamily="34" charset="0"/>
+                <a:cs typeface="Arial" panose="020B0604020202020204" pitchFamily="34" charset="0"/>
+              </a:rPr>
+              <a:t>ML5.js</a:t>
+            </a:r>
+          </a:p>
+          <a:p>
+            <a:r>
+              <a:rPr lang="en-US" dirty="0" err="1">
+                <a:latin typeface="Arial" panose="020B0604020202020204" pitchFamily="34" charset="0"/>
+                <a:cs typeface="Arial" panose="020B0604020202020204" pitchFamily="34" charset="0"/>
+              </a:rPr>
+              <a:t>WebDNN</a:t>
+            </a:r>
+            <a:endParaRPr lang="en-US" dirty="0">
+              <a:latin typeface="Arial" panose="020B0604020202020204" pitchFamily="34" charset="0"/>
+              <a:cs typeface="Arial" panose="020B0604020202020204" pitchFamily="34" charset="0"/>
+            </a:endParaRPr>
+          </a:p>
+          <a:p>
+            <a:r>
+              <a:rPr lang="en-US" dirty="0">
+                <a:latin typeface="Arial" panose="020B0604020202020204" pitchFamily="34" charset="0"/>
+                <a:cs typeface="Arial" panose="020B0604020202020204" pitchFamily="34" charset="0"/>
+              </a:rPr>
+              <a:t>Synaptic</a:t>
+            </a:r>
+            <a:endParaRPr lang="bg-BG" dirty="0">
+              <a:latin typeface="Arial" panose="020B0604020202020204" pitchFamily="34" charset="0"/>
+              <a:cs typeface="Arial" panose="020B0604020202020204" pitchFamily="34" charset="0"/>
+            </a:endParaRPr>
+          </a:p>
+        </p:txBody>
+      </p:sp>
+      <p:pic>
+        <p:nvPicPr>
+          <p:cNvPr id="5" name="Picture 4" descr="A blue background with white text&#10;&#10;Description automatically generated">
+            <a:extLst>
+              <a:ext uri="{FF2B5EF4-FFF2-40B4-BE49-F238E27FC236}">
+                <a16:creationId xmlns:a16="http://schemas.microsoft.com/office/drawing/2014/main" id="{74FDA99E-4111-05A9-AA31-6ED0D11CDE32}"/>
+              </a:ext>
+            </a:extLst>
+          </p:cNvPr>
+          <p:cNvPicPr>
+            <a:picLocks noChangeAspect="1"/>
+          </p:cNvPicPr>
+          <p:nvPr/>
+        </p:nvPicPr>
+        <p:blipFill>
+          <a:blip r:embed="rId2">
+            <a:extLst>
+              <a:ext uri="{28A0092B-C50C-407E-A947-70E740481C1C}">
+                <a14:useLocalDpi xmlns:a14="http://schemas.microsoft.com/office/drawing/2010/main" val="0"/>
+              </a:ext>
+            </a:extLst>
+          </a:blip>
+          <a:stretch>
+            <a:fillRect/>
+          </a:stretch>
+        </p:blipFill>
+        <p:spPr>
+          <a:xfrm>
+            <a:off x="3687820" y="2603500"/>
+            <a:ext cx="7429844" cy="3714922"/>
+          </a:xfrm>
+          <a:prstGeom prst="roundRect">
+            <a:avLst>
+              <a:gd name="adj" fmla="val 8594"/>
+            </a:avLst>
+          </a:prstGeom>
+          <a:solidFill>
+            <a:srgbClr val="FFFFFF">
+              <a:shade val="85000"/>
+            </a:srgbClr>
+          </a:solidFill>
+          <a:ln>
+            <a:noFill/>
+          </a:ln>
+          <a:effectLst>
+            <a:reflection blurRad="12700" stA="38000" endPos="28000" dist="5000" dir="5400000" sy="-100000" algn="bl" rotWithShape="0"/>
+          </a:effectLst>
+        </p:spPr>
+      </p:pic>
+    </p:spTree>
+    <p:extLst>
+      <p:ext uri="{BB962C8B-B14F-4D97-AF65-F5344CB8AC3E}">
+        <p14:creationId xmlns:p14="http://schemas.microsoft.com/office/powerpoint/2010/main" val="4095087335"/>
+      </p:ext>
+    </p:extLst>
+  </p:cSld>
+  <p:clrMapOvr>
+    <a:masterClrMapping/>
+  </p:clrMapOvr>
+</p:sld>
+</file>
+
+<file path=ppt/slides/slide19.xml><?xml version="1.0" encoding="utf-8"?>
+<p:sld xmlns:a="http://schemas.openxmlformats.org/drawingml/2006/main" xmlns:r="http://schemas.openxmlformats.org/officeDocument/2006/relationships" xmlns:p="http://schemas.openxmlformats.org/presentationml/2006/main">
+  <p:cSld>
+    <p:spTree>
+      <p:nvGrpSpPr>
+        <p:cNvPr id="1" name=""/>
+        <p:cNvGrpSpPr/>
+        <p:nvPr/>
+      </p:nvGrpSpPr>
+      <p:grpSpPr>
+        <a:xfrm>
+          <a:off x="0" y="0"/>
+          <a:ext cx="0" cy="0"/>
+          <a:chOff x="0" y="0"/>
+          <a:chExt cx="0" cy="0"/>
+        </a:xfrm>
+      </p:grpSpPr>
+      <p:sp>
+        <p:nvSpPr>
+          <p:cNvPr id="2" name="Title 1">
+            <a:extLst>
+              <a:ext uri="{FF2B5EF4-FFF2-40B4-BE49-F238E27FC236}">
+                <a16:creationId xmlns:a16="http://schemas.microsoft.com/office/drawing/2014/main" id="{CAC7A9C8-5636-6B51-C43C-FA1BF509E82F}"/>
+              </a:ext>
+            </a:extLst>
+          </p:cNvPr>
+          <p:cNvSpPr>
+            <a:spLocks noGrp="1"/>
+          </p:cNvSpPr>
+          <p:nvPr>
+            <p:ph type="title"/>
+          </p:nvPr>
+        </p:nvSpPr>
+        <p:spPr/>
+        <p:txBody>
+          <a:bodyPr/>
+          <a:lstStyle/>
+          <a:p>
+            <a:pPr algn="ctr"/>
+            <a:r>
+              <a:rPr lang="en-US" dirty="0">
+                <a:latin typeface="Arial" panose="020B0604020202020204" pitchFamily="34" charset="0"/>
+                <a:cs typeface="Arial" panose="020B0604020202020204" pitchFamily="34" charset="0"/>
+              </a:rPr>
+              <a:t>JavaScript in robotics</a:t>
+            </a:r>
+            <a:endParaRPr lang="bg-BG" dirty="0">
+              <a:latin typeface="Arial" panose="020B0604020202020204" pitchFamily="34" charset="0"/>
+              <a:cs typeface="Arial" panose="020B0604020202020204" pitchFamily="34" charset="0"/>
+            </a:endParaRPr>
+          </a:p>
+        </p:txBody>
+      </p:sp>
+      <p:sp>
+        <p:nvSpPr>
+          <p:cNvPr id="6" name="Content Placeholder 2">
+            <a:extLst>
+              <a:ext uri="{FF2B5EF4-FFF2-40B4-BE49-F238E27FC236}">
+                <a16:creationId xmlns:a16="http://schemas.microsoft.com/office/drawing/2014/main" id="{07960977-AAFC-C83C-9B4B-D5C7DBAF9AF7}"/>
+              </a:ext>
+            </a:extLst>
+          </p:cNvPr>
+          <p:cNvSpPr>
+            <a:spLocks noGrp="1"/>
+          </p:cNvSpPr>
+          <p:nvPr>
+            <p:ph idx="1"/>
+          </p:nvPr>
+        </p:nvSpPr>
+        <p:spPr>
+          <a:xfrm>
+            <a:off x="403655" y="2603500"/>
+            <a:ext cx="5124690" cy="4254500"/>
+          </a:xfrm>
+        </p:spPr>
+        <p:txBody>
+          <a:bodyPr>
+            <a:normAutofit/>
+          </a:bodyPr>
+          <a:lstStyle/>
+          <a:p>
+            <a:r>
+              <a:rPr lang="en-US" sz="2400" b="1" i="0" dirty="0">
+                <a:solidFill>
+                  <a:srgbClr val="282829"/>
+                </a:solidFill>
+                <a:effectLst/>
+                <a:latin typeface="Arial" panose="020B0604020202020204" pitchFamily="34" charset="0"/>
+                <a:cs typeface="Arial" panose="020B0604020202020204" pitchFamily="34" charset="0"/>
+              </a:rPr>
+              <a:t>JavaScript</a:t>
+            </a:r>
+            <a:r>
+              <a:rPr lang="en-US" sz="2400" b="0" i="0" dirty="0">
+                <a:solidFill>
+                  <a:srgbClr val="282829"/>
+                </a:solidFill>
+                <a:effectLst/>
+                <a:latin typeface="Arial" panose="020B0604020202020204" pitchFamily="34" charset="0"/>
+                <a:cs typeface="Arial" panose="020B0604020202020204" pitchFamily="34" charset="0"/>
+              </a:rPr>
+              <a:t> is a versatile programming language that is widely used for web development, but it can also be used for other applications, including robotics. </a:t>
+            </a:r>
+          </a:p>
+          <a:p>
+            <a:r>
+              <a:rPr lang="en-US" sz="2400" b="0" i="0" dirty="0">
+                <a:solidFill>
+                  <a:srgbClr val="282829"/>
+                </a:solidFill>
+                <a:effectLst/>
+                <a:latin typeface="Arial" panose="020B0604020202020204" pitchFamily="34" charset="0"/>
+                <a:cs typeface="Arial" panose="020B0604020202020204" pitchFamily="34" charset="0"/>
+              </a:rPr>
+              <a:t>In fact, there are several </a:t>
+            </a:r>
+            <a:r>
+              <a:rPr lang="en-US" sz="2400" b="1" i="0" dirty="0">
+                <a:solidFill>
+                  <a:srgbClr val="282829"/>
+                </a:solidFill>
+                <a:effectLst/>
+                <a:latin typeface="Arial" panose="020B0604020202020204" pitchFamily="34" charset="0"/>
+                <a:cs typeface="Arial" panose="020B0604020202020204" pitchFamily="34" charset="0"/>
+              </a:rPr>
+              <a:t>JavaScript</a:t>
+            </a:r>
+            <a:r>
+              <a:rPr lang="en-US" sz="2400" b="0" i="0" dirty="0">
+                <a:solidFill>
+                  <a:srgbClr val="282829"/>
+                </a:solidFill>
+                <a:effectLst/>
+                <a:latin typeface="Arial" panose="020B0604020202020204" pitchFamily="34" charset="0"/>
+                <a:cs typeface="Arial" panose="020B0604020202020204" pitchFamily="34" charset="0"/>
+              </a:rPr>
+              <a:t> libraries and frameworks available that are specifically designed for robot programming.</a:t>
+            </a:r>
+            <a:endParaRPr lang="en-US" sz="2400" dirty="0">
+              <a:latin typeface="Arial" panose="020B0604020202020204" pitchFamily="34" charset="0"/>
+              <a:cs typeface="Arial" panose="020B0604020202020204" pitchFamily="34" charset="0"/>
+            </a:endParaRPr>
+          </a:p>
+        </p:txBody>
+      </p:sp>
+      <p:pic>
+        <p:nvPicPr>
+          <p:cNvPr id="8" name="Picture 7" descr="A computer screen with a white square on it&#10;&#10;Description automatically generated">
+            <a:extLst>
+              <a:ext uri="{FF2B5EF4-FFF2-40B4-BE49-F238E27FC236}">
+                <a16:creationId xmlns:a16="http://schemas.microsoft.com/office/drawing/2014/main" id="{92DA65D8-7128-7016-C166-BC7F502C6B08}"/>
+              </a:ext>
+            </a:extLst>
+          </p:cNvPr>
+          <p:cNvPicPr>
+            <a:picLocks noChangeAspect="1"/>
+          </p:cNvPicPr>
+          <p:nvPr/>
+        </p:nvPicPr>
+        <p:blipFill>
+          <a:blip r:embed="rId2">
+            <a:extLst>
+              <a:ext uri="{28A0092B-C50C-407E-A947-70E740481C1C}">
+                <a14:useLocalDpi xmlns:a14="http://schemas.microsoft.com/office/drawing/2010/main" val="0"/>
+              </a:ext>
+            </a:extLst>
+          </a:blip>
+          <a:stretch>
+            <a:fillRect/>
+          </a:stretch>
+        </p:blipFill>
+        <p:spPr>
+          <a:xfrm>
+            <a:off x="5420194" y="2444109"/>
+            <a:ext cx="6248093" cy="2548279"/>
+          </a:xfrm>
+          <a:prstGeom prst="rect">
+            <a:avLst/>
+          </a:prstGeom>
+        </p:spPr>
+      </p:pic>
+      <p:pic>
+        <p:nvPicPr>
+          <p:cNvPr id="11" name="Picture 10" descr="A black helmet with white text&#10;&#10;Description automatically generated">
+            <a:extLst>
+              <a:ext uri="{FF2B5EF4-FFF2-40B4-BE49-F238E27FC236}">
+                <a16:creationId xmlns:a16="http://schemas.microsoft.com/office/drawing/2014/main" id="{45EFA4CB-5CB8-4DFC-0450-2250B812591E}"/>
+              </a:ext>
+            </a:extLst>
+          </p:cNvPr>
+          <p:cNvPicPr>
+            <a:picLocks noChangeAspect="1"/>
+          </p:cNvPicPr>
+          <p:nvPr/>
+        </p:nvPicPr>
+        <p:blipFill>
+          <a:blip r:embed="rId3">
+            <a:extLst>
+              <a:ext uri="{28A0092B-C50C-407E-A947-70E740481C1C}">
+                <a14:useLocalDpi xmlns:a14="http://schemas.microsoft.com/office/drawing/2010/main" val="0"/>
+              </a:ext>
+            </a:extLst>
+          </a:blip>
+          <a:stretch>
+            <a:fillRect/>
+          </a:stretch>
+        </p:blipFill>
+        <p:spPr>
+          <a:xfrm>
+            <a:off x="8386860" y="5116216"/>
+            <a:ext cx="1529507" cy="1777347"/>
+          </a:xfrm>
+          <a:prstGeom prst="rect">
+            <a:avLst/>
+          </a:prstGeom>
+        </p:spPr>
+      </p:pic>
+      <p:pic>
+        <p:nvPicPr>
+          <p:cNvPr id="14" name="Picture 13" descr="A robot with a yellow circle and text&#10;&#10;Description automatically generated">
+            <a:extLst>
+              <a:ext uri="{FF2B5EF4-FFF2-40B4-BE49-F238E27FC236}">
+                <a16:creationId xmlns:a16="http://schemas.microsoft.com/office/drawing/2014/main" id="{8B7C3928-4521-81E6-EC55-152DAB27A961}"/>
+              </a:ext>
+            </a:extLst>
+          </p:cNvPr>
+          <p:cNvPicPr>
+            <a:picLocks noChangeAspect="1"/>
+          </p:cNvPicPr>
+          <p:nvPr/>
+        </p:nvPicPr>
+        <p:blipFill>
+          <a:blip r:embed="rId4">
+            <a:extLst>
+              <a:ext uri="{28A0092B-C50C-407E-A947-70E740481C1C}">
+                <a14:useLocalDpi xmlns:a14="http://schemas.microsoft.com/office/drawing/2010/main" val="0"/>
+              </a:ext>
+            </a:extLst>
+          </a:blip>
+          <a:stretch>
+            <a:fillRect/>
+          </a:stretch>
+        </p:blipFill>
+        <p:spPr>
+          <a:xfrm>
+            <a:off x="6809064" y="5282849"/>
+            <a:ext cx="1444081" cy="1444081"/>
+          </a:xfrm>
+          <a:prstGeom prst="rect">
+            <a:avLst/>
+          </a:prstGeom>
+        </p:spPr>
+      </p:pic>
+    </p:spTree>
+    <p:extLst>
+      <p:ext uri="{BB962C8B-B14F-4D97-AF65-F5344CB8AC3E}">
+        <p14:creationId xmlns:p14="http://schemas.microsoft.com/office/powerpoint/2010/main" val="3083488913"/>
+      </p:ext>
+    </p:extLst>
+  </p:cSld>
+  <p:clrMapOvr>
+    <a:masterClrMapping/>
+  </p:clrMapOvr>
+</p:sld>
+</file>
+
 <file path=ppt/slides/slide2.xml><?xml version="1.0" encoding="utf-8"?>
 <p:sld xmlns:a="http://schemas.openxmlformats.org/drawingml/2006/main" xmlns:r="http://schemas.openxmlformats.org/officeDocument/2006/relationships" xmlns:p="http://schemas.openxmlformats.org/presentationml/2006/main">
   <p:cSld>
@@ -16156,8 +16799,8 @@
         </p:nvSpPr>
         <p:spPr>
           <a:xfrm>
-            <a:off x="413550" y="2521122"/>
-            <a:ext cx="7371207" cy="3904392"/>
+            <a:off x="413551" y="2521122"/>
+            <a:ext cx="5682450" cy="3904392"/>
           </a:xfrm>
         </p:spPr>
         <p:txBody>
@@ -16357,91 +17000,6 @@
               </a:rPr>
               <a:t> which is the official specification of the language.</a:t>
             </a:r>
-          </a:p>
-          <a:p>
-            <a:r>
-              <a:rPr lang="en-US" dirty="0">
-                <a:latin typeface="Arial" panose="020B0604020202020204" pitchFamily="34" charset="0"/>
-                <a:cs typeface="Arial" panose="020B0604020202020204" pitchFamily="34" charset="0"/>
-              </a:rPr>
-              <a:t>During 1997- 2000 widely popular is dynamic </a:t>
-            </a:r>
-            <a:r>
-              <a:rPr lang="en-US" b="1" dirty="0">
-                <a:latin typeface="Arial" panose="020B0604020202020204" pitchFamily="34" charset="0"/>
-                <a:cs typeface="Arial" panose="020B0604020202020204" pitchFamily="34" charset="0"/>
-              </a:rPr>
-              <a:t>HTML</a:t>
-            </a:r>
-            <a:r>
-              <a:rPr lang="en-US" dirty="0">
-                <a:latin typeface="Arial" panose="020B0604020202020204" pitchFamily="34" charset="0"/>
-                <a:cs typeface="Arial" panose="020B0604020202020204" pitchFamily="34" charset="0"/>
-              </a:rPr>
-              <a:t> or </a:t>
-            </a:r>
-            <a:r>
-              <a:rPr lang="en-US" b="1" dirty="0">
-                <a:latin typeface="Arial" panose="020B0604020202020204" pitchFamily="34" charset="0"/>
-                <a:cs typeface="Arial" panose="020B0604020202020204" pitchFamily="34" charset="0"/>
-              </a:rPr>
-              <a:t>DHTML</a:t>
-            </a:r>
-            <a:r>
-              <a:rPr lang="en-US" dirty="0">
-                <a:latin typeface="Arial" panose="020B0604020202020204" pitchFamily="34" charset="0"/>
-                <a:cs typeface="Arial" panose="020B0604020202020204" pitchFamily="34" charset="0"/>
-              </a:rPr>
-              <a:t> and </a:t>
-            </a:r>
-            <a:r>
-              <a:rPr lang="en-US" b="1" dirty="0">
-                <a:latin typeface="Arial" panose="020B0604020202020204" pitchFamily="34" charset="0"/>
-                <a:cs typeface="Arial" panose="020B0604020202020204" pitchFamily="34" charset="0"/>
-              </a:rPr>
-              <a:t>JavaScript</a:t>
-            </a:r>
-            <a:r>
-              <a:rPr lang="en-US" dirty="0">
-                <a:latin typeface="Arial" panose="020B0604020202020204" pitchFamily="34" charset="0"/>
-                <a:cs typeface="Arial" panose="020B0604020202020204" pitchFamily="34" charset="0"/>
-              </a:rPr>
-              <a:t> played a crucial role in manipulating of </a:t>
-            </a:r>
-            <a:r>
-              <a:rPr lang="en-US" b="1" dirty="0">
-                <a:latin typeface="Arial" panose="020B0604020202020204" pitchFamily="34" charset="0"/>
-                <a:cs typeface="Arial" panose="020B0604020202020204" pitchFamily="34" charset="0"/>
-              </a:rPr>
-              <a:t>DOM</a:t>
-            </a:r>
-            <a:r>
-              <a:rPr lang="en-US" dirty="0">
-                <a:latin typeface="Arial" panose="020B0604020202020204" pitchFamily="34" charset="0"/>
-                <a:cs typeface="Arial" panose="020B0604020202020204" pitchFamily="34" charset="0"/>
-              </a:rPr>
-              <a:t> – </a:t>
-            </a:r>
-            <a:r>
-              <a:rPr lang="en-US" b="1" dirty="0">
-                <a:latin typeface="Arial" panose="020B0604020202020204" pitchFamily="34" charset="0"/>
-                <a:cs typeface="Arial" panose="020B0604020202020204" pitchFamily="34" charset="0"/>
-              </a:rPr>
-              <a:t>Document Object Model</a:t>
-            </a:r>
-            <a:r>
-              <a:rPr lang="en-US" dirty="0">
-                <a:latin typeface="Arial" panose="020B0604020202020204" pitchFamily="34" charset="0"/>
-                <a:cs typeface="Arial" panose="020B0604020202020204" pitchFamily="34" charset="0"/>
-              </a:rPr>
-              <a:t>.</a:t>
-            </a:r>
-          </a:p>
-          <a:p>
-            <a:endParaRPr lang="en-US" dirty="0">
-              <a:latin typeface="Arial" panose="020B0604020202020204" pitchFamily="34" charset="0"/>
-              <a:cs typeface="Arial" panose="020B0604020202020204" pitchFamily="34" charset="0"/>
-            </a:endParaRPr>
           </a:p>
           <a:p>
             <a:endParaRPr lang="en-US" dirty="0">
@@ -16497,8 +17055,8 @@
         </p:blipFill>
         <p:spPr>
           <a:xfrm>
-            <a:off x="8159181" y="2711738"/>
-            <a:ext cx="3619269" cy="2585192"/>
+            <a:off x="6741621" y="2636923"/>
+            <a:ext cx="5036828" cy="3597734"/>
           </a:xfrm>
           <a:prstGeom prst="roundRect">
             <a:avLst>
@@ -18200,7 +18758,7 @@
           <p:cNvPr id="2" name="Title 1">
             <a:extLst>
               <a:ext uri="{FF2B5EF4-FFF2-40B4-BE49-F238E27FC236}">
-                <a16:creationId xmlns:a16="http://schemas.microsoft.com/office/drawing/2014/main" id="{64FFDE61-2F43-D57C-0A9C-EAD211CFFA5B}"/>
+                <a16:creationId xmlns:a16="http://schemas.microsoft.com/office/drawing/2014/main" id="{E3864819-0E1A-0B30-E760-5D20DAAEA125}"/>
               </a:ext>
             </a:extLst>
           </p:cNvPr>
@@ -18211,12 +18769,7 @@
             <p:ph type="title"/>
           </p:nvPr>
         </p:nvSpPr>
-        <p:spPr>
-          <a:xfrm>
-            <a:off x="1527041" y="973668"/>
-            <a:ext cx="8761413" cy="706964"/>
-          </a:xfrm>
-        </p:spPr>
+        <p:spPr/>
         <p:txBody>
           <a:bodyPr/>
           <a:lstStyle/>
@@ -18227,7 +18780,7 @@
                 <a:latin typeface="Arial" panose="020B0604020202020204" pitchFamily="34" charset="0"/>
                 <a:cs typeface="Arial" panose="020B0604020202020204" pitchFamily="34" charset="0"/>
               </a:rPr>
-              <a:t>AJAX</a:t>
+              <a:t>Static website vs Dynamic Website</a:t>
             </a:r>
             <a:endParaRPr lang="bg-BG" dirty="0">
               <a:latin typeface="Arial" panose="020B0604020202020204" pitchFamily="34" charset="0"/>
@@ -18236,160 +18789,24 @@
           </a:p>
         </p:txBody>
       </p:sp>
-      <p:sp>
-        <p:nvSpPr>
-          <p:cNvPr id="3" name="Content Placeholder 2">
+      <p:pic>
+        <p:nvPicPr>
+          <p:cNvPr id="6" name="Content Placeholder 5" descr="A diagram of a computer program&#10;&#10;Description automatically generated">
             <a:extLst>
               <a:ext uri="{FF2B5EF4-FFF2-40B4-BE49-F238E27FC236}">
-                <a16:creationId xmlns:a16="http://schemas.microsoft.com/office/drawing/2014/main" id="{1FC6EDBC-5A27-C528-D4F9-F431F6B69C8D}"/>
-              </a:ext>
-            </a:extLst>
-          </p:cNvPr>
-          <p:cNvSpPr>
-            <a:spLocks noGrp="1"/>
-          </p:cNvSpPr>
-          <p:nvPr>
-            <p:ph idx="1"/>
-          </p:nvPr>
-        </p:nvSpPr>
-        <p:spPr>
-          <a:xfrm>
-            <a:off x="448936" y="2768255"/>
-            <a:ext cx="5302293" cy="4019723"/>
-          </a:xfrm>
-        </p:spPr>
-        <p:txBody>
-          <a:bodyPr>
-            <a:normAutofit/>
-          </a:bodyPr>
-          <a:lstStyle/>
-          <a:p>
-            <a:pPr marL="0" indent="0" algn="ctr">
-              <a:buNone/>
-            </a:pPr>
-            <a:r>
-              <a:rPr lang="en-US" sz="2400" b="0" i="0" dirty="0">
-                <a:solidFill>
-                  <a:srgbClr val="000000"/>
-                </a:solidFill>
-                <a:effectLst/>
-                <a:latin typeface="Arial" panose="020B0604020202020204" pitchFamily="34" charset="0"/>
-                <a:cs typeface="Arial" panose="020B0604020202020204" pitchFamily="34" charset="0"/>
-              </a:rPr>
-              <a:t>AJAX is a developer's dream, because you can:</a:t>
-            </a:r>
-          </a:p>
-          <a:p>
-            <a:r>
-              <a:rPr lang="en-US" b="1" i="1" u="sng" dirty="0">
-                <a:solidFill>
-                  <a:srgbClr val="000000"/>
-                </a:solidFill>
-                <a:effectLst/>
-                <a:latin typeface="Arial" panose="020B0604020202020204" pitchFamily="34" charset="0"/>
-                <a:cs typeface="Arial" panose="020B0604020202020204" pitchFamily="34" charset="0"/>
-              </a:rPr>
-              <a:t>Terminology: </a:t>
-            </a:r>
-            <a:r>
-              <a:rPr lang="en-US" b="0" i="0" dirty="0">
-                <a:solidFill>
-                  <a:srgbClr val="000000"/>
-                </a:solidFill>
-                <a:effectLst/>
-                <a:latin typeface="Arial" panose="020B0604020202020204" pitchFamily="34" charset="0"/>
-                <a:cs typeface="Arial" panose="020B0604020202020204" pitchFamily="34" charset="0"/>
-              </a:rPr>
-              <a:t>It is a combination of programming techniques for requesting of data from server in async </a:t>
-            </a:r>
-            <a:r>
-              <a:rPr lang="en-US" b="0" i="0">
-                <a:solidFill>
-                  <a:srgbClr val="000000"/>
-                </a:solidFill>
-                <a:effectLst/>
-                <a:latin typeface="Arial" panose="020B0604020202020204" pitchFamily="34" charset="0"/>
-                <a:cs typeface="Arial" panose="020B0604020202020204" pitchFamily="34" charset="0"/>
-              </a:rPr>
-              <a:t>way.</a:t>
-            </a:r>
-            <a:endParaRPr lang="en-US" dirty="0">
-              <a:solidFill>
-                <a:srgbClr val="000000"/>
-              </a:solidFill>
-              <a:latin typeface="Arial" panose="020B0604020202020204" pitchFamily="34" charset="0"/>
-              <a:cs typeface="Arial" panose="020B0604020202020204" pitchFamily="34" charset="0"/>
-            </a:endParaRPr>
-          </a:p>
-          <a:p>
-            <a:r>
-              <a:rPr lang="en-US" b="0" i="0" dirty="0">
-                <a:solidFill>
-                  <a:srgbClr val="000000"/>
-                </a:solidFill>
-                <a:effectLst/>
-                <a:latin typeface="Arial" panose="020B0604020202020204" pitchFamily="34" charset="0"/>
-                <a:cs typeface="Arial" panose="020B0604020202020204" pitchFamily="34" charset="0"/>
-              </a:rPr>
-              <a:t>Update a web page without reloading the page</a:t>
-            </a:r>
-          </a:p>
-          <a:p>
-            <a:r>
-              <a:rPr lang="en-US" b="0" i="0" dirty="0">
-                <a:solidFill>
-                  <a:srgbClr val="000000"/>
-                </a:solidFill>
-                <a:effectLst/>
-                <a:latin typeface="Arial" panose="020B0604020202020204" pitchFamily="34" charset="0"/>
-                <a:cs typeface="Arial" panose="020B0604020202020204" pitchFamily="34" charset="0"/>
-              </a:rPr>
-              <a:t>Request data from a server - after the page has loaded</a:t>
-            </a:r>
-          </a:p>
-          <a:p>
-            <a:r>
-              <a:rPr lang="en-US" b="0" i="0" dirty="0">
-                <a:solidFill>
-                  <a:srgbClr val="000000"/>
-                </a:solidFill>
-                <a:effectLst/>
-                <a:latin typeface="Arial" panose="020B0604020202020204" pitchFamily="34" charset="0"/>
-                <a:cs typeface="Arial" panose="020B0604020202020204" pitchFamily="34" charset="0"/>
-              </a:rPr>
-              <a:t>Send data to a server - in the background</a:t>
-            </a:r>
-          </a:p>
-          <a:p>
-            <a:endParaRPr lang="en-US" dirty="0">
-              <a:solidFill>
-                <a:srgbClr val="000000"/>
-              </a:solidFill>
-              <a:latin typeface="Arial" panose="020B0604020202020204" pitchFamily="34" charset="0"/>
-              <a:cs typeface="Arial" panose="020B0604020202020204" pitchFamily="34" charset="0"/>
-            </a:endParaRPr>
-          </a:p>
-          <a:p>
-            <a:endParaRPr lang="bg-BG" dirty="0"/>
-          </a:p>
-        </p:txBody>
-      </p:sp>
-      <p:pic>
-        <p:nvPicPr>
-          <p:cNvPr id="7" name="Picture 6" descr="A blue text with arrows&#10;&#10;Description automatically generated">
-            <a:extLst>
-              <a:ext uri="{FF2B5EF4-FFF2-40B4-BE49-F238E27FC236}">
-                <a16:creationId xmlns:a16="http://schemas.microsoft.com/office/drawing/2014/main" id="{ACE7DFA7-DC47-30B3-79F8-B9134B0FEE66}"/>
+                <a16:creationId xmlns:a16="http://schemas.microsoft.com/office/drawing/2014/main" id="{F6365472-EB8B-9CD3-8C00-90EB57553996}"/>
               </a:ext>
             </a:extLst>
           </p:cNvPr>
           <p:cNvPicPr>
-            <a:picLocks noChangeAspect="1"/>
+            <a:picLocks noGrp="1" noChangeAspect="1"/>
           </p:cNvPicPr>
-          <p:nvPr/>
+          <p:nvPr>
+            <p:ph sz="half" idx="1"/>
+          </p:nvPr>
         </p:nvPicPr>
         <p:blipFill>
-          <a:blip r:embed="rId2">
+          <a:blip r:embed="rId3">
             <a:extLst>
               <a:ext uri="{28A0092B-C50C-407E-A947-70E740481C1C}">
                 <a14:useLocalDpi xmlns:a14="http://schemas.microsoft.com/office/drawing/2010/main" val="0"/>
@@ -18402,50 +18819,17 @@
         </p:blipFill>
         <p:spPr>
           <a:xfrm>
-            <a:off x="6539626" y="3191946"/>
-            <a:ext cx="4891615" cy="3172340"/>
+            <a:off x="773084" y="2603500"/>
+            <a:ext cx="4696691" cy="3625643"/>
           </a:xfrm>
-          <a:prstGeom prst="rect">
-            <a:avLst/>
-          </a:prstGeom>
         </p:spPr>
       </p:pic>
-    </p:spTree>
-    <p:extLst>
-      <p:ext uri="{BB962C8B-B14F-4D97-AF65-F5344CB8AC3E}">
-        <p14:creationId xmlns:p14="http://schemas.microsoft.com/office/powerpoint/2010/main" val="1217792067"/>
-      </p:ext>
-    </p:extLst>
-  </p:cSld>
-  <p:clrMapOvr>
-    <a:masterClrMapping/>
-  </p:clrMapOvr>
-</p:sld>
-</file>
-
-<file path=ppt/slides/slide8.xml><?xml version="1.0" encoding="utf-8"?>
-<p:sld xmlns:a="http://schemas.openxmlformats.org/drawingml/2006/main" xmlns:r="http://schemas.openxmlformats.org/officeDocument/2006/relationships" xmlns:p="http://schemas.openxmlformats.org/presentationml/2006/main">
-  <p:cSld>
-    <p:spTree>
-      <p:nvGrpSpPr>
-        <p:cNvPr id="1" name=""/>
-        <p:cNvGrpSpPr/>
-        <p:nvPr/>
-      </p:nvGrpSpPr>
-      <p:grpSpPr>
-        <a:xfrm>
-          <a:off x="0" y="0"/>
-          <a:ext cx="0" cy="0"/>
-          <a:chOff x="0" y="0"/>
-          <a:chExt cx="0" cy="0"/>
-        </a:xfrm>
-      </p:grpSpPr>
       <p:pic>
         <p:nvPicPr>
-          <p:cNvPr id="6" name="Content Placeholder 5" descr="A diagram of a computer&#10;&#10;Description automatically generated">
+          <p:cNvPr id="8" name="Content Placeholder 7" descr="A diagram of a server&#10;&#10;Description automatically generated">
             <a:extLst>
               <a:ext uri="{FF2B5EF4-FFF2-40B4-BE49-F238E27FC236}">
-                <a16:creationId xmlns:a16="http://schemas.microsoft.com/office/drawing/2014/main" id="{BBF5B8DF-9CB4-54E9-8699-54B9E3E0F255}"/>
+                <a16:creationId xmlns:a16="http://schemas.microsoft.com/office/drawing/2014/main" id="{D6D50733-857E-A8CC-20A3-976760E493D8}"/>
               </a:ext>
             </a:extLst>
           </p:cNvPr>
@@ -18453,11 +18837,11 @@
             <a:picLocks noGrp="1" noChangeAspect="1"/>
           </p:cNvPicPr>
           <p:nvPr>
-            <p:ph idx="1"/>
+            <p:ph sz="half" idx="2"/>
           </p:nvPr>
         </p:nvPicPr>
         <p:blipFill>
-          <a:blip r:embed="rId2">
+          <a:blip r:embed="rId4">
             <a:extLst>
               <a:ext uri="{28A0092B-C50C-407E-A947-70E740481C1C}">
                 <a14:useLocalDpi xmlns:a14="http://schemas.microsoft.com/office/drawing/2010/main" val="0"/>
@@ -18470,118 +18854,87 @@
         </p:blipFill>
         <p:spPr>
           <a:xfrm>
-            <a:off x="2752502" y="2344522"/>
-            <a:ext cx="6143297" cy="4365197"/>
+            <a:off x="6641868" y="3216949"/>
+            <a:ext cx="4172990" cy="3012194"/>
           </a:xfrm>
         </p:spPr>
       </p:pic>
       <p:sp>
         <p:nvSpPr>
-          <p:cNvPr id="4" name="Title 1">
+          <p:cNvPr id="9" name="TextBox 8">
             <a:extLst>
               <a:ext uri="{FF2B5EF4-FFF2-40B4-BE49-F238E27FC236}">
-                <a16:creationId xmlns:a16="http://schemas.microsoft.com/office/drawing/2014/main" id="{0CE3849C-67BE-577D-A53F-8786A7A99D73}"/>
+                <a16:creationId xmlns:a16="http://schemas.microsoft.com/office/drawing/2014/main" id="{838209B3-5DD6-FE01-39A9-518249323DC9}"/>
               </a:ext>
             </a:extLst>
           </p:cNvPr>
-          <p:cNvSpPr txBox="1">
-            <a:spLocks/>
-          </p:cNvSpPr>
+          <p:cNvSpPr txBox="1"/>
           <p:nvPr/>
         </p:nvSpPr>
-        <p:spPr bwMode="gray">
+        <p:spPr>
           <a:xfrm>
-            <a:off x="1546191" y="743008"/>
-            <a:ext cx="8761413" cy="1168170"/>
+            <a:off x="2410690" y="6301047"/>
+            <a:ext cx="2202873" cy="369332"/>
           </a:xfrm>
           <a:prstGeom prst="rect">
             <a:avLst/>
           </a:prstGeom>
+          <a:noFill/>
         </p:spPr>
         <p:txBody>
-          <a:bodyPr vert="horz" lIns="91440" tIns="45720" rIns="91440" bIns="45720" rtlCol="0" anchor="ctr">
-            <a:noAutofit/>
+          <a:bodyPr wrap="square" rtlCol="0">
+            <a:spAutoFit/>
           </a:bodyPr>
-          <a:lstStyle>
-            <a:lvl1pPr algn="l" defTabSz="457200" rtl="0" eaLnBrk="1" latinLnBrk="0" hangingPunct="1">
-              <a:spcBef>
-                <a:spcPct val="0"/>
-              </a:spcBef>
-              <a:buNone/>
-              <a:defRPr sz="3600" b="0" i="0" kern="1200">
-                <a:solidFill>
-                  <a:schemeClr val="bg2"/>
-                </a:solidFill>
-                <a:latin typeface="+mj-lt"/>
-                <a:ea typeface="+mj-ea"/>
-                <a:cs typeface="+mj-cs"/>
-              </a:defRPr>
-            </a:lvl1pPr>
-            <a:lvl2pPr eaLnBrk="1" hangingPunct="1">
-              <a:defRPr>
-                <a:solidFill>
-                  <a:schemeClr val="tx2"/>
-                </a:solidFill>
-              </a:defRPr>
-            </a:lvl2pPr>
-            <a:lvl3pPr eaLnBrk="1" hangingPunct="1">
-              <a:defRPr>
-                <a:solidFill>
-                  <a:schemeClr val="tx2"/>
-                </a:solidFill>
-              </a:defRPr>
-            </a:lvl3pPr>
-            <a:lvl4pPr eaLnBrk="1" hangingPunct="1">
-              <a:defRPr>
-                <a:solidFill>
-                  <a:schemeClr val="tx2"/>
-                </a:solidFill>
-              </a:defRPr>
-            </a:lvl4pPr>
-            <a:lvl5pPr eaLnBrk="1" hangingPunct="1">
-              <a:defRPr>
-                <a:solidFill>
-                  <a:schemeClr val="tx2"/>
-                </a:solidFill>
-              </a:defRPr>
-            </a:lvl5pPr>
-            <a:lvl6pPr eaLnBrk="1" hangingPunct="1">
-              <a:defRPr>
-                <a:solidFill>
-                  <a:schemeClr val="tx2"/>
-                </a:solidFill>
-              </a:defRPr>
-            </a:lvl6pPr>
-            <a:lvl7pPr eaLnBrk="1" hangingPunct="1">
-              <a:defRPr>
-                <a:solidFill>
-                  <a:schemeClr val="tx2"/>
-                </a:solidFill>
-              </a:defRPr>
-            </a:lvl7pPr>
-            <a:lvl8pPr eaLnBrk="1" hangingPunct="1">
-              <a:defRPr>
-                <a:solidFill>
-                  <a:schemeClr val="tx2"/>
-                </a:solidFill>
-              </a:defRPr>
-            </a:lvl8pPr>
-            <a:lvl9pPr eaLnBrk="1" hangingPunct="1">
-              <a:defRPr>
-                <a:solidFill>
-                  <a:schemeClr val="tx2"/>
-                </a:solidFill>
-              </a:defRPr>
-            </a:lvl9pPr>
-          </a:lstStyle>
-          <a:p>
-            <a:pPr algn="ctr"/>
+          <a:lstStyle/>
+          <a:p>
             <a:r>
               <a:rPr lang="en-US" dirty="0">
                 <a:latin typeface="Arial" panose="020B0604020202020204" pitchFamily="34" charset="0"/>
                 <a:cs typeface="Arial" panose="020B0604020202020204" pitchFamily="34" charset="0"/>
               </a:rPr>
-              <a:t>Without and with AJAX?</a:t>
+              <a:t>Static Website</a:t>
+            </a:r>
+            <a:endParaRPr lang="bg-BG" dirty="0">
+              <a:latin typeface="Arial" panose="020B0604020202020204" pitchFamily="34" charset="0"/>
+              <a:cs typeface="Arial" panose="020B0604020202020204" pitchFamily="34" charset="0"/>
+            </a:endParaRPr>
+          </a:p>
+        </p:txBody>
+      </p:sp>
+      <p:sp>
+        <p:nvSpPr>
+          <p:cNvPr id="10" name="TextBox 9">
+            <a:extLst>
+              <a:ext uri="{FF2B5EF4-FFF2-40B4-BE49-F238E27FC236}">
+                <a16:creationId xmlns:a16="http://schemas.microsoft.com/office/drawing/2014/main" id="{7FF7D9A8-8058-B6EE-7076-805784362C34}"/>
+              </a:ext>
+            </a:extLst>
+          </p:cNvPr>
+          <p:cNvSpPr txBox="1"/>
+          <p:nvPr/>
+        </p:nvSpPr>
+        <p:spPr>
+          <a:xfrm>
+            <a:off x="7924799" y="6301047"/>
+            <a:ext cx="2202873" cy="369332"/>
+          </a:xfrm>
+          <a:prstGeom prst="rect">
+            <a:avLst/>
+          </a:prstGeom>
+          <a:noFill/>
+        </p:spPr>
+        <p:txBody>
+          <a:bodyPr wrap="square" rtlCol="0">
+            <a:spAutoFit/>
+          </a:bodyPr>
+          <a:lstStyle/>
+          <a:p>
+            <a:r>
+              <a:rPr lang="en-US" dirty="0">
+                <a:latin typeface="Arial" panose="020B0604020202020204" pitchFamily="34" charset="0"/>
+                <a:cs typeface="Arial" panose="020B0604020202020204" pitchFamily="34" charset="0"/>
+              </a:rPr>
+              <a:t>Dynamic Website</a:t>
             </a:r>
             <a:endParaRPr lang="bg-BG" dirty="0">
               <a:latin typeface="Arial" panose="020B0604020202020204" pitchFamily="34" charset="0"/>
@@ -18593,7 +18946,7 @@
     </p:spTree>
     <p:extLst>
       <p:ext uri="{BB962C8B-B14F-4D97-AF65-F5344CB8AC3E}">
-        <p14:creationId xmlns:p14="http://schemas.microsoft.com/office/powerpoint/2010/main" val="1438249516"/>
+        <p14:creationId xmlns:p14="http://schemas.microsoft.com/office/powerpoint/2010/main" val="3586015221"/>
       </p:ext>
     </p:extLst>
   </p:cSld>
@@ -18603,7 +18956,7 @@
 </p:sld>
 </file>
 
-<file path=ppt/slides/slide9.xml><?xml version="1.0" encoding="utf-8"?>
+<file path=ppt/slides/slide8.xml><?xml version="1.0" encoding="utf-8"?>
 <p:sld xmlns:a="http://schemas.openxmlformats.org/drawingml/2006/main" xmlns:r="http://schemas.openxmlformats.org/officeDocument/2006/relationships" xmlns:p="http://schemas.openxmlformats.org/presentationml/2006/main">
   <p:cSld>
     <p:spTree>
@@ -18751,7 +19104,7 @@
         <p:spPr>
           <a:xfrm>
             <a:off x="4852459" y="2390609"/>
-            <a:ext cx="6736111" cy="3789062"/>
+            <a:ext cx="6736111" cy="3382211"/>
           </a:xfrm>
           <a:prstGeom prst="roundRect">
             <a:avLst>
@@ -18807,10 +19160,316 @@
           </a:prstGeom>
         </p:spPr>
       </p:pic>
+      <p:pic>
+        <p:nvPicPr>
+          <p:cNvPr id="6" name="Picture 5" descr="A logo of a google location&#10;&#10;Description automatically generated">
+            <a:extLst>
+              <a:ext uri="{FF2B5EF4-FFF2-40B4-BE49-F238E27FC236}">
+                <a16:creationId xmlns:a16="http://schemas.microsoft.com/office/drawing/2014/main" id="{C8388338-85E6-FE5D-879F-45A1C050DAD1}"/>
+              </a:ext>
+            </a:extLst>
+          </p:cNvPr>
+          <p:cNvPicPr>
+            <a:picLocks noChangeAspect="1"/>
+          </p:cNvPicPr>
+          <p:nvPr/>
+        </p:nvPicPr>
+        <p:blipFill>
+          <a:blip r:embed="rId4">
+            <a:extLst>
+              <a:ext uri="{28A0092B-C50C-407E-A947-70E740481C1C}">
+                <a14:useLocalDpi xmlns:a14="http://schemas.microsoft.com/office/drawing/2010/main" val="0"/>
+              </a:ext>
+            </a:extLst>
+          </a:blip>
+          <a:stretch>
+            <a:fillRect/>
+          </a:stretch>
+        </p:blipFill>
+        <p:spPr>
+          <a:xfrm>
+            <a:off x="5284911" y="5884332"/>
+            <a:ext cx="719784" cy="719784"/>
+          </a:xfrm>
+          <a:prstGeom prst="rect">
+            <a:avLst/>
+          </a:prstGeom>
+        </p:spPr>
+      </p:pic>
+      <p:pic>
+        <p:nvPicPr>
+          <p:cNvPr id="10" name="Picture 9" descr="A logo with a letter m&#10;&#10;Description automatically generated">
+            <a:extLst>
+              <a:ext uri="{FF2B5EF4-FFF2-40B4-BE49-F238E27FC236}">
+                <a16:creationId xmlns:a16="http://schemas.microsoft.com/office/drawing/2014/main" id="{7CC9EC2C-EAFA-F624-F3EF-51F11B45896A}"/>
+              </a:ext>
+            </a:extLst>
+          </p:cNvPr>
+          <p:cNvPicPr>
+            <a:picLocks noChangeAspect="1"/>
+          </p:cNvPicPr>
+          <p:nvPr/>
+        </p:nvPicPr>
+        <p:blipFill>
+          <a:blip r:embed="rId5">
+            <a:extLst>
+              <a:ext uri="{28A0092B-C50C-407E-A947-70E740481C1C}">
+                <a14:useLocalDpi xmlns:a14="http://schemas.microsoft.com/office/drawing/2010/main" val="0"/>
+              </a:ext>
+            </a:extLst>
+          </a:blip>
+          <a:stretch>
+            <a:fillRect/>
+          </a:stretch>
+        </p:blipFill>
+        <p:spPr>
+          <a:xfrm>
+            <a:off x="6004695" y="5828576"/>
+            <a:ext cx="1107542" cy="831296"/>
+          </a:xfrm>
+          <a:prstGeom prst="rect">
+            <a:avLst/>
+          </a:prstGeom>
+        </p:spPr>
+      </p:pic>
     </p:spTree>
     <p:extLst>
       <p:ext uri="{BB962C8B-B14F-4D97-AF65-F5344CB8AC3E}">
         <p14:creationId xmlns:p14="http://schemas.microsoft.com/office/powerpoint/2010/main" val="2787141596"/>
+      </p:ext>
+    </p:extLst>
+  </p:cSld>
+  <p:clrMapOvr>
+    <a:masterClrMapping/>
+  </p:clrMapOvr>
+</p:sld>
+</file>
+
+<file path=ppt/slides/slide9.xml><?xml version="1.0" encoding="utf-8"?>
+<p:sld xmlns:a="http://schemas.openxmlformats.org/drawingml/2006/main" xmlns:r="http://schemas.openxmlformats.org/officeDocument/2006/relationships" xmlns:p="http://schemas.openxmlformats.org/presentationml/2006/main">
+  <p:cSld>
+    <p:spTree>
+      <p:nvGrpSpPr>
+        <p:cNvPr id="1" name=""/>
+        <p:cNvGrpSpPr/>
+        <p:nvPr/>
+      </p:nvGrpSpPr>
+      <p:grpSpPr>
+        <a:xfrm>
+          <a:off x="0" y="0"/>
+          <a:ext cx="0" cy="0"/>
+          <a:chOff x="0" y="0"/>
+          <a:chExt cx="0" cy="0"/>
+        </a:xfrm>
+      </p:grpSpPr>
+      <p:sp>
+        <p:nvSpPr>
+          <p:cNvPr id="2" name="Title 1">
+            <a:extLst>
+              <a:ext uri="{FF2B5EF4-FFF2-40B4-BE49-F238E27FC236}">
+                <a16:creationId xmlns:a16="http://schemas.microsoft.com/office/drawing/2014/main" id="{64FFDE61-2F43-D57C-0A9C-EAD211CFFA5B}"/>
+              </a:ext>
+            </a:extLst>
+          </p:cNvPr>
+          <p:cNvSpPr>
+            <a:spLocks noGrp="1"/>
+          </p:cNvSpPr>
+          <p:nvPr>
+            <p:ph type="title"/>
+          </p:nvPr>
+        </p:nvSpPr>
+        <p:spPr>
+          <a:xfrm>
+            <a:off x="1527041" y="973668"/>
+            <a:ext cx="8761413" cy="706964"/>
+          </a:xfrm>
+        </p:spPr>
+        <p:txBody>
+          <a:bodyPr/>
+          <a:lstStyle/>
+          <a:p>
+            <a:pPr algn="ctr"/>
+            <a:r>
+              <a:rPr lang="en-US" dirty="0">
+                <a:latin typeface="Arial" panose="020B0604020202020204" pitchFamily="34" charset="0"/>
+                <a:cs typeface="Arial" panose="020B0604020202020204" pitchFamily="34" charset="0"/>
+              </a:rPr>
+              <a:t>AJAX</a:t>
+            </a:r>
+            <a:endParaRPr lang="bg-BG" dirty="0">
+              <a:latin typeface="Arial" panose="020B0604020202020204" pitchFamily="34" charset="0"/>
+              <a:cs typeface="Arial" panose="020B0604020202020204" pitchFamily="34" charset="0"/>
+            </a:endParaRPr>
+          </a:p>
+        </p:txBody>
+      </p:sp>
+      <p:sp>
+        <p:nvSpPr>
+          <p:cNvPr id="3" name="Content Placeholder 2">
+            <a:extLst>
+              <a:ext uri="{FF2B5EF4-FFF2-40B4-BE49-F238E27FC236}">
+                <a16:creationId xmlns:a16="http://schemas.microsoft.com/office/drawing/2014/main" id="{1FC6EDBC-5A27-C528-D4F9-F431F6B69C8D}"/>
+              </a:ext>
+            </a:extLst>
+          </p:cNvPr>
+          <p:cNvSpPr>
+            <a:spLocks noGrp="1"/>
+          </p:cNvSpPr>
+          <p:nvPr>
+            <p:ph idx="1"/>
+          </p:nvPr>
+        </p:nvSpPr>
+        <p:spPr>
+          <a:xfrm>
+            <a:off x="448936" y="2768255"/>
+            <a:ext cx="5302293" cy="4019723"/>
+          </a:xfrm>
+        </p:spPr>
+        <p:txBody>
+          <a:bodyPr>
+            <a:normAutofit/>
+          </a:bodyPr>
+          <a:lstStyle/>
+          <a:p>
+            <a:pPr marL="0" indent="0" algn="ctr">
+              <a:buNone/>
+            </a:pPr>
+            <a:r>
+              <a:rPr lang="en-US" sz="2400" b="0" i="0" dirty="0">
+                <a:solidFill>
+                  <a:srgbClr val="000000"/>
+                </a:solidFill>
+                <a:effectLst/>
+                <a:latin typeface="Arial" panose="020B0604020202020204" pitchFamily="34" charset="0"/>
+                <a:cs typeface="Arial" panose="020B0604020202020204" pitchFamily="34" charset="0"/>
+              </a:rPr>
+              <a:t>AJAX is a developer's dream, because you can:</a:t>
+            </a:r>
+          </a:p>
+          <a:p>
+            <a:r>
+              <a:rPr lang="en-US" b="1" i="1" u="sng" dirty="0">
+                <a:solidFill>
+                  <a:srgbClr val="000000"/>
+                </a:solidFill>
+                <a:effectLst/>
+                <a:latin typeface="Arial" panose="020B0604020202020204" pitchFamily="34" charset="0"/>
+                <a:cs typeface="Arial" panose="020B0604020202020204" pitchFamily="34" charset="0"/>
+              </a:rPr>
+              <a:t>Terminology: </a:t>
+            </a:r>
+            <a:r>
+              <a:rPr lang="en-US" b="0" i="0" dirty="0">
+                <a:solidFill>
+                  <a:srgbClr val="000000"/>
+                </a:solidFill>
+                <a:effectLst/>
+                <a:latin typeface="Arial" panose="020B0604020202020204" pitchFamily="34" charset="0"/>
+                <a:cs typeface="Arial" panose="020B0604020202020204" pitchFamily="34" charset="0"/>
+              </a:rPr>
+              <a:t>It is a combination of programming techniques for requesting of data from server in async way.</a:t>
+            </a:r>
+            <a:endParaRPr lang="en-US" dirty="0">
+              <a:solidFill>
+                <a:srgbClr val="000000"/>
+              </a:solidFill>
+              <a:latin typeface="Arial" panose="020B0604020202020204" pitchFamily="34" charset="0"/>
+              <a:cs typeface="Arial" panose="020B0604020202020204" pitchFamily="34" charset="0"/>
+            </a:endParaRPr>
+          </a:p>
+          <a:p>
+            <a:r>
+              <a:rPr lang="en-US" b="0" i="0" dirty="0">
+                <a:solidFill>
+                  <a:srgbClr val="000000"/>
+                </a:solidFill>
+                <a:effectLst/>
+                <a:latin typeface="Arial" panose="020B0604020202020204" pitchFamily="34" charset="0"/>
+                <a:cs typeface="Arial" panose="020B0604020202020204" pitchFamily="34" charset="0"/>
+              </a:rPr>
+              <a:t>Update a web page without reloading the page</a:t>
+            </a:r>
+          </a:p>
+          <a:p>
+            <a:r>
+              <a:rPr lang="en-US" b="0" i="0" dirty="0">
+                <a:solidFill>
+                  <a:srgbClr val="000000"/>
+                </a:solidFill>
+                <a:effectLst/>
+                <a:latin typeface="Arial" panose="020B0604020202020204" pitchFamily="34" charset="0"/>
+                <a:cs typeface="Arial" panose="020B0604020202020204" pitchFamily="34" charset="0"/>
+              </a:rPr>
+              <a:t>Request data from a server - after the page has loaded</a:t>
+            </a:r>
+          </a:p>
+          <a:p>
+            <a:r>
+              <a:rPr lang="en-US" b="0" i="0" dirty="0">
+                <a:solidFill>
+                  <a:srgbClr val="000000"/>
+                </a:solidFill>
+                <a:effectLst/>
+                <a:latin typeface="Arial" panose="020B0604020202020204" pitchFamily="34" charset="0"/>
+                <a:cs typeface="Arial" panose="020B0604020202020204" pitchFamily="34" charset="0"/>
+              </a:rPr>
+              <a:t>Send data to a server - in the background</a:t>
+            </a:r>
+          </a:p>
+          <a:p>
+            <a:endParaRPr lang="en-US" dirty="0">
+              <a:solidFill>
+                <a:srgbClr val="000000"/>
+              </a:solidFill>
+              <a:latin typeface="Arial" panose="020B0604020202020204" pitchFamily="34" charset="0"/>
+              <a:cs typeface="Arial" panose="020B0604020202020204" pitchFamily="34" charset="0"/>
+            </a:endParaRPr>
+          </a:p>
+          <a:p>
+            <a:endParaRPr lang="bg-BG" dirty="0"/>
+          </a:p>
+        </p:txBody>
+      </p:sp>
+      <p:pic>
+        <p:nvPicPr>
+          <p:cNvPr id="7" name="Picture 6" descr="A blue text with arrows&#10;&#10;Description automatically generated">
+            <a:extLst>
+              <a:ext uri="{FF2B5EF4-FFF2-40B4-BE49-F238E27FC236}">
+                <a16:creationId xmlns:a16="http://schemas.microsoft.com/office/drawing/2014/main" id="{ACE7DFA7-DC47-30B3-79F8-B9134B0FEE66}"/>
+              </a:ext>
+            </a:extLst>
+          </p:cNvPr>
+          <p:cNvPicPr>
+            <a:picLocks noChangeAspect="1"/>
+          </p:cNvPicPr>
+          <p:nvPr/>
+        </p:nvPicPr>
+        <p:blipFill>
+          <a:blip r:embed="rId2">
+            <a:extLst>
+              <a:ext uri="{28A0092B-C50C-407E-A947-70E740481C1C}">
+                <a14:useLocalDpi xmlns:a14="http://schemas.microsoft.com/office/drawing/2010/main" val="0"/>
+              </a:ext>
+            </a:extLst>
+          </a:blip>
+          <a:stretch>
+            <a:fillRect/>
+          </a:stretch>
+        </p:blipFill>
+        <p:spPr>
+          <a:xfrm>
+            <a:off x="6539626" y="3191946"/>
+            <a:ext cx="4891615" cy="3172340"/>
+          </a:xfrm>
+          <a:prstGeom prst="rect">
+            <a:avLst/>
+          </a:prstGeom>
+        </p:spPr>
+      </p:pic>
+    </p:spTree>
+    <p:extLst>
+      <p:ext uri="{BB962C8B-B14F-4D97-AF65-F5344CB8AC3E}">
+        <p14:creationId xmlns:p14="http://schemas.microsoft.com/office/powerpoint/2010/main" val="1217792067"/>
       </p:ext>
     </p:extLst>
   </p:cSld>
@@ -19084,6 +19743,301 @@
 </a:theme>
 </file>
 
+<file path=ppt/theme/theme2.xml><?xml version="1.0" encoding="utf-8"?>
+<a:theme xmlns:a="http://schemas.openxmlformats.org/drawingml/2006/main" name="Office Theme">
+  <a:themeElements>
+    <a:clrScheme name="Office">
+      <a:dk1>
+        <a:sysClr val="windowText" lastClr="000000"/>
+      </a:dk1>
+      <a:lt1>
+        <a:sysClr val="window" lastClr="FFFFFF"/>
+      </a:lt1>
+      <a:dk2>
+        <a:srgbClr val="44546A"/>
+      </a:dk2>
+      <a:lt2>
+        <a:srgbClr val="E7E6E6"/>
+      </a:lt2>
+      <a:accent1>
+        <a:srgbClr val="4472C4"/>
+      </a:accent1>
+      <a:accent2>
+        <a:srgbClr val="ED7D31"/>
+      </a:accent2>
+      <a:accent3>
+        <a:srgbClr val="A5A5A5"/>
+      </a:accent3>
+      <a:accent4>
+        <a:srgbClr val="FFC000"/>
+      </a:accent4>
+      <a:accent5>
+        <a:srgbClr val="5B9BD5"/>
+      </a:accent5>
+      <a:accent6>
+        <a:srgbClr val="70AD47"/>
+      </a:accent6>
+      <a:hlink>
+        <a:srgbClr val="0563C1"/>
+      </a:hlink>
+      <a:folHlink>
+        <a:srgbClr val="954F72"/>
+      </a:folHlink>
+    </a:clrScheme>
+    <a:fontScheme name="Office">
+      <a:majorFont>
+        <a:latin typeface="Calibri Light" panose="020F0302020204030204"/>
+        <a:ea typeface=""/>
+        <a:cs typeface=""/>
+        <a:font script="Jpan" typeface="游ゴシック Light"/>
+        <a:font script="Hang" typeface="맑은 고딕"/>
+        <a:font script="Hans" typeface="等线 Light"/>
+        <a:font script="Hant" typeface="新細明體"/>
+        <a:font script="Arab" typeface="Times New Roman"/>
+        <a:font script="Hebr" typeface="Times New Roman"/>
+        <a:font script="Thai" typeface="Angsana New"/>
+        <a:font script="Ethi" typeface="Nyala"/>
+        <a:font script="Beng" typeface="Vrinda"/>
+        <a:font script="Gujr" typeface="Shruti"/>
+        <a:font script="Khmr" typeface="MoolBoran"/>
+        <a:font script="Knda" typeface="Tunga"/>
+        <a:font script="Guru" typeface="Raavi"/>
+        <a:font script="Cans" typeface="Euphemia"/>
+        <a:font script="Cher" typeface="Plantagenet Cherokee"/>
+        <a:font script="Yiii" typeface="Microsoft Yi Baiti"/>
+        <a:font script="Tibt" typeface="Microsoft Himalaya"/>
+        <a:font script="Thaa" typeface="MV Boli"/>
+        <a:font script="Deva" typeface="Mangal"/>
+        <a:font script="Telu" typeface="Gautami"/>
+        <a:font script="Taml" typeface="Latha"/>
+        <a:font script="Syrc" typeface="Estrangelo Edessa"/>
+        <a:font script="Orya" typeface="Kalinga"/>
+        <a:font script="Mlym" typeface="Kartika"/>
+        <a:font script="Laoo" typeface="DokChampa"/>
+        <a:font script="Sinh" typeface="Iskoola Pota"/>
+        <a:font script="Mong" typeface="Mongolian Baiti"/>
+        <a:font script="Viet" typeface="Times New Roman"/>
+        <a:font script="Uigh" typeface="Microsoft Uighur"/>
+        <a:font script="Geor" typeface="Sylfaen"/>
+        <a:font script="Armn" typeface="Arial"/>
+        <a:font script="Bugi" typeface="Leelawadee UI"/>
+        <a:font script="Bopo" typeface="Microsoft JhengHei"/>
+        <a:font script="Java" typeface="Javanese Text"/>
+        <a:font script="Lisu" typeface="Segoe UI"/>
+        <a:font script="Mymr" typeface="Myanmar Text"/>
+        <a:font script="Nkoo" typeface="Ebrima"/>
+        <a:font script="Olck" typeface="Nirmala UI"/>
+        <a:font script="Osma" typeface="Ebrima"/>
+        <a:font script="Phag" typeface="Phagspa"/>
+        <a:font script="Syrn" typeface="Estrangelo Edessa"/>
+        <a:font script="Syrj" typeface="Estrangelo Edessa"/>
+        <a:font script="Syre" typeface="Estrangelo Edessa"/>
+        <a:font script="Sora" typeface="Nirmala UI"/>
+        <a:font script="Tale" typeface="Microsoft Tai Le"/>
+        <a:font script="Talu" typeface="Microsoft New Tai Lue"/>
+        <a:font script="Tfng" typeface="Ebrima"/>
+      </a:majorFont>
+      <a:minorFont>
+        <a:latin typeface="Calibri" panose="020F0502020204030204"/>
+        <a:ea typeface=""/>
+        <a:cs typeface=""/>
+        <a:font script="Jpan" typeface="游ゴシック"/>
+        <a:font script="Hang" typeface="맑은 고딕"/>
+        <a:font script="Hans" typeface="等线"/>
+        <a:font script="Hant" typeface="新細明體"/>
+        <a:font script="Arab" typeface="Arial"/>
+        <a:font script="Hebr" typeface="Arial"/>
+        <a:font script="Thai" typeface="Cordia New"/>
+        <a:font script="Ethi" typeface="Nyala"/>
+        <a:font script="Beng" typeface="Vrinda"/>
+        <a:font script="Gujr" typeface="Shruti"/>
+        <a:font script="Khmr" typeface="DaunPenh"/>
+        <a:font script="Knda" typeface="Tunga"/>
+        <a:font script="Guru" typeface="Raavi"/>
+        <a:font script="Cans" typeface="Euphemia"/>
+        <a:font script="Cher" typeface="Plantagenet Cherokee"/>
+        <a:font script="Yiii" typeface="Microsoft Yi Baiti"/>
+        <a:font script="Tibt" typeface="Microsoft Himalaya"/>
+        <a:font script="Thaa" typeface="MV Boli"/>
+        <a:font script="Deva" typeface="Mangal"/>
+        <a:font script="Telu" typeface="Gautami"/>
+        <a:font script="Taml" typeface="Latha"/>
+        <a:font script="Syrc" typeface="Estrangelo Edessa"/>
+        <a:font script="Orya" typeface="Kalinga"/>
+        <a:font script="Mlym" typeface="Kartika"/>
+        <a:font script="Laoo" typeface="DokChampa"/>
+        <a:font script="Sinh" typeface="Iskoola Pota"/>
+        <a:font script="Mong" typeface="Mongolian Baiti"/>
+        <a:font script="Viet" typeface="Arial"/>
+        <a:font script="Uigh" typeface="Microsoft Uighur"/>
+        <a:font script="Geor" typeface="Sylfaen"/>
+        <a:font script="Armn" typeface="Arial"/>
+        <a:font script="Bugi" typeface="Leelawadee UI"/>
+        <a:font script="Bopo" typeface="Microsoft JhengHei"/>
+        <a:font script="Java" typeface="Javanese Text"/>
+        <a:font script="Lisu" typeface="Segoe UI"/>
+        <a:font script="Mymr" typeface="Myanmar Text"/>
+        <a:font script="Nkoo" typeface="Ebrima"/>
+        <a:font script="Olck" typeface="Nirmala UI"/>
+        <a:font script="Osma" typeface="Ebrima"/>
+        <a:font script="Phag" typeface="Phagspa"/>
+        <a:font script="Syrn" typeface="Estrangelo Edessa"/>
+        <a:font script="Syrj" typeface="Estrangelo Edessa"/>
+        <a:font script="Syre" typeface="Estrangelo Edessa"/>
+        <a:font script="Sora" typeface="Nirmala UI"/>
+        <a:font script="Tale" typeface="Microsoft Tai Le"/>
+        <a:font script="Talu" typeface="Microsoft New Tai Lue"/>
+        <a:font script="Tfng" typeface="Ebrima"/>
+      </a:minorFont>
+    </a:fontScheme>
+    <a:fmtScheme name="Office">
+      <a:fillStyleLst>
+        <a:solidFill>
+          <a:schemeClr val="phClr"/>
+        </a:solidFill>
+        <a:gradFill rotWithShape="1">
+          <a:gsLst>
+            <a:gs pos="0">
+              <a:schemeClr val="phClr">
+                <a:lumMod val="110000"/>
+                <a:satMod val="105000"/>
+                <a:tint val="67000"/>
+              </a:schemeClr>
+            </a:gs>
+            <a:gs pos="50000">
+              <a:schemeClr val="phClr">
+                <a:lumMod val="105000"/>
+                <a:satMod val="103000"/>
+                <a:tint val="73000"/>
+              </a:schemeClr>
+            </a:gs>
+            <a:gs pos="100000">
+              <a:schemeClr val="phClr">
+                <a:lumMod val="105000"/>
+                <a:satMod val="109000"/>
+                <a:tint val="81000"/>
+              </a:schemeClr>
+            </a:gs>
+          </a:gsLst>
+          <a:lin ang="5400000" scaled="0"/>
+        </a:gradFill>
+        <a:gradFill rotWithShape="1">
+          <a:gsLst>
+            <a:gs pos="0">
+              <a:schemeClr val="phClr">
+                <a:satMod val="103000"/>
+                <a:lumMod val="102000"/>
+                <a:tint val="94000"/>
+              </a:schemeClr>
+            </a:gs>
+            <a:gs pos="50000">
+              <a:schemeClr val="phClr">
+                <a:satMod val="110000"/>
+                <a:lumMod val="100000"/>
+                <a:shade val="100000"/>
+              </a:schemeClr>
+            </a:gs>
+            <a:gs pos="100000">
+              <a:schemeClr val="phClr">
+                <a:lumMod val="99000"/>
+                <a:satMod val="120000"/>
+                <a:shade val="78000"/>
+              </a:schemeClr>
+            </a:gs>
+          </a:gsLst>
+          <a:lin ang="5400000" scaled="0"/>
+        </a:gradFill>
+      </a:fillStyleLst>
+      <a:lnStyleLst>
+        <a:ln w="6350" cap="flat" cmpd="sng" algn="ctr">
+          <a:solidFill>
+            <a:schemeClr val="phClr"/>
+          </a:solidFill>
+          <a:prstDash val="solid"/>
+          <a:miter lim="800000"/>
+        </a:ln>
+        <a:ln w="12700" cap="flat" cmpd="sng" algn="ctr">
+          <a:solidFill>
+            <a:schemeClr val="phClr"/>
+          </a:solidFill>
+          <a:prstDash val="solid"/>
+          <a:miter lim="800000"/>
+        </a:ln>
+        <a:ln w="19050" cap="flat" cmpd="sng" algn="ctr">
+          <a:solidFill>
+            <a:schemeClr val="phClr"/>
+          </a:solidFill>
+          <a:prstDash val="solid"/>
+          <a:miter lim="800000"/>
+        </a:ln>
+      </a:lnStyleLst>
+      <a:effectStyleLst>
+        <a:effectStyle>
+          <a:effectLst/>
+        </a:effectStyle>
+        <a:effectStyle>
+          <a:effectLst/>
+        </a:effectStyle>
+        <a:effectStyle>
+          <a:effectLst>
+            <a:outerShdw blurRad="57150" dist="19050" dir="5400000" algn="ctr" rotWithShape="0">
+              <a:srgbClr val="000000">
+                <a:alpha val="63000"/>
+              </a:srgbClr>
+            </a:outerShdw>
+          </a:effectLst>
+        </a:effectStyle>
+      </a:effectStyleLst>
+      <a:bgFillStyleLst>
+        <a:solidFill>
+          <a:schemeClr val="phClr"/>
+        </a:solidFill>
+        <a:solidFill>
+          <a:schemeClr val="phClr">
+            <a:tint val="95000"/>
+            <a:satMod val="170000"/>
+          </a:schemeClr>
+        </a:solidFill>
+        <a:gradFill rotWithShape="1">
+          <a:gsLst>
+            <a:gs pos="0">
+              <a:schemeClr val="phClr">
+                <a:tint val="93000"/>
+                <a:satMod val="150000"/>
+                <a:shade val="98000"/>
+                <a:lumMod val="102000"/>
+              </a:schemeClr>
+            </a:gs>
+            <a:gs pos="50000">
+              <a:schemeClr val="phClr">
+                <a:tint val="98000"/>
+                <a:satMod val="130000"/>
+                <a:shade val="90000"/>
+                <a:lumMod val="103000"/>
+              </a:schemeClr>
+            </a:gs>
+            <a:gs pos="100000">
+              <a:schemeClr val="phClr">
+                <a:shade val="63000"/>
+                <a:satMod val="120000"/>
+              </a:schemeClr>
+            </a:gs>
+          </a:gsLst>
+          <a:lin ang="5400000" scaled="0"/>
+        </a:gradFill>
+      </a:bgFillStyleLst>
+    </a:fmtScheme>
+  </a:themeElements>
+  <a:objectDefaults/>
+  <a:extraClrSchemeLst/>
+  <a:extLst>
+    <a:ext uri="{05A4C25C-085E-4340-85A3-A5531E510DB2}">
+      <thm15:themeFamily xmlns:thm15="http://schemas.microsoft.com/office/thememl/2012/main" name="Office Theme" id="{62F939B6-93AF-4DB8-9C6B-D6C7DFDC589F}" vid="{4A3C46E8-61CC-4603-A589-7422A47A8E4A}"/>
+    </a:ext>
+  </a:extLst>
+</a:theme>
+</file>
+
 <file path=docMetadata/LabelInfo.xml><?xml version="1.0" encoding="utf-8"?>
 <clbl:labelList xmlns:clbl="http://schemas.microsoft.com/office/2020/mipLabelMetadata">
   <clbl:label id="{78ba2ad2-1b1e-4cec-9ee3-2fdbfa21151f}" enabled="1" method="Privileged" siteId="{8c09d8d5-1d78-4adf-9d10-a13cdacb0929}" contentBits="0" removed="0"/>

</xml_diff>

<commit_message>
Fixed typo in header of slide for Dynamic and Static websites
</commit_message>
<xml_diff>
--- a/JS intro and overview.pptx
+++ b/JS intro and overview.pptx
@@ -18780,7 +18780,14 @@
                 <a:latin typeface="Arial" panose="020B0604020202020204" pitchFamily="34" charset="0"/>
                 <a:cs typeface="Arial" panose="020B0604020202020204" pitchFamily="34" charset="0"/>
               </a:rPr>
-              <a:t>Static website vs Dynamic Website</a:t>
+              <a:t>Static website vs </a:t>
+            </a:r>
+            <a:r>
+              <a:rPr lang="en-US">
+                <a:latin typeface="Arial" panose="020B0604020202020204" pitchFamily="34" charset="0"/>
+                <a:cs typeface="Arial" panose="020B0604020202020204" pitchFamily="34" charset="0"/>
+              </a:rPr>
+              <a:t>Dynamic website</a:t>
             </a:r>
             <a:endParaRPr lang="bg-BG" dirty="0">
               <a:latin typeface="Arial" panose="020B0604020202020204" pitchFamily="34" charset="0"/>

</xml_diff>

<commit_message>
Added SPA diagram + JS environments info
</commit_message>
<xml_diff>
--- a/JS intro and overview.pptx
+++ b/JS intro and overview.pptx
@@ -5,27 +5,28 @@
     <p:sldMasterId id="2147483660" r:id="rId1"/>
   </p:sldMasterIdLst>
   <p:notesMasterIdLst>
-    <p:notesMasterId r:id="rId20"/>
+    <p:notesMasterId r:id="rId21"/>
   </p:notesMasterIdLst>
   <p:sldIdLst>
     <p:sldId id="256" r:id="rId2"/>
     <p:sldId id="257" r:id="rId3"/>
     <p:sldId id="258" r:id="rId4"/>
-    <p:sldId id="259" r:id="rId5"/>
-    <p:sldId id="260" r:id="rId6"/>
-    <p:sldId id="261" r:id="rId7"/>
-    <p:sldId id="277" r:id="rId8"/>
-    <p:sldId id="262" r:id="rId9"/>
-    <p:sldId id="274" r:id="rId10"/>
-    <p:sldId id="268" r:id="rId11"/>
-    <p:sldId id="265" r:id="rId12"/>
-    <p:sldId id="266" r:id="rId13"/>
-    <p:sldId id="273" r:id="rId14"/>
-    <p:sldId id="269" r:id="rId15"/>
-    <p:sldId id="271" r:id="rId16"/>
-    <p:sldId id="272" r:id="rId17"/>
-    <p:sldId id="275" r:id="rId18"/>
-    <p:sldId id="276" r:id="rId19"/>
+    <p:sldId id="278" r:id="rId5"/>
+    <p:sldId id="259" r:id="rId6"/>
+    <p:sldId id="260" r:id="rId7"/>
+    <p:sldId id="261" r:id="rId8"/>
+    <p:sldId id="277" r:id="rId9"/>
+    <p:sldId id="262" r:id="rId10"/>
+    <p:sldId id="274" r:id="rId11"/>
+    <p:sldId id="268" r:id="rId12"/>
+    <p:sldId id="265" r:id="rId13"/>
+    <p:sldId id="266" r:id="rId14"/>
+    <p:sldId id="273" r:id="rId15"/>
+    <p:sldId id="269" r:id="rId16"/>
+    <p:sldId id="271" r:id="rId17"/>
+    <p:sldId id="272" r:id="rId18"/>
+    <p:sldId id="275" r:id="rId19"/>
+    <p:sldId id="276" r:id="rId20"/>
   </p:sldIdLst>
   <p:sldSz cx="12192000" cy="6858000"/>
   <p:notesSz cx="6858000" cy="9144000"/>
@@ -214,7 +215,7 @@
           <a:p>
             <a:fld id="{6CF08089-F520-44B2-8073-FA83BAAAEA3D}" type="datetimeFigureOut">
               <a:rPr lang="bg-BG" smtClean="0"/>
-              <a:t>10.4.2024 г.</a:t>
+              <a:t>13.4.2024 г.</a:t>
             </a:fld>
             <a:endParaRPr lang="bg-BG"/>
           </a:p>
@@ -547,7 +548,7 @@
           <a:p>
             <a:fld id="{F1D7FC33-4C20-4ACC-8A07-966234DDF240}" type="slidenum">
               <a:rPr lang="bg-BG" smtClean="0"/>
-              <a:t>7</a:t>
+              <a:t>8</a:t>
             </a:fld>
             <a:endParaRPr lang="bg-BG"/>
           </a:p>
@@ -901,7 +902,7 @@
           <a:p>
             <a:fld id="{8B459554-0E39-41B3-91CD-988305703B3E}" type="datetimeFigureOut">
               <a:rPr lang="bg-BG" smtClean="0"/>
-              <a:t>10.4.2024 г.</a:t>
+              <a:t>13.4.2024 г.</a:t>
             </a:fld>
             <a:endParaRPr lang="bg-BG"/>
           </a:p>
@@ -1989,7 +1990,7 @@
           <a:p>
             <a:fld id="{8B459554-0E39-41B3-91CD-988305703B3E}" type="datetimeFigureOut">
               <a:rPr lang="bg-BG" smtClean="0"/>
-              <a:t>10.4.2024 г.</a:t>
+              <a:t>13.4.2024 г.</a:t>
             </a:fld>
             <a:endParaRPr lang="bg-BG"/>
           </a:p>
@@ -2969,7 +2970,7 @@
           <a:p>
             <a:fld id="{8B459554-0E39-41B3-91CD-988305703B3E}" type="datetimeFigureOut">
               <a:rPr lang="bg-BG" smtClean="0"/>
-              <a:t>10.4.2024 г.</a:t>
+              <a:t>13.4.2024 г.</a:t>
             </a:fld>
             <a:endParaRPr lang="bg-BG"/>
           </a:p>
@@ -4103,7 +4104,7 @@
           <a:p>
             <a:fld id="{8B459554-0E39-41B3-91CD-988305703B3E}" type="datetimeFigureOut">
               <a:rPr lang="bg-BG" smtClean="0"/>
-              <a:t>10.4.2024 г.</a:t>
+              <a:t>13.4.2024 г.</a:t>
             </a:fld>
             <a:endParaRPr lang="bg-BG"/>
           </a:p>
@@ -5136,7 +5137,7 @@
           <a:p>
             <a:fld id="{8B459554-0E39-41B3-91CD-988305703B3E}" type="datetimeFigureOut">
               <a:rPr lang="bg-BG" smtClean="0"/>
-              <a:t>10.4.2024 г.</a:t>
+              <a:t>13.4.2024 г.</a:t>
             </a:fld>
             <a:endParaRPr lang="bg-BG"/>
           </a:p>
@@ -5796,7 +5797,7 @@
           <a:p>
             <a:fld id="{8B459554-0E39-41B3-91CD-988305703B3E}" type="datetimeFigureOut">
               <a:rPr lang="bg-BG" smtClean="0"/>
-              <a:t>10.4.2024 г.</a:t>
+              <a:t>13.4.2024 г.</a:t>
             </a:fld>
             <a:endParaRPr lang="bg-BG"/>
           </a:p>
@@ -6657,7 +6658,7 @@
           <a:p>
             <a:fld id="{8B459554-0E39-41B3-91CD-988305703B3E}" type="datetimeFigureOut">
               <a:rPr lang="bg-BG" smtClean="0"/>
-              <a:t>10.4.2024 г.</a:t>
+              <a:t>13.4.2024 г.</a:t>
             </a:fld>
             <a:endParaRPr lang="bg-BG"/>
           </a:p>
@@ -6847,7 +6848,7 @@
           <a:p>
             <a:fld id="{8B459554-0E39-41B3-91CD-988305703B3E}" type="datetimeFigureOut">
               <a:rPr lang="bg-BG" smtClean="0"/>
-              <a:t>10.4.2024 г.</a:t>
+              <a:t>13.4.2024 г.</a:t>
             </a:fld>
             <a:endParaRPr lang="bg-BG"/>
           </a:p>
@@ -7819,7 +7820,7 @@
           <a:p>
             <a:fld id="{8B459554-0E39-41B3-91CD-988305703B3E}" type="datetimeFigureOut">
               <a:rPr lang="bg-BG" smtClean="0"/>
-              <a:t>10.4.2024 г.</a:t>
+              <a:t>13.4.2024 г.</a:t>
             </a:fld>
             <a:endParaRPr lang="bg-BG"/>
           </a:p>
@@ -8030,7 +8031,7 @@
           <a:p>
             <a:fld id="{8B459554-0E39-41B3-91CD-988305703B3E}" type="datetimeFigureOut">
               <a:rPr lang="bg-BG" smtClean="0"/>
-              <a:t>10.4.2024 г.</a:t>
+              <a:t>13.4.2024 г.</a:t>
             </a:fld>
             <a:endParaRPr lang="bg-BG"/>
           </a:p>
@@ -9064,7 +9065,7 @@
           <a:p>
             <a:fld id="{8B459554-0E39-41B3-91CD-988305703B3E}" type="datetimeFigureOut">
               <a:rPr lang="bg-BG" smtClean="0"/>
-              <a:t>10.4.2024 г.</a:t>
+              <a:t>13.4.2024 г.</a:t>
             </a:fld>
             <a:endParaRPr lang="bg-BG"/>
           </a:p>
@@ -9336,7 +9337,7 @@
           <a:p>
             <a:fld id="{8B459554-0E39-41B3-91CD-988305703B3E}" type="datetimeFigureOut">
               <a:rPr lang="bg-BG" smtClean="0"/>
-              <a:t>10.4.2024 г.</a:t>
+              <a:t>13.4.2024 г.</a:t>
             </a:fld>
             <a:endParaRPr lang="bg-BG"/>
           </a:p>
@@ -9746,7 +9747,7 @@
           <a:p>
             <a:fld id="{8B459554-0E39-41B3-91CD-988305703B3E}" type="datetimeFigureOut">
               <a:rPr lang="bg-BG" smtClean="0"/>
-              <a:t>10.4.2024 г.</a:t>
+              <a:t>13.4.2024 г.</a:t>
             </a:fld>
             <a:endParaRPr lang="bg-BG"/>
           </a:p>
@@ -9873,7 +9874,7 @@
           <a:p>
             <a:fld id="{8B459554-0E39-41B3-91CD-988305703B3E}" type="datetimeFigureOut">
               <a:rPr lang="bg-BG" smtClean="0"/>
-              <a:t>10.4.2024 г.</a:t>
+              <a:t>13.4.2024 г.</a:t>
             </a:fld>
             <a:endParaRPr lang="bg-BG"/>
           </a:p>
@@ -9968,7 +9969,7 @@
           <a:p>
             <a:fld id="{8B459554-0E39-41B3-91CD-988305703B3E}" type="datetimeFigureOut">
               <a:rPr lang="bg-BG" smtClean="0"/>
-              <a:t>10.4.2024 г.</a:t>
+              <a:t>13.4.2024 г.</a:t>
             </a:fld>
             <a:endParaRPr lang="bg-BG"/>
           </a:p>
@@ -11049,7 +11050,7 @@
           <a:p>
             <a:fld id="{8B459554-0E39-41B3-91CD-988305703B3E}" type="datetimeFigureOut">
               <a:rPr lang="bg-BG" smtClean="0"/>
-              <a:t>10.4.2024 г.</a:t>
+              <a:t>13.4.2024 г.</a:t>
             </a:fld>
             <a:endParaRPr lang="bg-BG"/>
           </a:p>
@@ -12157,7 +12158,7 @@
           <a:p>
             <a:fld id="{8B459554-0E39-41B3-91CD-988305703B3E}" type="datetimeFigureOut">
               <a:rPr lang="bg-BG" smtClean="0"/>
-              <a:t>10.4.2024 г.</a:t>
+              <a:t>13.4.2024 г.</a:t>
             </a:fld>
             <a:endParaRPr lang="bg-BG"/>
           </a:p>
@@ -13154,7 +13155,7 @@
           <a:p>
             <a:fld id="{8B459554-0E39-41B3-91CD-988305703B3E}" type="datetimeFigureOut">
               <a:rPr lang="bg-BG" smtClean="0"/>
-              <a:t>10.4.2024 г.</a:t>
+              <a:t>13.4.2024 г.</a:t>
             </a:fld>
             <a:endParaRPr lang="bg-BG"/>
           </a:p>
@@ -13772,13 +13773,13 @@
         </p:nvSpPr>
         <p:spPr>
           <a:xfrm>
-            <a:off x="565265" y="2493819"/>
-            <a:ext cx="8158605" cy="4064924"/>
+            <a:off x="565265" y="2420471"/>
+            <a:ext cx="8158605" cy="4138272"/>
           </a:xfrm>
         </p:spPr>
         <p:txBody>
           <a:bodyPr>
-            <a:normAutofit fontScale="92500" lnSpcReduction="10000"/>
+            <a:normAutofit fontScale="85000" lnSpcReduction="20000"/>
           </a:bodyPr>
           <a:lstStyle/>
           <a:p>
@@ -13796,6 +13797,15 @@
                 <a:latin typeface="Arial" panose="020B0604020202020204" pitchFamily="34" charset="0"/>
                 <a:cs typeface="Arial" panose="020B0604020202020204" pitchFamily="34" charset="0"/>
               </a:rPr>
+              <a:t>JavaScript runtime environments</a:t>
+            </a:r>
+          </a:p>
+          <a:p>
+            <a:r>
+              <a:rPr lang="en-US" dirty="0">
+                <a:latin typeface="Arial" panose="020B0604020202020204" pitchFamily="34" charset="0"/>
+                <a:cs typeface="Arial" panose="020B0604020202020204" pitchFamily="34" charset="0"/>
+              </a:rPr>
               <a:t>DOM – Document Object Model</a:t>
             </a:r>
           </a:p>
@@ -13823,7 +13833,16 @@
                 <a:latin typeface="Arial" panose="020B0604020202020204" pitchFamily="34" charset="0"/>
                 <a:cs typeface="Arial" panose="020B0604020202020204" pitchFamily="34" charset="0"/>
               </a:rPr>
-              <a:t>Static Website vs Dynamic Website</a:t>
+              <a:t>Static Website vs Dynamic Website (MPA)</a:t>
+            </a:r>
+          </a:p>
+          <a:p>
+            <a:r>
+              <a:rPr lang="en-US" dirty="0">
+                <a:latin typeface="Arial" panose="020B0604020202020204" pitchFamily="34" charset="0"/>
+                <a:cs typeface="Arial" panose="020B0604020202020204" pitchFamily="34" charset="0"/>
+              </a:rPr>
+              <a:t>Single Page Application (SPA)</a:t>
             </a:r>
           </a:p>
           <a:p>
@@ -13977,6 +13996,339 @@
           <p:cNvPr id="2" name="Title 1">
             <a:extLst>
               <a:ext uri="{FF2B5EF4-FFF2-40B4-BE49-F238E27FC236}">
+                <a16:creationId xmlns:a16="http://schemas.microsoft.com/office/drawing/2014/main" id="{1957DB96-6F14-D30D-1117-2D8DF8468663}"/>
+              </a:ext>
+            </a:extLst>
+          </p:cNvPr>
+          <p:cNvSpPr>
+            <a:spLocks noGrp="1"/>
+          </p:cNvSpPr>
+          <p:nvPr>
+            <p:ph type="title"/>
+          </p:nvPr>
+        </p:nvSpPr>
+        <p:spPr/>
+        <p:txBody>
+          <a:bodyPr/>
+          <a:lstStyle/>
+          <a:p>
+            <a:pPr algn="ctr"/>
+            <a:r>
+              <a:rPr lang="en-US" dirty="0">
+                <a:latin typeface="Arial" panose="020B0604020202020204" pitchFamily="34" charset="0"/>
+                <a:cs typeface="Arial" panose="020B0604020202020204" pitchFamily="34" charset="0"/>
+              </a:rPr>
+              <a:t>Single Page Application (SPA)</a:t>
+            </a:r>
+            <a:endParaRPr lang="bg-BG" dirty="0">
+              <a:latin typeface="Arial" panose="020B0604020202020204" pitchFamily="34" charset="0"/>
+              <a:cs typeface="Arial" panose="020B0604020202020204" pitchFamily="34" charset="0"/>
+            </a:endParaRPr>
+          </a:p>
+        </p:txBody>
+      </p:sp>
+      <p:sp>
+        <p:nvSpPr>
+          <p:cNvPr id="3" name="Content Placeholder 2">
+            <a:extLst>
+              <a:ext uri="{FF2B5EF4-FFF2-40B4-BE49-F238E27FC236}">
+                <a16:creationId xmlns:a16="http://schemas.microsoft.com/office/drawing/2014/main" id="{CAF48E5B-689D-DA04-DCDC-FCAF26AF574F}"/>
+              </a:ext>
+            </a:extLst>
+          </p:cNvPr>
+          <p:cNvSpPr>
+            <a:spLocks noGrp="1"/>
+          </p:cNvSpPr>
+          <p:nvPr>
+            <p:ph idx="1"/>
+          </p:nvPr>
+        </p:nvSpPr>
+        <p:spPr>
+          <a:xfrm>
+            <a:off x="421785" y="2390609"/>
+            <a:ext cx="4503233" cy="1799792"/>
+          </a:xfrm>
+        </p:spPr>
+        <p:txBody>
+          <a:bodyPr>
+            <a:normAutofit fontScale="92500"/>
+          </a:bodyPr>
+          <a:lstStyle/>
+          <a:p>
+            <a:r>
+              <a:rPr lang="en-US" dirty="0">
+                <a:solidFill>
+                  <a:srgbClr val="080809"/>
+                </a:solidFill>
+                <a:latin typeface="Arial" panose="020B0604020202020204" pitchFamily="34" charset="0"/>
+                <a:cs typeface="Arial" panose="020B0604020202020204" pitchFamily="34" charset="0"/>
+              </a:rPr>
+              <a:t>A </a:t>
+            </a:r>
+            <a:r>
+              <a:rPr lang="en-US" b="1" dirty="0">
+                <a:solidFill>
+                  <a:srgbClr val="080809"/>
+                </a:solidFill>
+                <a:latin typeface="Arial" panose="020B0604020202020204" pitchFamily="34" charset="0"/>
+                <a:cs typeface="Arial" panose="020B0604020202020204" pitchFamily="34" charset="0"/>
+              </a:rPr>
+              <a:t>single-page</a:t>
+            </a:r>
+            <a:r>
+              <a:rPr lang="en-US" dirty="0">
+                <a:solidFill>
+                  <a:srgbClr val="080809"/>
+                </a:solidFill>
+                <a:latin typeface="Arial" panose="020B0604020202020204" pitchFamily="34" charset="0"/>
+                <a:cs typeface="Arial" panose="020B0604020202020204" pitchFamily="34" charset="0"/>
+              </a:rPr>
+              <a:t> application is a web application that loads only a single page. It then rewrites the page with new content fetched from a web server as the user interacts with it instead of loading a new page for every interaction. </a:t>
+            </a:r>
+            <a:endParaRPr lang="bg-BG" dirty="0">
+              <a:latin typeface="Arial" panose="020B0604020202020204" pitchFamily="34" charset="0"/>
+              <a:cs typeface="Arial" panose="020B0604020202020204" pitchFamily="34" charset="0"/>
+            </a:endParaRPr>
+          </a:p>
+          <a:p>
+            <a:endParaRPr lang="bg-BG" dirty="0"/>
+          </a:p>
+        </p:txBody>
+      </p:sp>
+      <p:pic>
+        <p:nvPicPr>
+          <p:cNvPr id="5" name="Picture 4" descr="A screenshot of a computer&#10;&#10;Description automatically generated">
+            <a:extLst>
+              <a:ext uri="{FF2B5EF4-FFF2-40B4-BE49-F238E27FC236}">
+                <a16:creationId xmlns:a16="http://schemas.microsoft.com/office/drawing/2014/main" id="{9BD2C52D-CC43-92D9-1F05-78216FC8C955}"/>
+              </a:ext>
+            </a:extLst>
+          </p:cNvPr>
+          <p:cNvPicPr>
+            <a:picLocks noChangeAspect="1"/>
+          </p:cNvPicPr>
+          <p:nvPr/>
+        </p:nvPicPr>
+        <p:blipFill>
+          <a:blip r:embed="rId2">
+            <a:extLst>
+              <a:ext uri="{28A0092B-C50C-407E-A947-70E740481C1C}">
+                <a14:useLocalDpi xmlns:a14="http://schemas.microsoft.com/office/drawing/2010/main" val="0"/>
+              </a:ext>
+            </a:extLst>
+          </a:blip>
+          <a:stretch>
+            <a:fillRect/>
+          </a:stretch>
+        </p:blipFill>
+        <p:spPr>
+          <a:xfrm>
+            <a:off x="448686" y="4412299"/>
+            <a:ext cx="4476333" cy="2247573"/>
+          </a:xfrm>
+          <a:prstGeom prst="roundRect">
+            <a:avLst>
+              <a:gd name="adj" fmla="val 8594"/>
+            </a:avLst>
+          </a:prstGeom>
+          <a:solidFill>
+            <a:srgbClr val="FFFFFF">
+              <a:shade val="85000"/>
+            </a:srgbClr>
+          </a:solidFill>
+          <a:ln>
+            <a:noFill/>
+          </a:ln>
+          <a:effectLst>
+            <a:reflection blurRad="12700" stA="38000" endPos="28000" dist="5000" dir="5400000" sy="-100000" algn="bl" rotWithShape="0"/>
+          </a:effectLst>
+        </p:spPr>
+      </p:pic>
+      <p:pic>
+        <p:nvPicPr>
+          <p:cNvPr id="6" name="Picture 5" descr="A logo of a google location&#10;&#10;Description automatically generated">
+            <a:extLst>
+              <a:ext uri="{FF2B5EF4-FFF2-40B4-BE49-F238E27FC236}">
+                <a16:creationId xmlns:a16="http://schemas.microsoft.com/office/drawing/2014/main" id="{C8388338-85E6-FE5D-879F-45A1C050DAD1}"/>
+              </a:ext>
+            </a:extLst>
+          </p:cNvPr>
+          <p:cNvPicPr>
+            <a:picLocks noChangeAspect="1"/>
+          </p:cNvPicPr>
+          <p:nvPr/>
+        </p:nvPicPr>
+        <p:blipFill>
+          <a:blip r:embed="rId3">
+            <a:extLst>
+              <a:ext uri="{28A0092B-C50C-407E-A947-70E740481C1C}">
+                <a14:useLocalDpi xmlns:a14="http://schemas.microsoft.com/office/drawing/2010/main" val="0"/>
+              </a:ext>
+            </a:extLst>
+          </a:blip>
+          <a:stretch>
+            <a:fillRect/>
+          </a:stretch>
+        </p:blipFill>
+        <p:spPr>
+          <a:xfrm>
+            <a:off x="4871408" y="4647202"/>
+            <a:ext cx="719784" cy="719784"/>
+          </a:xfrm>
+          <a:prstGeom prst="rect">
+            <a:avLst/>
+          </a:prstGeom>
+        </p:spPr>
+      </p:pic>
+      <p:pic>
+        <p:nvPicPr>
+          <p:cNvPr id="10" name="Picture 9" descr="A logo with a letter m&#10;&#10;Description automatically generated">
+            <a:extLst>
+              <a:ext uri="{FF2B5EF4-FFF2-40B4-BE49-F238E27FC236}">
+                <a16:creationId xmlns:a16="http://schemas.microsoft.com/office/drawing/2014/main" id="{7CC9EC2C-EAFA-F624-F3EF-51F11B45896A}"/>
+              </a:ext>
+            </a:extLst>
+          </p:cNvPr>
+          <p:cNvPicPr>
+            <a:picLocks noChangeAspect="1"/>
+          </p:cNvPicPr>
+          <p:nvPr/>
+        </p:nvPicPr>
+        <p:blipFill>
+          <a:blip r:embed="rId4">
+            <a:extLst>
+              <a:ext uri="{28A0092B-C50C-407E-A947-70E740481C1C}">
+                <a14:useLocalDpi xmlns:a14="http://schemas.microsoft.com/office/drawing/2010/main" val="0"/>
+              </a:ext>
+            </a:extLst>
+          </a:blip>
+          <a:stretch>
+            <a:fillRect/>
+          </a:stretch>
+        </p:blipFill>
+        <p:spPr>
+          <a:xfrm>
+            <a:off x="4704335" y="5371775"/>
+            <a:ext cx="1107542" cy="831296"/>
+          </a:xfrm>
+          <a:prstGeom prst="rect">
+            <a:avLst/>
+          </a:prstGeom>
+        </p:spPr>
+      </p:pic>
+      <p:pic>
+        <p:nvPicPr>
+          <p:cNvPr id="8" name="Картина 7">
+            <a:extLst>
+              <a:ext uri="{FF2B5EF4-FFF2-40B4-BE49-F238E27FC236}">
+                <a16:creationId xmlns:a16="http://schemas.microsoft.com/office/drawing/2014/main" id="{ABBE184D-B9C7-62FE-FD72-9199C307C3E2}"/>
+              </a:ext>
+            </a:extLst>
+          </p:cNvPr>
+          <p:cNvPicPr>
+            <a:picLocks noChangeAspect="1"/>
+          </p:cNvPicPr>
+          <p:nvPr/>
+        </p:nvPicPr>
+        <p:blipFill>
+          <a:blip r:embed="rId5">
+            <a:extLst>
+              <a:ext uri="{28A0092B-C50C-407E-A947-70E740481C1C}">
+                <a14:useLocalDpi xmlns:a14="http://schemas.microsoft.com/office/drawing/2010/main" val="0"/>
+              </a:ext>
+            </a:extLst>
+          </a:blip>
+          <a:stretch>
+            <a:fillRect/>
+          </a:stretch>
+        </p:blipFill>
+        <p:spPr>
+          <a:xfrm>
+            <a:off x="6157042" y="2488924"/>
+            <a:ext cx="5444701" cy="3499500"/>
+          </a:xfrm>
+          <a:prstGeom prst="rect">
+            <a:avLst/>
+          </a:prstGeom>
+        </p:spPr>
+      </p:pic>
+      <p:sp>
+        <p:nvSpPr>
+          <p:cNvPr id="9" name="TextBox 8">
+            <a:extLst>
+              <a:ext uri="{FF2B5EF4-FFF2-40B4-BE49-F238E27FC236}">
+                <a16:creationId xmlns:a16="http://schemas.microsoft.com/office/drawing/2014/main" id="{A98F8B06-5C68-6744-CF1B-482E16EF8171}"/>
+              </a:ext>
+            </a:extLst>
+          </p:cNvPr>
+          <p:cNvSpPr txBox="1"/>
+          <p:nvPr/>
+        </p:nvSpPr>
+        <p:spPr>
+          <a:xfrm>
+            <a:off x="8255678" y="6086529"/>
+            <a:ext cx="2202873" cy="369332"/>
+          </a:xfrm>
+          <a:prstGeom prst="rect">
+            <a:avLst/>
+          </a:prstGeom>
+          <a:noFill/>
+        </p:spPr>
+        <p:txBody>
+          <a:bodyPr wrap="square" rtlCol="0">
+            <a:spAutoFit/>
+          </a:bodyPr>
+          <a:lstStyle/>
+          <a:p>
+            <a:r>
+              <a:rPr lang="en-US" dirty="0">
+                <a:latin typeface="Arial" panose="020B0604020202020204" pitchFamily="34" charset="0"/>
+                <a:cs typeface="Arial" panose="020B0604020202020204" pitchFamily="34" charset="0"/>
+              </a:rPr>
+              <a:t>Single Page App</a:t>
+            </a:r>
+            <a:endParaRPr lang="bg-BG" dirty="0">
+              <a:latin typeface="Arial" panose="020B0604020202020204" pitchFamily="34" charset="0"/>
+              <a:cs typeface="Arial" panose="020B0604020202020204" pitchFamily="34" charset="0"/>
+            </a:endParaRPr>
+          </a:p>
+        </p:txBody>
+      </p:sp>
+    </p:spTree>
+    <p:extLst>
+      <p:ext uri="{BB962C8B-B14F-4D97-AF65-F5344CB8AC3E}">
+        <p14:creationId xmlns:p14="http://schemas.microsoft.com/office/powerpoint/2010/main" val="2787141596"/>
+      </p:ext>
+    </p:extLst>
+  </p:cSld>
+  <p:clrMapOvr>
+    <a:masterClrMapping/>
+  </p:clrMapOvr>
+</p:sld>
+</file>
+
+<file path=ppt/slides/slide11.xml><?xml version="1.0" encoding="utf-8"?>
+<p:sld xmlns:a="http://schemas.openxmlformats.org/drawingml/2006/main" xmlns:r="http://schemas.openxmlformats.org/officeDocument/2006/relationships" xmlns:p="http://schemas.openxmlformats.org/presentationml/2006/main">
+  <p:cSld>
+    <p:spTree>
+      <p:nvGrpSpPr>
+        <p:cNvPr id="1" name=""/>
+        <p:cNvGrpSpPr/>
+        <p:nvPr/>
+      </p:nvGrpSpPr>
+      <p:grpSpPr>
+        <a:xfrm>
+          <a:off x="0" y="0"/>
+          <a:ext cx="0" cy="0"/>
+          <a:chOff x="0" y="0"/>
+          <a:chExt cx="0" cy="0"/>
+        </a:xfrm>
+      </p:grpSpPr>
+      <p:sp>
+        <p:nvSpPr>
+          <p:cNvPr id="2" name="Title 1">
+            <a:extLst>
+              <a:ext uri="{FF2B5EF4-FFF2-40B4-BE49-F238E27FC236}">
                 <a16:creationId xmlns:a16="http://schemas.microsoft.com/office/drawing/2014/main" id="{6CA55022-484E-0A07-8D37-CA255FFFD282}"/>
               </a:ext>
             </a:extLst>
@@ -14135,7 +14487,7 @@
 </p:sld>
 </file>
 
-<file path=ppt/slides/slide11.xml><?xml version="1.0" encoding="utf-8"?>
+<file path=ppt/slides/slide12.xml><?xml version="1.0" encoding="utf-8"?>
 <p:sld xmlns:a="http://schemas.openxmlformats.org/drawingml/2006/main" xmlns:r="http://schemas.openxmlformats.org/officeDocument/2006/relationships" xmlns:p="http://schemas.openxmlformats.org/presentationml/2006/main">
   <p:cSld>
     <p:spTree>
@@ -14571,7 +14923,7 @@
 </p:sld>
 </file>
 
-<file path=ppt/slides/slide12.xml><?xml version="1.0" encoding="utf-8"?>
+<file path=ppt/slides/slide13.xml><?xml version="1.0" encoding="utf-8"?>
 <p:sld xmlns:a="http://schemas.openxmlformats.org/drawingml/2006/main" xmlns:r="http://schemas.openxmlformats.org/officeDocument/2006/relationships" xmlns:p="http://schemas.openxmlformats.org/presentationml/2006/main">
   <p:cSld>
     <p:spTree>
@@ -14934,7 +15286,7 @@
 </p:sld>
 </file>
 
-<file path=ppt/slides/slide13.xml><?xml version="1.0" encoding="utf-8"?>
+<file path=ppt/slides/slide14.xml><?xml version="1.0" encoding="utf-8"?>
 <p:sld xmlns:a="http://schemas.openxmlformats.org/drawingml/2006/main" xmlns:r="http://schemas.openxmlformats.org/officeDocument/2006/relationships" xmlns:p="http://schemas.openxmlformats.org/presentationml/2006/main">
   <p:cSld>
     <p:spTree>
@@ -15299,7 +15651,7 @@
 </p:sld>
 </file>
 
-<file path=ppt/slides/slide14.xml><?xml version="1.0" encoding="utf-8"?>
+<file path=ppt/slides/slide15.xml><?xml version="1.0" encoding="utf-8"?>
 <p:sld xmlns:a="http://schemas.openxmlformats.org/drawingml/2006/main" xmlns:r="http://schemas.openxmlformats.org/officeDocument/2006/relationships" xmlns:p="http://schemas.openxmlformats.org/presentationml/2006/main">
   <p:cSld>
     <p:spTree>
@@ -15400,7 +15752,7 @@
 </p:sld>
 </file>
 
-<file path=ppt/slides/slide15.xml><?xml version="1.0" encoding="utf-8"?>
+<file path=ppt/slides/slide16.xml><?xml version="1.0" encoding="utf-8"?>
 <p:sld xmlns:a="http://schemas.openxmlformats.org/drawingml/2006/main" xmlns:r="http://schemas.openxmlformats.org/officeDocument/2006/relationships" xmlns:p="http://schemas.openxmlformats.org/presentationml/2006/main">
   <p:cSld>
     <p:spTree>
@@ -15644,7 +15996,7 @@
 </p:sld>
 </file>
 
-<file path=ppt/slides/slide16.xml><?xml version="1.0" encoding="utf-8"?>
+<file path=ppt/slides/slide17.xml><?xml version="1.0" encoding="utf-8"?>
 <p:sld xmlns:a="http://schemas.openxmlformats.org/drawingml/2006/main" xmlns:r="http://schemas.openxmlformats.org/officeDocument/2006/relationships" xmlns:p="http://schemas.openxmlformats.org/presentationml/2006/main">
   <p:cSld>
     <p:spTree>
@@ -16060,7 +16412,7 @@
 </p:sld>
 </file>
 
-<file path=ppt/slides/slide17.xml><?xml version="1.0" encoding="utf-8"?>
+<file path=ppt/slides/slide18.xml><?xml version="1.0" encoding="utf-8"?>
 <p:sld xmlns:a="http://schemas.openxmlformats.org/drawingml/2006/main" xmlns:r="http://schemas.openxmlformats.org/officeDocument/2006/relationships" xmlns:p="http://schemas.openxmlformats.org/presentationml/2006/main">
   <p:cSld>
     <p:spTree>
@@ -16281,7 +16633,7 @@
 </p:sld>
 </file>
 
-<file path=ppt/slides/slide18.xml><?xml version="1.0" encoding="utf-8"?>
+<file path=ppt/slides/slide19.xml><?xml version="1.0" encoding="utf-8"?>
 <p:sld xmlns:a="http://schemas.openxmlformats.org/drawingml/2006/main" xmlns:r="http://schemas.openxmlformats.org/officeDocument/2006/relationships" xmlns:p="http://schemas.openxmlformats.org/presentationml/2006/main">
   <p:cSld>
     <p:spTree>
@@ -17475,7 +17827,7 @@
                 <a:latin typeface="Arial" panose="020B0604020202020204" pitchFamily="34" charset="0"/>
                 <a:cs typeface="Arial" panose="020B0604020202020204" pitchFamily="34" charset="0"/>
               </a:rPr>
-              <a:t>VueJS</a:t>
+              <a:t>Vue.Js</a:t>
             </a:r>
             <a:r>
               <a:rPr lang="en-US" dirty="0">
@@ -17719,6 +18071,108 @@
       </p:grpSpPr>
       <p:sp>
         <p:nvSpPr>
+          <p:cNvPr id="2" name="Заглавие 1">
+            <a:extLst>
+              <a:ext uri="{FF2B5EF4-FFF2-40B4-BE49-F238E27FC236}">
+                <a16:creationId xmlns:a16="http://schemas.microsoft.com/office/drawing/2014/main" id="{0AE84908-8ADE-D7AB-2737-2B0C1AEED6F2}"/>
+              </a:ext>
+            </a:extLst>
+          </p:cNvPr>
+          <p:cNvSpPr>
+            <a:spLocks noGrp="1"/>
+          </p:cNvSpPr>
+          <p:nvPr>
+            <p:ph type="title"/>
+          </p:nvPr>
+        </p:nvSpPr>
+        <p:spPr>
+          <a:xfrm>
+            <a:off x="1379072" y="903710"/>
+            <a:ext cx="8761413" cy="706964"/>
+          </a:xfrm>
+        </p:spPr>
+        <p:txBody>
+          <a:bodyPr/>
+          <a:lstStyle/>
+          <a:p>
+            <a:pPr algn="ctr"/>
+            <a:r>
+              <a:rPr lang="en-US" dirty="0">
+                <a:latin typeface="Arial" panose="020B0604020202020204" pitchFamily="34" charset="0"/>
+                <a:cs typeface="Arial" panose="020B0604020202020204" pitchFamily="34" charset="0"/>
+              </a:rPr>
+              <a:t>JavaScript runtime environments</a:t>
+            </a:r>
+          </a:p>
+        </p:txBody>
+      </p:sp>
+      <p:pic>
+        <p:nvPicPr>
+          <p:cNvPr id="9" name="Контейнер за съдържание 8">
+            <a:extLst>
+              <a:ext uri="{FF2B5EF4-FFF2-40B4-BE49-F238E27FC236}">
+                <a16:creationId xmlns:a16="http://schemas.microsoft.com/office/drawing/2014/main" id="{6F0AEA35-F898-96C3-D219-E08505EB2B8A}"/>
+              </a:ext>
+            </a:extLst>
+          </p:cNvPr>
+          <p:cNvPicPr>
+            <a:picLocks noGrp="1" noChangeAspect="1"/>
+          </p:cNvPicPr>
+          <p:nvPr>
+            <p:ph idx="1"/>
+          </p:nvPr>
+        </p:nvPicPr>
+        <p:blipFill>
+          <a:blip r:embed="rId2">
+            <a:extLst>
+              <a:ext uri="{28A0092B-C50C-407E-A947-70E740481C1C}">
+                <a14:useLocalDpi xmlns:a14="http://schemas.microsoft.com/office/drawing/2010/main" val="0"/>
+              </a:ext>
+            </a:extLst>
+          </a:blip>
+          <a:stretch>
+            <a:fillRect/>
+          </a:stretch>
+        </p:blipFill>
+        <p:spPr>
+          <a:xfrm>
+            <a:off x="2631260" y="2629442"/>
+            <a:ext cx="6602388" cy="3423460"/>
+          </a:xfrm>
+        </p:spPr>
+      </p:pic>
+    </p:spTree>
+    <p:extLst>
+      <p:ext uri="{BB962C8B-B14F-4D97-AF65-F5344CB8AC3E}">
+        <p14:creationId xmlns:p14="http://schemas.microsoft.com/office/powerpoint/2010/main" val="1131573649"/>
+      </p:ext>
+    </p:extLst>
+  </p:cSld>
+  <p:clrMapOvr>
+    <a:masterClrMapping/>
+  </p:clrMapOvr>
+</p:sld>
+</file>
+
+<file path=ppt/slides/slide5.xml><?xml version="1.0" encoding="utf-8"?>
+<p:sld xmlns:a="http://schemas.openxmlformats.org/drawingml/2006/main" xmlns:r="http://schemas.openxmlformats.org/officeDocument/2006/relationships" xmlns:p="http://schemas.openxmlformats.org/presentationml/2006/main">
+  <p:cSld>
+    <p:spTree>
+      <p:nvGrpSpPr>
+        <p:cNvPr id="1" name=""/>
+        <p:cNvGrpSpPr/>
+        <p:nvPr/>
+      </p:nvGrpSpPr>
+      <p:grpSpPr>
+        <a:xfrm>
+          <a:off x="0" y="0"/>
+          <a:ext cx="0" cy="0"/>
+          <a:chOff x="0" y="0"/>
+          <a:chExt cx="0" cy="0"/>
+        </a:xfrm>
+      </p:grpSpPr>
+      <p:sp>
+        <p:nvSpPr>
           <p:cNvPr id="2" name="Title 1">
             <a:extLst>
               <a:ext uri="{FF2B5EF4-FFF2-40B4-BE49-F238E27FC236}">
@@ -17985,7 +18439,7 @@
 </p:sld>
 </file>
 
-<file path=ppt/slides/slide5.xml><?xml version="1.0" encoding="utf-8"?>
+<file path=ppt/slides/slide6.xml><?xml version="1.0" encoding="utf-8"?>
 <p:sld xmlns:a="http://schemas.openxmlformats.org/drawingml/2006/main" xmlns:r="http://schemas.openxmlformats.org/officeDocument/2006/relationships" xmlns:p="http://schemas.openxmlformats.org/presentationml/2006/main">
   <p:cSld>
     <p:spTree>
@@ -18199,7 +18653,7 @@
 </p:sld>
 </file>
 
-<file path=ppt/slides/slide6.xml><?xml version="1.0" encoding="utf-8"?>
+<file path=ppt/slides/slide7.xml><?xml version="1.0" encoding="utf-8"?>
 <p:sld xmlns:a="http://schemas.openxmlformats.org/drawingml/2006/main" xmlns:r="http://schemas.openxmlformats.org/officeDocument/2006/relationships" xmlns:p="http://schemas.openxmlformats.org/presentationml/2006/main">
   <p:cSld>
     <p:spTree>
@@ -18555,7 +19009,7 @@
 </p:sld>
 </file>
 
-<file path=ppt/slides/slide7.xml><?xml version="1.0" encoding="utf-8"?>
+<file path=ppt/slides/slide8.xml><?xml version="1.0" encoding="utf-8"?>
 <p:sld xmlns:a="http://schemas.openxmlformats.org/drawingml/2006/main" xmlns:r="http://schemas.openxmlformats.org/officeDocument/2006/relationships" xmlns:p="http://schemas.openxmlformats.org/presentationml/2006/main">
   <p:cSld>
     <p:spTree>
@@ -18782,7 +19236,7 @@
 </p:sld>
 </file>
 
-<file path=ppt/slides/slide8.xml><?xml version="1.0" encoding="utf-8"?>
+<file path=ppt/slides/slide9.xml><?xml version="1.0" encoding="utf-8"?>
 <p:sld xmlns:a="http://schemas.openxmlformats.org/drawingml/2006/main" xmlns:r="http://schemas.openxmlformats.org/officeDocument/2006/relationships" xmlns:p="http://schemas.openxmlformats.org/presentationml/2006/main">
   <p:cSld>
     <p:spTree>
@@ -19007,295 +19461,6 @@
     <p:extLst>
       <p:ext uri="{BB962C8B-B14F-4D97-AF65-F5344CB8AC3E}">
         <p14:creationId xmlns:p14="http://schemas.microsoft.com/office/powerpoint/2010/main" val="1217792067"/>
-      </p:ext>
-    </p:extLst>
-  </p:cSld>
-  <p:clrMapOvr>
-    <a:masterClrMapping/>
-  </p:clrMapOvr>
-</p:sld>
-</file>
-
-<file path=ppt/slides/slide9.xml><?xml version="1.0" encoding="utf-8"?>
-<p:sld xmlns:a="http://schemas.openxmlformats.org/drawingml/2006/main" xmlns:r="http://schemas.openxmlformats.org/officeDocument/2006/relationships" xmlns:p="http://schemas.openxmlformats.org/presentationml/2006/main">
-  <p:cSld>
-    <p:spTree>
-      <p:nvGrpSpPr>
-        <p:cNvPr id="1" name=""/>
-        <p:cNvGrpSpPr/>
-        <p:nvPr/>
-      </p:nvGrpSpPr>
-      <p:grpSpPr>
-        <a:xfrm>
-          <a:off x="0" y="0"/>
-          <a:ext cx="0" cy="0"/>
-          <a:chOff x="0" y="0"/>
-          <a:chExt cx="0" cy="0"/>
-        </a:xfrm>
-      </p:grpSpPr>
-      <p:sp>
-        <p:nvSpPr>
-          <p:cNvPr id="2" name="Title 1">
-            <a:extLst>
-              <a:ext uri="{FF2B5EF4-FFF2-40B4-BE49-F238E27FC236}">
-                <a16:creationId xmlns:a16="http://schemas.microsoft.com/office/drawing/2014/main" id="{1957DB96-6F14-D30D-1117-2D8DF8468663}"/>
-              </a:ext>
-            </a:extLst>
-          </p:cNvPr>
-          <p:cNvSpPr>
-            <a:spLocks noGrp="1"/>
-          </p:cNvSpPr>
-          <p:nvPr>
-            <p:ph type="title"/>
-          </p:nvPr>
-        </p:nvSpPr>
-        <p:spPr/>
-        <p:txBody>
-          <a:bodyPr/>
-          <a:lstStyle/>
-          <a:p>
-            <a:pPr algn="ctr"/>
-            <a:r>
-              <a:rPr lang="en-US" dirty="0">
-                <a:latin typeface="Arial" panose="020B0604020202020204" pitchFamily="34" charset="0"/>
-                <a:cs typeface="Arial" panose="020B0604020202020204" pitchFamily="34" charset="0"/>
-              </a:rPr>
-              <a:t>Single Page Application (SPA)</a:t>
-            </a:r>
-            <a:endParaRPr lang="bg-BG" dirty="0">
-              <a:latin typeface="Arial" panose="020B0604020202020204" pitchFamily="34" charset="0"/>
-              <a:cs typeface="Arial" panose="020B0604020202020204" pitchFamily="34" charset="0"/>
-            </a:endParaRPr>
-          </a:p>
-        </p:txBody>
-      </p:sp>
-      <p:sp>
-        <p:nvSpPr>
-          <p:cNvPr id="3" name="Content Placeholder 2">
-            <a:extLst>
-              <a:ext uri="{FF2B5EF4-FFF2-40B4-BE49-F238E27FC236}">
-                <a16:creationId xmlns:a16="http://schemas.microsoft.com/office/drawing/2014/main" id="{CAF48E5B-689D-DA04-DCDC-FCAF26AF574F}"/>
-              </a:ext>
-            </a:extLst>
-          </p:cNvPr>
-          <p:cNvSpPr>
-            <a:spLocks noGrp="1"/>
-          </p:cNvSpPr>
-          <p:nvPr>
-            <p:ph idx="1"/>
-          </p:nvPr>
-        </p:nvSpPr>
-        <p:spPr>
-          <a:xfrm>
-            <a:off x="421786" y="2390609"/>
-            <a:ext cx="4034885" cy="2174446"/>
-          </a:xfrm>
-        </p:spPr>
-        <p:txBody>
-          <a:bodyPr/>
-          <a:lstStyle/>
-          <a:p>
-            <a:r>
-              <a:rPr lang="en-US" dirty="0">
-                <a:solidFill>
-                  <a:srgbClr val="080809"/>
-                </a:solidFill>
-                <a:latin typeface="Arial" panose="020B0604020202020204" pitchFamily="34" charset="0"/>
-                <a:cs typeface="Arial" panose="020B0604020202020204" pitchFamily="34" charset="0"/>
-              </a:rPr>
-              <a:t>A </a:t>
-            </a:r>
-            <a:r>
-              <a:rPr lang="en-US" b="1" dirty="0">
-                <a:solidFill>
-                  <a:srgbClr val="080809"/>
-                </a:solidFill>
-                <a:latin typeface="Arial" panose="020B0604020202020204" pitchFamily="34" charset="0"/>
-                <a:cs typeface="Arial" panose="020B0604020202020204" pitchFamily="34" charset="0"/>
-              </a:rPr>
-              <a:t>single-page</a:t>
-            </a:r>
-            <a:r>
-              <a:rPr lang="en-US" dirty="0">
-                <a:solidFill>
-                  <a:srgbClr val="080809"/>
-                </a:solidFill>
-                <a:latin typeface="Arial" panose="020B0604020202020204" pitchFamily="34" charset="0"/>
-                <a:cs typeface="Arial" panose="020B0604020202020204" pitchFamily="34" charset="0"/>
-              </a:rPr>
-              <a:t> application is a web application that loads only a single page. It then rewrites the page with new content fetched from a web server as the user interacts with it instead of loading a new page for every interaction. </a:t>
-            </a:r>
-            <a:endParaRPr lang="bg-BG" dirty="0">
-              <a:latin typeface="Arial" panose="020B0604020202020204" pitchFamily="34" charset="0"/>
-              <a:cs typeface="Arial" panose="020B0604020202020204" pitchFamily="34" charset="0"/>
-            </a:endParaRPr>
-          </a:p>
-          <a:p>
-            <a:endParaRPr lang="bg-BG" dirty="0"/>
-          </a:p>
-        </p:txBody>
-      </p:sp>
-      <p:pic>
-        <p:nvPicPr>
-          <p:cNvPr id="5" name="Picture 4" descr="A screenshot of a computer&#10;&#10;Description automatically generated">
-            <a:extLst>
-              <a:ext uri="{FF2B5EF4-FFF2-40B4-BE49-F238E27FC236}">
-                <a16:creationId xmlns:a16="http://schemas.microsoft.com/office/drawing/2014/main" id="{9BD2C52D-CC43-92D9-1F05-78216FC8C955}"/>
-              </a:ext>
-            </a:extLst>
-          </p:cNvPr>
-          <p:cNvPicPr>
-            <a:picLocks noChangeAspect="1"/>
-          </p:cNvPicPr>
-          <p:nvPr/>
-        </p:nvPicPr>
-        <p:blipFill>
-          <a:blip r:embed="rId2">
-            <a:extLst>
-              <a:ext uri="{28A0092B-C50C-407E-A947-70E740481C1C}">
-                <a14:useLocalDpi xmlns:a14="http://schemas.microsoft.com/office/drawing/2010/main" val="0"/>
-              </a:ext>
-            </a:extLst>
-          </a:blip>
-          <a:stretch>
-            <a:fillRect/>
-          </a:stretch>
-        </p:blipFill>
-        <p:spPr>
-          <a:xfrm>
-            <a:off x="4852459" y="2390609"/>
-            <a:ext cx="6736111" cy="3382211"/>
-          </a:xfrm>
-          <a:prstGeom prst="roundRect">
-            <a:avLst>
-              <a:gd name="adj" fmla="val 8594"/>
-            </a:avLst>
-          </a:prstGeom>
-          <a:solidFill>
-            <a:srgbClr val="FFFFFF">
-              <a:shade val="85000"/>
-            </a:srgbClr>
-          </a:solidFill>
-          <a:ln>
-            <a:noFill/>
-          </a:ln>
-          <a:effectLst>
-            <a:reflection blurRad="12700" stA="38000" endPos="28000" dist="5000" dir="5400000" sy="-100000" algn="bl" rotWithShape="0"/>
-          </a:effectLst>
-        </p:spPr>
-      </p:pic>
-      <p:pic>
-        <p:nvPicPr>
-          <p:cNvPr id="7" name="Picture 6" descr="A diagram of a software system&#10;&#10;Description automatically generated with medium confidence">
-            <a:extLst>
-              <a:ext uri="{FF2B5EF4-FFF2-40B4-BE49-F238E27FC236}">
-                <a16:creationId xmlns:a16="http://schemas.microsoft.com/office/drawing/2014/main" id="{AEB226F8-3BF0-D756-F308-D923E08FC7CF}"/>
-              </a:ext>
-            </a:extLst>
-          </p:cNvPr>
-          <p:cNvPicPr>
-            <a:picLocks noChangeAspect="1"/>
-          </p:cNvPicPr>
-          <p:nvPr/>
-        </p:nvPicPr>
-        <p:blipFill>
-          <a:blip r:embed="rId3">
-            <a:extLst>
-              <a:ext uri="{28A0092B-C50C-407E-A947-70E740481C1C}">
-                <a14:useLocalDpi xmlns:a14="http://schemas.microsoft.com/office/drawing/2010/main" val="0"/>
-              </a:ext>
-            </a:extLst>
-          </a:blip>
-          <a:stretch>
-            <a:fillRect/>
-          </a:stretch>
-        </p:blipFill>
-        <p:spPr>
-          <a:xfrm>
-            <a:off x="327377" y="4572950"/>
-            <a:ext cx="4590985" cy="2255728"/>
-          </a:xfrm>
-          <a:prstGeom prst="rect">
-            <a:avLst/>
-          </a:prstGeom>
-        </p:spPr>
-      </p:pic>
-      <p:pic>
-        <p:nvPicPr>
-          <p:cNvPr id="6" name="Picture 5" descr="A logo of a google location&#10;&#10;Description automatically generated">
-            <a:extLst>
-              <a:ext uri="{FF2B5EF4-FFF2-40B4-BE49-F238E27FC236}">
-                <a16:creationId xmlns:a16="http://schemas.microsoft.com/office/drawing/2014/main" id="{C8388338-85E6-FE5D-879F-45A1C050DAD1}"/>
-              </a:ext>
-            </a:extLst>
-          </p:cNvPr>
-          <p:cNvPicPr>
-            <a:picLocks noChangeAspect="1"/>
-          </p:cNvPicPr>
-          <p:nvPr/>
-        </p:nvPicPr>
-        <p:blipFill>
-          <a:blip r:embed="rId4">
-            <a:extLst>
-              <a:ext uri="{28A0092B-C50C-407E-A947-70E740481C1C}">
-                <a14:useLocalDpi xmlns:a14="http://schemas.microsoft.com/office/drawing/2010/main" val="0"/>
-              </a:ext>
-            </a:extLst>
-          </a:blip>
-          <a:stretch>
-            <a:fillRect/>
-          </a:stretch>
-        </p:blipFill>
-        <p:spPr>
-          <a:xfrm>
-            <a:off x="5284911" y="5884332"/>
-            <a:ext cx="719784" cy="719784"/>
-          </a:xfrm>
-          <a:prstGeom prst="rect">
-            <a:avLst/>
-          </a:prstGeom>
-        </p:spPr>
-      </p:pic>
-      <p:pic>
-        <p:nvPicPr>
-          <p:cNvPr id="10" name="Picture 9" descr="A logo with a letter m&#10;&#10;Description automatically generated">
-            <a:extLst>
-              <a:ext uri="{FF2B5EF4-FFF2-40B4-BE49-F238E27FC236}">
-                <a16:creationId xmlns:a16="http://schemas.microsoft.com/office/drawing/2014/main" id="{7CC9EC2C-EAFA-F624-F3EF-51F11B45896A}"/>
-              </a:ext>
-            </a:extLst>
-          </p:cNvPr>
-          <p:cNvPicPr>
-            <a:picLocks noChangeAspect="1"/>
-          </p:cNvPicPr>
-          <p:nvPr/>
-        </p:nvPicPr>
-        <p:blipFill>
-          <a:blip r:embed="rId5">
-            <a:extLst>
-              <a:ext uri="{28A0092B-C50C-407E-A947-70E740481C1C}">
-                <a14:useLocalDpi xmlns:a14="http://schemas.microsoft.com/office/drawing/2010/main" val="0"/>
-              </a:ext>
-            </a:extLst>
-          </a:blip>
-          <a:stretch>
-            <a:fillRect/>
-          </a:stretch>
-        </p:blipFill>
-        <p:spPr>
-          <a:xfrm>
-            <a:off x="6004695" y="5828576"/>
-            <a:ext cx="1107542" cy="831296"/>
-          </a:xfrm>
-          <a:prstGeom prst="rect">
-            <a:avLst/>
-          </a:prstGeom>
-        </p:spPr>
-      </p:pic>
-    </p:spTree>
-    <p:extLst>
-      <p:ext uri="{BB962C8B-B14F-4D97-AF65-F5344CB8AC3E}">
-        <p14:creationId xmlns:p14="http://schemas.microsoft.com/office/powerpoint/2010/main" val="2787141596"/>
       </p:ext>
     </p:extLst>
   </p:cSld>

</xml_diff>

<commit_message>
Adding of new diagram for web api workflow
</commit_message>
<xml_diff>
--- a/JS intro and overview.pptx
+++ b/JS intro and overview.pptx
@@ -14427,10 +14427,10 @@
       </p:sp>
       <p:pic>
         <p:nvPicPr>
-          <p:cNvPr id="11" name="Picture 10" descr="A blue and yellow arrows with a gear and a cloud&#10;&#10;Description automatically generated">
+          <p:cNvPr id="4" name="Картина 3">
             <a:extLst>
               <a:ext uri="{FF2B5EF4-FFF2-40B4-BE49-F238E27FC236}">
-                <a16:creationId xmlns:a16="http://schemas.microsoft.com/office/drawing/2014/main" id="{F2F68CE8-3D85-F50E-15AD-6AA88C789F87}"/>
+                <a16:creationId xmlns:a16="http://schemas.microsoft.com/office/drawing/2014/main" id="{C7F8004C-D339-908A-CD7D-E977837E0397}"/>
               </a:ext>
             </a:extLst>
           </p:cNvPr>
@@ -14453,25 +14453,12 @@
         </p:blipFill>
         <p:spPr>
           <a:xfrm>
-            <a:off x="5962332" y="2735304"/>
-            <a:ext cx="5831702" cy="2915851"/>
+            <a:off x="5694721" y="2656434"/>
+            <a:ext cx="6281263" cy="3143732"/>
           </a:xfrm>
-          <a:prstGeom prst="roundRect">
-            <a:avLst>
-              <a:gd name="adj" fmla="val 8594"/>
-            </a:avLst>
+          <a:prstGeom prst="rect">
+            <a:avLst/>
           </a:prstGeom>
-          <a:solidFill>
-            <a:srgbClr val="FFFFFF">
-              <a:shade val="85000"/>
-            </a:srgbClr>
-          </a:solidFill>
-          <a:ln>
-            <a:noFill/>
-          </a:ln>
-          <a:effectLst>
-            <a:reflection blurRad="12700" stA="38000" endPos="28000" dist="5000" dir="5400000" sy="-100000" algn="bl" rotWithShape="0"/>
-          </a:effectLst>
         </p:spPr>
       </p:pic>
     </p:spTree>
@@ -17820,14 +17807,14 @@
               <a:t>, </a:t>
             </a:r>
             <a:r>
-              <a:rPr lang="en-US" b="1" dirty="0" err="1">
+              <a:rPr lang="en-US" b="1" dirty="0">
                 <a:solidFill>
                   <a:srgbClr val="292B2E"/>
                 </a:solidFill>
                 <a:latin typeface="Arial" panose="020B0604020202020204" pitchFamily="34" charset="0"/>
                 <a:cs typeface="Arial" panose="020B0604020202020204" pitchFamily="34" charset="0"/>
               </a:rPr>
-              <a:t>Vue.Js</a:t>
+              <a:t>Vue.js</a:t>
             </a:r>
             <a:r>
               <a:rPr lang="en-US" dirty="0">
@@ -19053,14 +19040,14 @@
                 <a:latin typeface="Arial" panose="020B0604020202020204" pitchFamily="34" charset="0"/>
                 <a:cs typeface="Arial" panose="020B0604020202020204" pitchFamily="34" charset="0"/>
               </a:rPr>
-              <a:t>Static website vs </a:t>
+              <a:t>Static website vs Dynamic </a:t>
             </a:r>
             <a:r>
               <a:rPr lang="en-US">
                 <a:latin typeface="Arial" panose="020B0604020202020204" pitchFamily="34" charset="0"/>
                 <a:cs typeface="Arial" panose="020B0604020202020204" pitchFamily="34" charset="0"/>
               </a:rPr>
-              <a:t>Dynamic website</a:t>
+              <a:t>website (MPA)</a:t>
             </a:r>
             <a:endParaRPr lang="bg-BG" dirty="0">
               <a:latin typeface="Arial" panose="020B0604020202020204" pitchFamily="34" charset="0"/>

</xml_diff>

<commit_message>
Update of AJAX slide
</commit_message>
<xml_diff>
--- a/JS intro and overview.pptx
+++ b/JS intro and overview.pptx
@@ -20057,7 +20057,28 @@
                 <a:latin typeface="Arial" panose="020B0604020202020204" pitchFamily="34" charset="0"/>
                 <a:cs typeface="Arial" panose="020B0604020202020204" pitchFamily="34" charset="0"/>
               </a:rPr>
-              <a:t>It is a combination of programming techniques for requesting of data from server in async way.</a:t>
+              <a:t>It is a combination of programming techniques for requesting </a:t>
+            </a:r>
+            <a:r>
+              <a:rPr lang="en-US">
+                <a:solidFill>
+                  <a:srgbClr val="000000"/>
+                </a:solidFill>
+                <a:latin typeface="Arial" panose="020B0604020202020204" pitchFamily="34" charset="0"/>
+                <a:cs typeface="Arial" panose="020B0604020202020204" pitchFamily="34" charset="0"/>
+              </a:rPr>
+              <a:t>and receiving </a:t>
+            </a:r>
+            <a:r>
+              <a:rPr lang="en-US" b="0" i="0" dirty="0">
+                <a:solidFill>
+                  <a:srgbClr val="000000"/>
+                </a:solidFill>
+                <a:effectLst/>
+                <a:latin typeface="Arial" panose="020B0604020202020204" pitchFamily="34" charset="0"/>
+                <a:cs typeface="Arial" panose="020B0604020202020204" pitchFamily="34" charset="0"/>
+              </a:rPr>
+              <a:t>of data from server in async way.</a:t>
             </a:r>
             <a:endParaRPr lang="en-US" dirty="0">
               <a:solidFill>

</xml_diff>

<commit_message>
Fixed typo in one of the first slides
</commit_message>
<xml_diff>
--- a/JS intro and overview.pptx
+++ b/JS intro and overview.pptx
@@ -17427,18 +17427,25 @@
           </a:p>
           <a:p>
             <a:r>
-              <a:rPr lang="en-US" b="1" dirty="0">
+              <a:rPr lang="en-US" b="1">
                 <a:latin typeface="Arial" panose="020B0604020202020204" pitchFamily="34" charset="0"/>
                 <a:cs typeface="Arial" panose="020B0604020202020204" pitchFamily="34" charset="0"/>
               </a:rPr>
               <a:t>ECMA</a:t>
             </a:r>
             <a:r>
+              <a:rPr lang="en-US">
+                <a:latin typeface="Arial" panose="020B0604020202020204" pitchFamily="34" charset="0"/>
+                <a:cs typeface="Arial" panose="020B0604020202020204" pitchFamily="34" charset="0"/>
+              </a:rPr>
+              <a:t> is a </a:t>
+            </a:r>
+            <a:r>
               <a:rPr lang="en-US" dirty="0">
                 <a:latin typeface="Arial" panose="020B0604020202020204" pitchFamily="34" charset="0"/>
                 <a:cs typeface="Arial" panose="020B0604020202020204" pitchFamily="34" charset="0"/>
               </a:rPr>
-              <a:t> – is and industry association dedicated to the standardization of information and communication systems.</a:t>
+              <a:t>industry association dedicated to the standardization of information and communication systems.</a:t>
             </a:r>
           </a:p>
           <a:p>

</xml_diff>